<commit_message>
Acabada la presentació del frontend+avanzat en la memòria+modificacions a la pantalla de crear familia+actualitzat el prototip de baixa fidelitat i afegit el prototip d'alta fidelitat
</commit_message>
<xml_diff>
--- a/Presentació/Gestió d’una falla.pptx
+++ b/Presentació/Gestió d’una falla.pptx
@@ -110,6 +110,11 @@
       </a:defRPr>
     </a:lvl9pPr>
   </p:defaultTextStyle>
+  <p:extLst>
+    <p:ext uri="{EFAFB233-063F-42B5-8137-9DF3F51BA10A}">
+      <p15:sldGuideLst xmlns:p15="http://schemas.microsoft.com/office/powerpoint/2012/main"/>
+    </p:ext>
+  </p:extLst>
 </p:presentation>
 </file>
 
@@ -262,7 +267,7 @@
           <a:p>
             <a:fld id="{960FEC7B-8241-48EA-A964-895F2288E349}" type="datetimeFigureOut">
               <a:rPr lang="es-ES" smtClean="0"/>
-              <a:t>23/05/2025</a:t>
+              <a:t>26/05/2025</a:t>
             </a:fld>
             <a:endParaRPr lang="es-ES"/>
           </a:p>
@@ -462,7 +467,7 @@
           <a:p>
             <a:fld id="{960FEC7B-8241-48EA-A964-895F2288E349}" type="datetimeFigureOut">
               <a:rPr lang="es-ES" smtClean="0"/>
-              <a:t>23/05/2025</a:t>
+              <a:t>26/05/2025</a:t>
             </a:fld>
             <a:endParaRPr lang="es-ES"/>
           </a:p>
@@ -672,7 +677,7 @@
           <a:p>
             <a:fld id="{960FEC7B-8241-48EA-A964-895F2288E349}" type="datetimeFigureOut">
               <a:rPr lang="es-ES" smtClean="0"/>
-              <a:t>23/05/2025</a:t>
+              <a:t>26/05/2025</a:t>
             </a:fld>
             <a:endParaRPr lang="es-ES"/>
           </a:p>
@@ -872,7 +877,7 @@
           <a:p>
             <a:fld id="{960FEC7B-8241-48EA-A964-895F2288E349}" type="datetimeFigureOut">
               <a:rPr lang="es-ES" smtClean="0"/>
-              <a:t>23/05/2025</a:t>
+              <a:t>26/05/2025</a:t>
             </a:fld>
             <a:endParaRPr lang="es-ES"/>
           </a:p>
@@ -1148,7 +1153,7 @@
           <a:p>
             <a:fld id="{960FEC7B-8241-48EA-A964-895F2288E349}" type="datetimeFigureOut">
               <a:rPr lang="es-ES" smtClean="0"/>
-              <a:t>23/05/2025</a:t>
+              <a:t>26/05/2025</a:t>
             </a:fld>
             <a:endParaRPr lang="es-ES"/>
           </a:p>
@@ -1416,7 +1421,7 @@
           <a:p>
             <a:fld id="{960FEC7B-8241-48EA-A964-895F2288E349}" type="datetimeFigureOut">
               <a:rPr lang="es-ES" smtClean="0"/>
-              <a:t>23/05/2025</a:t>
+              <a:t>26/05/2025</a:t>
             </a:fld>
             <a:endParaRPr lang="es-ES"/>
           </a:p>
@@ -1831,7 +1836,7 @@
           <a:p>
             <a:fld id="{960FEC7B-8241-48EA-A964-895F2288E349}" type="datetimeFigureOut">
               <a:rPr lang="es-ES" smtClean="0"/>
-              <a:t>23/05/2025</a:t>
+              <a:t>26/05/2025</a:t>
             </a:fld>
             <a:endParaRPr lang="es-ES"/>
           </a:p>
@@ -1973,7 +1978,7 @@
           <a:p>
             <a:fld id="{960FEC7B-8241-48EA-A964-895F2288E349}" type="datetimeFigureOut">
               <a:rPr lang="es-ES" smtClean="0"/>
-              <a:t>23/05/2025</a:t>
+              <a:t>26/05/2025</a:t>
             </a:fld>
             <a:endParaRPr lang="es-ES"/>
           </a:p>
@@ -2086,7 +2091,7 @@
           <a:p>
             <a:fld id="{960FEC7B-8241-48EA-A964-895F2288E349}" type="datetimeFigureOut">
               <a:rPr lang="es-ES" smtClean="0"/>
-              <a:t>23/05/2025</a:t>
+              <a:t>26/05/2025</a:t>
             </a:fld>
             <a:endParaRPr lang="es-ES"/>
           </a:p>
@@ -2399,7 +2404,7 @@
           <a:p>
             <a:fld id="{960FEC7B-8241-48EA-A964-895F2288E349}" type="datetimeFigureOut">
               <a:rPr lang="es-ES" smtClean="0"/>
-              <a:t>23/05/2025</a:t>
+              <a:t>26/05/2025</a:t>
             </a:fld>
             <a:endParaRPr lang="es-ES"/>
           </a:p>
@@ -2688,7 +2693,7 @@
           <a:p>
             <a:fld id="{960FEC7B-8241-48EA-A964-895F2288E349}" type="datetimeFigureOut">
               <a:rPr lang="es-ES" smtClean="0"/>
-              <a:t>23/05/2025</a:t>
+              <a:t>26/05/2025</a:t>
             </a:fld>
             <a:endParaRPr lang="es-ES"/>
           </a:p>
@@ -2931,7 +2936,7 @@
           <a:p>
             <a:fld id="{960FEC7B-8241-48EA-A964-895F2288E349}" type="datetimeFigureOut">
               <a:rPr lang="es-ES" smtClean="0"/>
-              <a:t>23/05/2025</a:t>
+              <a:t>26/05/2025</a:t>
             </a:fld>
             <a:endParaRPr lang="es-ES"/>
           </a:p>

</xml_diff>

<commit_message>
Modificacions al frontend i xicotetes correccions en el servidor de node i a la base de dades
</commit_message>
<xml_diff>
--- a/Presentació/Gestió d’una falla.pptx
+++ b/Presentació/Gestió d’una falla.pptx
@@ -2,7 +2,7 @@
 <file path=ppt/presentation.xml><?xml version="1.0" encoding="utf-8"?>
 <p:presentation xmlns:a="http://schemas.openxmlformats.org/drawingml/2006/main" xmlns:r="http://schemas.openxmlformats.org/officeDocument/2006/relationships" xmlns:p="http://schemas.openxmlformats.org/presentationml/2006/main" saveSubsetFonts="1">
   <p:sldMasterIdLst>
-    <p:sldMasterId id="2147483648" r:id="rId1"/>
+    <p:sldMasterId id="2147483726" r:id="rId1"/>
   </p:sldMasterIdLst>
   <p:sldIdLst>
     <p:sldId id="256" r:id="rId2"/>
@@ -15,9 +15,10 @@
     <p:sldId id="266" r:id="rId9"/>
     <p:sldId id="269" r:id="rId10"/>
     <p:sldId id="268" r:id="rId11"/>
-    <p:sldId id="262" r:id="rId12"/>
-    <p:sldId id="261" r:id="rId13"/>
-    <p:sldId id="267" r:id="rId14"/>
+    <p:sldId id="271" r:id="rId12"/>
+    <p:sldId id="262" r:id="rId13"/>
+    <p:sldId id="261" r:id="rId14"/>
+    <p:sldId id="267" r:id="rId15"/>
   </p:sldIdLst>
   <p:sldSz cx="12192000" cy="6858000"/>
   <p:notesSz cx="6858000" cy="9144000"/>
@@ -126,7 +127,7 @@
 
 <file path=ppt/slideLayouts/slideLayout1.xml><?xml version="1.0" encoding="utf-8"?>
 <p:sldLayout xmlns:a="http://schemas.openxmlformats.org/drawingml/2006/main" xmlns:r="http://schemas.openxmlformats.org/officeDocument/2006/relationships" xmlns:p="http://schemas.openxmlformats.org/presentationml/2006/main" type="title" preserve="1">
-  <p:cSld name="Title Slide">
+  <p:cSld name="Diapositiva de título">
     <p:spTree>
       <p:nvGrpSpPr>
         <p:cNvPr id="1" name=""/>
@@ -143,10 +144,10 @@
       </p:grpSpPr>
       <p:sp>
         <p:nvSpPr>
-          <p:cNvPr id="2" name="Title 1">
-            <a:extLst>
-              <a:ext uri="{FF2B5EF4-FFF2-40B4-BE49-F238E27FC236}">
-                <a16:creationId xmlns:a16="http://schemas.microsoft.com/office/drawing/2014/main" id="{FAA595D3-B7B8-6A57-B5F7-9D193F7D8DC4}"/>
+          <p:cNvPr id="2" name="Título 1">
+            <a:extLst>
+              <a:ext uri="{FF2B5EF4-FFF2-40B4-BE49-F238E27FC236}">
+                <a16:creationId xmlns:a16="http://schemas.microsoft.com/office/drawing/2014/main" id="{DBD1FA73-4ADD-B5C4-47E9-83E35A2C38AC}"/>
               </a:ext>
             </a:extLst>
           </p:cNvPr>
@@ -172,19 +173,18 @@
           </a:lstStyle>
           <a:p>
             <a:r>
-              <a:rPr lang="en-US"/>
-              <a:t>Click to edit Master title style</a:t>
-            </a:r>
-            <a:endParaRPr lang="es-ES"/>
+              <a:rPr lang="es-ES"/>
+              <a:t>Haga clic para modificar el estilo de título del patrón</a:t>
+            </a:r>
           </a:p>
         </p:txBody>
       </p:sp>
       <p:sp>
         <p:nvSpPr>
-          <p:cNvPr id="3" name="Subtitle 2">
-            <a:extLst>
-              <a:ext uri="{FF2B5EF4-FFF2-40B4-BE49-F238E27FC236}">
-                <a16:creationId xmlns:a16="http://schemas.microsoft.com/office/drawing/2014/main" id="{BD8DA1EC-4D79-8F5C-D41D-1DFDBEEA6CB6}"/>
+          <p:cNvPr id="3" name="Subtítulo 2">
+            <a:extLst>
+              <a:ext uri="{FF2B5EF4-FFF2-40B4-BE49-F238E27FC236}">
+                <a16:creationId xmlns:a16="http://schemas.microsoft.com/office/drawing/2014/main" id="{E6AE98BC-B2F6-C783-E478-7548A0F556E8}"/>
               </a:ext>
             </a:extLst>
           </p:cNvPr>
@@ -243,19 +243,18 @@
           </a:lstStyle>
           <a:p>
             <a:r>
-              <a:rPr lang="en-US"/>
-              <a:t>Click to edit Master subtitle style</a:t>
-            </a:r>
-            <a:endParaRPr lang="es-ES"/>
+              <a:rPr lang="es-ES"/>
+              <a:t>Haga clic para modificar el estilo de subtítulo del patrón</a:t>
+            </a:r>
           </a:p>
         </p:txBody>
       </p:sp>
       <p:sp>
         <p:nvSpPr>
-          <p:cNvPr id="4" name="Date Placeholder 3">
-            <a:extLst>
-              <a:ext uri="{FF2B5EF4-FFF2-40B4-BE49-F238E27FC236}">
-                <a16:creationId xmlns:a16="http://schemas.microsoft.com/office/drawing/2014/main" id="{32C35080-FEDD-2312-9F10-726F078050E0}"/>
+          <p:cNvPr id="4" name="Marcador de fecha 3">
+            <a:extLst>
+              <a:ext uri="{FF2B5EF4-FFF2-40B4-BE49-F238E27FC236}">
+                <a16:creationId xmlns:a16="http://schemas.microsoft.com/office/drawing/2014/main" id="{C1534ABF-B0DF-D9A9-CCB6-B67AA2DF87BE}"/>
               </a:ext>
             </a:extLst>
           </p:cNvPr>
@@ -273,7 +272,7 @@
           <a:p>
             <a:fld id="{960FEC7B-8241-48EA-A964-895F2288E349}" type="datetimeFigureOut">
               <a:rPr lang="es-ES" smtClean="0"/>
-              <a:t>29/05/2025</a:t>
+              <a:t>02/06/2025</a:t>
             </a:fld>
             <a:endParaRPr lang="es-ES"/>
           </a:p>
@@ -281,10 +280,10 @@
       </p:sp>
       <p:sp>
         <p:nvSpPr>
-          <p:cNvPr id="5" name="Footer Placeholder 4">
-            <a:extLst>
-              <a:ext uri="{FF2B5EF4-FFF2-40B4-BE49-F238E27FC236}">
-                <a16:creationId xmlns:a16="http://schemas.microsoft.com/office/drawing/2014/main" id="{7CDA9B4A-9271-2882-DD8D-17495EBCE40D}"/>
+          <p:cNvPr id="5" name="Marcador de pie de página 4">
+            <a:extLst>
+              <a:ext uri="{FF2B5EF4-FFF2-40B4-BE49-F238E27FC236}">
+                <a16:creationId xmlns:a16="http://schemas.microsoft.com/office/drawing/2014/main" id="{2FF0A1DD-AF7D-1CBD-D2FB-1282E6A234CB}"/>
               </a:ext>
             </a:extLst>
           </p:cNvPr>
@@ -306,10 +305,10 @@
       </p:sp>
       <p:sp>
         <p:nvSpPr>
-          <p:cNvPr id="6" name="Slide Number Placeholder 5">
-            <a:extLst>
-              <a:ext uri="{FF2B5EF4-FFF2-40B4-BE49-F238E27FC236}">
-                <a16:creationId xmlns:a16="http://schemas.microsoft.com/office/drawing/2014/main" id="{4874A866-D1C7-F5FB-81C7-37A181A368CC}"/>
+          <p:cNvPr id="6" name="Marcador de número de diapositiva 5">
+            <a:extLst>
+              <a:ext uri="{FF2B5EF4-FFF2-40B4-BE49-F238E27FC236}">
+                <a16:creationId xmlns:a16="http://schemas.microsoft.com/office/drawing/2014/main" id="{047E3150-4517-A99F-6796-9E59D0750282}"/>
               </a:ext>
             </a:extLst>
           </p:cNvPr>
@@ -327,7 +326,7 @@
           <a:p>
             <a:fld id="{8493A7F7-0FDE-44E2-80F8-D84CC777D99B}" type="slidenum">
               <a:rPr lang="es-ES" smtClean="0"/>
-              <a:t>‹#›</a:t>
+              <a:t>‹Nº›</a:t>
             </a:fld>
             <a:endParaRPr lang="es-ES"/>
           </a:p>
@@ -336,7 +335,7 @@
     </p:spTree>
     <p:extLst>
       <p:ext uri="{BB962C8B-B14F-4D97-AF65-F5344CB8AC3E}">
-        <p14:creationId xmlns:p14="http://schemas.microsoft.com/office/powerpoint/2010/main" val="4029976236"/>
+        <p14:creationId xmlns:p14="http://schemas.microsoft.com/office/powerpoint/2010/main" val="2141060189"/>
       </p:ext>
     </p:extLst>
   </p:cSld>
@@ -348,7 +347,7 @@
 
 <file path=ppt/slideLayouts/slideLayout10.xml><?xml version="1.0" encoding="utf-8"?>
 <p:sldLayout xmlns:a="http://schemas.openxmlformats.org/drawingml/2006/main" xmlns:r="http://schemas.openxmlformats.org/officeDocument/2006/relationships" xmlns:p="http://schemas.openxmlformats.org/presentationml/2006/main" type="vertTx" preserve="1">
-  <p:cSld name="Title and Vertical Text">
+  <p:cSld name="Título y texto vertical">
     <p:spTree>
       <p:nvGrpSpPr>
         <p:cNvPr id="1" name=""/>
@@ -365,10 +364,10 @@
       </p:grpSpPr>
       <p:sp>
         <p:nvSpPr>
-          <p:cNvPr id="2" name="Title 1">
-            <a:extLst>
-              <a:ext uri="{FF2B5EF4-FFF2-40B4-BE49-F238E27FC236}">
-                <a16:creationId xmlns:a16="http://schemas.microsoft.com/office/drawing/2014/main" id="{78785D76-3622-D99E-7CC8-6EB2C56EEF24}"/>
+          <p:cNvPr id="2" name="Título 1">
+            <a:extLst>
+              <a:ext uri="{FF2B5EF4-FFF2-40B4-BE49-F238E27FC236}">
+                <a16:creationId xmlns:a16="http://schemas.microsoft.com/office/drawing/2014/main" id="{47B9246F-0F8F-31FC-92A1-7FC9E25A9734}"/>
               </a:ext>
             </a:extLst>
           </p:cNvPr>
@@ -385,19 +384,18 @@
           <a:lstStyle/>
           <a:p>
             <a:r>
-              <a:rPr lang="en-US"/>
-              <a:t>Click to edit Master title style</a:t>
-            </a:r>
-            <a:endParaRPr lang="es-ES"/>
+              <a:rPr lang="es-ES"/>
+              <a:t>Haga clic para modificar el estilo de título del patrón</a:t>
+            </a:r>
           </a:p>
         </p:txBody>
       </p:sp>
       <p:sp>
         <p:nvSpPr>
-          <p:cNvPr id="3" name="Vertical Text Placeholder 2">
-            <a:extLst>
-              <a:ext uri="{FF2B5EF4-FFF2-40B4-BE49-F238E27FC236}">
-                <a16:creationId xmlns:a16="http://schemas.microsoft.com/office/drawing/2014/main" id="{08C38F04-40AA-AB09-10FE-1B7326AB283D}"/>
+          <p:cNvPr id="3" name="Marcador de texto vertical 2">
+            <a:extLst>
+              <a:ext uri="{FF2B5EF4-FFF2-40B4-BE49-F238E27FC236}">
+                <a16:creationId xmlns:a16="http://schemas.microsoft.com/office/drawing/2014/main" id="{03549350-C9D2-683F-7BF7-42502DA0E192}"/>
               </a:ext>
             </a:extLst>
           </p:cNvPr>
@@ -415,47 +413,46 @@
           <a:p>
             <a:pPr lvl="0"/>
             <a:r>
-              <a:rPr lang="en-US"/>
-              <a:t>Click to edit Master text styles</a:t>
+              <a:rPr lang="es-ES"/>
+              <a:t>Haga clic para modificar los estilos de texto del patrón</a:t>
             </a:r>
           </a:p>
           <a:p>
             <a:pPr lvl="1"/>
             <a:r>
-              <a:rPr lang="en-US"/>
-              <a:t>Second level</a:t>
+              <a:rPr lang="es-ES"/>
+              <a:t>Segundo nivel</a:t>
             </a:r>
           </a:p>
           <a:p>
             <a:pPr lvl="2"/>
             <a:r>
-              <a:rPr lang="en-US"/>
-              <a:t>Third level</a:t>
+              <a:rPr lang="es-ES"/>
+              <a:t>Tercer nivel</a:t>
             </a:r>
           </a:p>
           <a:p>
             <a:pPr lvl="3"/>
             <a:r>
-              <a:rPr lang="en-US"/>
-              <a:t>Fourth level</a:t>
+              <a:rPr lang="es-ES"/>
+              <a:t>Cuarto nivel</a:t>
             </a:r>
           </a:p>
           <a:p>
             <a:pPr lvl="4"/>
             <a:r>
-              <a:rPr lang="en-US"/>
-              <a:t>Fifth level</a:t>
-            </a:r>
-            <a:endParaRPr lang="es-ES"/>
+              <a:rPr lang="es-ES"/>
+              <a:t>Quinto nivel</a:t>
+            </a:r>
           </a:p>
         </p:txBody>
       </p:sp>
       <p:sp>
         <p:nvSpPr>
-          <p:cNvPr id="4" name="Date Placeholder 3">
-            <a:extLst>
-              <a:ext uri="{FF2B5EF4-FFF2-40B4-BE49-F238E27FC236}">
-                <a16:creationId xmlns:a16="http://schemas.microsoft.com/office/drawing/2014/main" id="{DB6703D5-095A-7741-99E7-450249682F80}"/>
+          <p:cNvPr id="4" name="Marcador de fecha 3">
+            <a:extLst>
+              <a:ext uri="{FF2B5EF4-FFF2-40B4-BE49-F238E27FC236}">
+                <a16:creationId xmlns:a16="http://schemas.microsoft.com/office/drawing/2014/main" id="{674DC080-7EBA-4212-891E-037F0DB1AC23}"/>
               </a:ext>
             </a:extLst>
           </p:cNvPr>
@@ -473,7 +470,7 @@
           <a:p>
             <a:fld id="{960FEC7B-8241-48EA-A964-895F2288E349}" type="datetimeFigureOut">
               <a:rPr lang="es-ES" smtClean="0"/>
-              <a:t>29/05/2025</a:t>
+              <a:t>02/06/2025</a:t>
             </a:fld>
             <a:endParaRPr lang="es-ES"/>
           </a:p>
@@ -481,10 +478,10 @@
       </p:sp>
       <p:sp>
         <p:nvSpPr>
-          <p:cNvPr id="5" name="Footer Placeholder 4">
-            <a:extLst>
-              <a:ext uri="{FF2B5EF4-FFF2-40B4-BE49-F238E27FC236}">
-                <a16:creationId xmlns:a16="http://schemas.microsoft.com/office/drawing/2014/main" id="{DDC2857C-3F15-212B-64C5-4CE132ADC935}"/>
+          <p:cNvPr id="5" name="Marcador de pie de página 4">
+            <a:extLst>
+              <a:ext uri="{FF2B5EF4-FFF2-40B4-BE49-F238E27FC236}">
+                <a16:creationId xmlns:a16="http://schemas.microsoft.com/office/drawing/2014/main" id="{53F12845-6AD7-EACB-E54A-38E4A099130B}"/>
               </a:ext>
             </a:extLst>
           </p:cNvPr>
@@ -506,10 +503,10 @@
       </p:sp>
       <p:sp>
         <p:nvSpPr>
-          <p:cNvPr id="6" name="Slide Number Placeholder 5">
-            <a:extLst>
-              <a:ext uri="{FF2B5EF4-FFF2-40B4-BE49-F238E27FC236}">
-                <a16:creationId xmlns:a16="http://schemas.microsoft.com/office/drawing/2014/main" id="{88B6BA7B-4909-0E2A-5072-2FC4EB394935}"/>
+          <p:cNvPr id="6" name="Marcador de número de diapositiva 5">
+            <a:extLst>
+              <a:ext uri="{FF2B5EF4-FFF2-40B4-BE49-F238E27FC236}">
+                <a16:creationId xmlns:a16="http://schemas.microsoft.com/office/drawing/2014/main" id="{F0A7D2EC-EF58-B444-8581-B0A93FE61516}"/>
               </a:ext>
             </a:extLst>
           </p:cNvPr>
@@ -527,7 +524,7 @@
           <a:p>
             <a:fld id="{8493A7F7-0FDE-44E2-80F8-D84CC777D99B}" type="slidenum">
               <a:rPr lang="es-ES" smtClean="0"/>
-              <a:t>‹#›</a:t>
+              <a:t>‹Nº›</a:t>
             </a:fld>
             <a:endParaRPr lang="es-ES"/>
           </a:p>
@@ -536,7 +533,7 @@
     </p:spTree>
     <p:extLst>
       <p:ext uri="{BB962C8B-B14F-4D97-AF65-F5344CB8AC3E}">
-        <p14:creationId xmlns:p14="http://schemas.microsoft.com/office/powerpoint/2010/main" val="3010685064"/>
+        <p14:creationId xmlns:p14="http://schemas.microsoft.com/office/powerpoint/2010/main" val="2687477706"/>
       </p:ext>
     </p:extLst>
   </p:cSld>
@@ -548,7 +545,7 @@
 
 <file path=ppt/slideLayouts/slideLayout11.xml><?xml version="1.0" encoding="utf-8"?>
 <p:sldLayout xmlns:a="http://schemas.openxmlformats.org/drawingml/2006/main" xmlns:r="http://schemas.openxmlformats.org/officeDocument/2006/relationships" xmlns:p="http://schemas.openxmlformats.org/presentationml/2006/main" type="vertTitleAndTx" preserve="1">
-  <p:cSld name="Vertical Title and Text">
+  <p:cSld name="Título vertical y texto">
     <p:spTree>
       <p:nvGrpSpPr>
         <p:cNvPr id="1" name=""/>
@@ -565,10 +562,10 @@
       </p:grpSpPr>
       <p:sp>
         <p:nvSpPr>
-          <p:cNvPr id="2" name="Vertical Title 1">
-            <a:extLst>
-              <a:ext uri="{FF2B5EF4-FFF2-40B4-BE49-F238E27FC236}">
-                <a16:creationId xmlns:a16="http://schemas.microsoft.com/office/drawing/2014/main" id="{99ACDFB3-6613-D4D9-1A39-FCED6D726D8C}"/>
+          <p:cNvPr id="2" name="Título vertical 1">
+            <a:extLst>
+              <a:ext uri="{FF2B5EF4-FFF2-40B4-BE49-F238E27FC236}">
+                <a16:creationId xmlns:a16="http://schemas.microsoft.com/office/drawing/2014/main" id="{46E26A1E-7722-9D46-C457-213F0151F536}"/>
               </a:ext>
             </a:extLst>
           </p:cNvPr>
@@ -590,19 +587,18 @@
           <a:lstStyle/>
           <a:p>
             <a:r>
-              <a:rPr lang="en-US"/>
-              <a:t>Click to edit Master title style</a:t>
-            </a:r>
-            <a:endParaRPr lang="es-ES"/>
+              <a:rPr lang="es-ES"/>
+              <a:t>Haga clic para modificar el estilo de título del patrón</a:t>
+            </a:r>
           </a:p>
         </p:txBody>
       </p:sp>
       <p:sp>
         <p:nvSpPr>
-          <p:cNvPr id="3" name="Vertical Text Placeholder 2">
-            <a:extLst>
-              <a:ext uri="{FF2B5EF4-FFF2-40B4-BE49-F238E27FC236}">
-                <a16:creationId xmlns:a16="http://schemas.microsoft.com/office/drawing/2014/main" id="{EC8E580D-F0F8-73AC-6BD1-8574F73EDD74}"/>
+          <p:cNvPr id="3" name="Marcador de texto vertical 2">
+            <a:extLst>
+              <a:ext uri="{FF2B5EF4-FFF2-40B4-BE49-F238E27FC236}">
+                <a16:creationId xmlns:a16="http://schemas.microsoft.com/office/drawing/2014/main" id="{59BC49EF-7B02-9B57-2DA3-B447C9C94C24}"/>
               </a:ext>
             </a:extLst>
           </p:cNvPr>
@@ -625,47 +621,46 @@
           <a:p>
             <a:pPr lvl="0"/>
             <a:r>
-              <a:rPr lang="en-US"/>
-              <a:t>Click to edit Master text styles</a:t>
+              <a:rPr lang="es-ES"/>
+              <a:t>Haga clic para modificar los estilos de texto del patrón</a:t>
             </a:r>
           </a:p>
           <a:p>
             <a:pPr lvl="1"/>
             <a:r>
-              <a:rPr lang="en-US"/>
-              <a:t>Second level</a:t>
+              <a:rPr lang="es-ES"/>
+              <a:t>Segundo nivel</a:t>
             </a:r>
           </a:p>
           <a:p>
             <a:pPr lvl="2"/>
             <a:r>
-              <a:rPr lang="en-US"/>
-              <a:t>Third level</a:t>
+              <a:rPr lang="es-ES"/>
+              <a:t>Tercer nivel</a:t>
             </a:r>
           </a:p>
           <a:p>
             <a:pPr lvl="3"/>
             <a:r>
-              <a:rPr lang="en-US"/>
-              <a:t>Fourth level</a:t>
+              <a:rPr lang="es-ES"/>
+              <a:t>Cuarto nivel</a:t>
             </a:r>
           </a:p>
           <a:p>
             <a:pPr lvl="4"/>
             <a:r>
-              <a:rPr lang="en-US"/>
-              <a:t>Fifth level</a:t>
-            </a:r>
-            <a:endParaRPr lang="es-ES"/>
+              <a:rPr lang="es-ES"/>
+              <a:t>Quinto nivel</a:t>
+            </a:r>
           </a:p>
         </p:txBody>
       </p:sp>
       <p:sp>
         <p:nvSpPr>
-          <p:cNvPr id="4" name="Date Placeholder 3">
-            <a:extLst>
-              <a:ext uri="{FF2B5EF4-FFF2-40B4-BE49-F238E27FC236}">
-                <a16:creationId xmlns:a16="http://schemas.microsoft.com/office/drawing/2014/main" id="{868AED24-1269-CC21-6188-B3D1D694C670}"/>
+          <p:cNvPr id="4" name="Marcador de fecha 3">
+            <a:extLst>
+              <a:ext uri="{FF2B5EF4-FFF2-40B4-BE49-F238E27FC236}">
+                <a16:creationId xmlns:a16="http://schemas.microsoft.com/office/drawing/2014/main" id="{8E79828F-A3C9-8417-2B7D-4538283AED3C}"/>
               </a:ext>
             </a:extLst>
           </p:cNvPr>
@@ -683,7 +678,7 @@
           <a:p>
             <a:fld id="{960FEC7B-8241-48EA-A964-895F2288E349}" type="datetimeFigureOut">
               <a:rPr lang="es-ES" smtClean="0"/>
-              <a:t>29/05/2025</a:t>
+              <a:t>02/06/2025</a:t>
             </a:fld>
             <a:endParaRPr lang="es-ES"/>
           </a:p>
@@ -691,10 +686,10 @@
       </p:sp>
       <p:sp>
         <p:nvSpPr>
-          <p:cNvPr id="5" name="Footer Placeholder 4">
-            <a:extLst>
-              <a:ext uri="{FF2B5EF4-FFF2-40B4-BE49-F238E27FC236}">
-                <a16:creationId xmlns:a16="http://schemas.microsoft.com/office/drawing/2014/main" id="{B374F8F6-9CBF-8579-D3F4-4994912033D6}"/>
+          <p:cNvPr id="5" name="Marcador de pie de página 4">
+            <a:extLst>
+              <a:ext uri="{FF2B5EF4-FFF2-40B4-BE49-F238E27FC236}">
+                <a16:creationId xmlns:a16="http://schemas.microsoft.com/office/drawing/2014/main" id="{C1A28E60-E8F0-BE35-92F6-32BC5205BCE5}"/>
               </a:ext>
             </a:extLst>
           </p:cNvPr>
@@ -716,10 +711,10 @@
       </p:sp>
       <p:sp>
         <p:nvSpPr>
-          <p:cNvPr id="6" name="Slide Number Placeholder 5">
-            <a:extLst>
-              <a:ext uri="{FF2B5EF4-FFF2-40B4-BE49-F238E27FC236}">
-                <a16:creationId xmlns:a16="http://schemas.microsoft.com/office/drawing/2014/main" id="{32042382-5E29-3259-547E-F0B9F0BA756D}"/>
+          <p:cNvPr id="6" name="Marcador de número de diapositiva 5">
+            <a:extLst>
+              <a:ext uri="{FF2B5EF4-FFF2-40B4-BE49-F238E27FC236}">
+                <a16:creationId xmlns:a16="http://schemas.microsoft.com/office/drawing/2014/main" id="{01EC9B25-D52F-25BA-8550-0B3646C70ECD}"/>
               </a:ext>
             </a:extLst>
           </p:cNvPr>
@@ -737,7 +732,7 @@
           <a:p>
             <a:fld id="{8493A7F7-0FDE-44E2-80F8-D84CC777D99B}" type="slidenum">
               <a:rPr lang="es-ES" smtClean="0"/>
-              <a:t>‹#›</a:t>
+              <a:t>‹Nº›</a:t>
             </a:fld>
             <a:endParaRPr lang="es-ES"/>
           </a:p>
@@ -746,7 +741,7 @@
     </p:spTree>
     <p:extLst>
       <p:ext uri="{BB962C8B-B14F-4D97-AF65-F5344CB8AC3E}">
-        <p14:creationId xmlns:p14="http://schemas.microsoft.com/office/powerpoint/2010/main" val="2326486473"/>
+        <p14:creationId xmlns:p14="http://schemas.microsoft.com/office/powerpoint/2010/main" val="231917319"/>
       </p:ext>
     </p:extLst>
   </p:cSld>
@@ -758,7 +753,7 @@
 
 <file path=ppt/slideLayouts/slideLayout2.xml><?xml version="1.0" encoding="utf-8"?>
 <p:sldLayout xmlns:a="http://schemas.openxmlformats.org/drawingml/2006/main" xmlns:r="http://schemas.openxmlformats.org/officeDocument/2006/relationships" xmlns:p="http://schemas.openxmlformats.org/presentationml/2006/main" type="obj" preserve="1">
-  <p:cSld name="Title and Content">
+  <p:cSld name="Título y objetos">
     <p:spTree>
       <p:nvGrpSpPr>
         <p:cNvPr id="1" name=""/>
@@ -775,10 +770,10 @@
       </p:grpSpPr>
       <p:sp>
         <p:nvSpPr>
-          <p:cNvPr id="2" name="Title 1">
-            <a:extLst>
-              <a:ext uri="{FF2B5EF4-FFF2-40B4-BE49-F238E27FC236}">
-                <a16:creationId xmlns:a16="http://schemas.microsoft.com/office/drawing/2014/main" id="{0B902B12-3B00-B95B-6323-30C210391627}"/>
+          <p:cNvPr id="2" name="Título 1">
+            <a:extLst>
+              <a:ext uri="{FF2B5EF4-FFF2-40B4-BE49-F238E27FC236}">
+                <a16:creationId xmlns:a16="http://schemas.microsoft.com/office/drawing/2014/main" id="{C72B2E54-852B-4B86-1A80-F00B37C12888}"/>
               </a:ext>
             </a:extLst>
           </p:cNvPr>
@@ -795,19 +790,18 @@
           <a:lstStyle/>
           <a:p>
             <a:r>
-              <a:rPr lang="en-US"/>
-              <a:t>Click to edit Master title style</a:t>
-            </a:r>
-            <a:endParaRPr lang="es-ES"/>
+              <a:rPr lang="es-ES"/>
+              <a:t>Haga clic para modificar el estilo de título del patrón</a:t>
+            </a:r>
           </a:p>
         </p:txBody>
       </p:sp>
       <p:sp>
         <p:nvSpPr>
-          <p:cNvPr id="3" name="Content Placeholder 2">
-            <a:extLst>
-              <a:ext uri="{FF2B5EF4-FFF2-40B4-BE49-F238E27FC236}">
-                <a16:creationId xmlns:a16="http://schemas.microsoft.com/office/drawing/2014/main" id="{E13E2E18-9A80-94CE-7959-708F2C70129B}"/>
+          <p:cNvPr id="3" name="Marcador de contenido 2">
+            <a:extLst>
+              <a:ext uri="{FF2B5EF4-FFF2-40B4-BE49-F238E27FC236}">
+                <a16:creationId xmlns:a16="http://schemas.microsoft.com/office/drawing/2014/main" id="{E67AD1EA-90CC-E226-49BF-1D2F42EF4D81}"/>
               </a:ext>
             </a:extLst>
           </p:cNvPr>
@@ -825,47 +819,46 @@
           <a:p>
             <a:pPr lvl="0"/>
             <a:r>
-              <a:rPr lang="en-US"/>
-              <a:t>Click to edit Master text styles</a:t>
+              <a:rPr lang="es-ES"/>
+              <a:t>Haga clic para modificar los estilos de texto del patrón</a:t>
             </a:r>
           </a:p>
           <a:p>
             <a:pPr lvl="1"/>
             <a:r>
-              <a:rPr lang="en-US"/>
-              <a:t>Second level</a:t>
+              <a:rPr lang="es-ES"/>
+              <a:t>Segundo nivel</a:t>
             </a:r>
           </a:p>
           <a:p>
             <a:pPr lvl="2"/>
             <a:r>
-              <a:rPr lang="en-US"/>
-              <a:t>Third level</a:t>
+              <a:rPr lang="es-ES"/>
+              <a:t>Tercer nivel</a:t>
             </a:r>
           </a:p>
           <a:p>
             <a:pPr lvl="3"/>
             <a:r>
-              <a:rPr lang="en-US"/>
-              <a:t>Fourth level</a:t>
+              <a:rPr lang="es-ES"/>
+              <a:t>Cuarto nivel</a:t>
             </a:r>
           </a:p>
           <a:p>
             <a:pPr lvl="4"/>
             <a:r>
-              <a:rPr lang="en-US"/>
-              <a:t>Fifth level</a:t>
-            </a:r>
-            <a:endParaRPr lang="es-ES"/>
+              <a:rPr lang="es-ES"/>
+              <a:t>Quinto nivel</a:t>
+            </a:r>
           </a:p>
         </p:txBody>
       </p:sp>
       <p:sp>
         <p:nvSpPr>
-          <p:cNvPr id="4" name="Date Placeholder 3">
-            <a:extLst>
-              <a:ext uri="{FF2B5EF4-FFF2-40B4-BE49-F238E27FC236}">
-                <a16:creationId xmlns:a16="http://schemas.microsoft.com/office/drawing/2014/main" id="{6F038657-79C9-9839-A4FA-BC78D5BA26F2}"/>
+          <p:cNvPr id="4" name="Marcador de fecha 3">
+            <a:extLst>
+              <a:ext uri="{FF2B5EF4-FFF2-40B4-BE49-F238E27FC236}">
+                <a16:creationId xmlns:a16="http://schemas.microsoft.com/office/drawing/2014/main" id="{48CE49C7-8894-07F8-3E35-60CB2FEC0CE3}"/>
               </a:ext>
             </a:extLst>
           </p:cNvPr>
@@ -883,7 +876,7 @@
           <a:p>
             <a:fld id="{960FEC7B-8241-48EA-A964-895F2288E349}" type="datetimeFigureOut">
               <a:rPr lang="es-ES" smtClean="0"/>
-              <a:t>29/05/2025</a:t>
+              <a:t>02/06/2025</a:t>
             </a:fld>
             <a:endParaRPr lang="es-ES"/>
           </a:p>
@@ -891,10 +884,10 @@
       </p:sp>
       <p:sp>
         <p:nvSpPr>
-          <p:cNvPr id="5" name="Footer Placeholder 4">
-            <a:extLst>
-              <a:ext uri="{FF2B5EF4-FFF2-40B4-BE49-F238E27FC236}">
-                <a16:creationId xmlns:a16="http://schemas.microsoft.com/office/drawing/2014/main" id="{132421A5-3E57-9D3D-7BAF-9F2A217459D5}"/>
+          <p:cNvPr id="5" name="Marcador de pie de página 4">
+            <a:extLst>
+              <a:ext uri="{FF2B5EF4-FFF2-40B4-BE49-F238E27FC236}">
+                <a16:creationId xmlns:a16="http://schemas.microsoft.com/office/drawing/2014/main" id="{AB4029FE-E1BF-7118-6E94-C3FFC6E43157}"/>
               </a:ext>
             </a:extLst>
           </p:cNvPr>
@@ -916,10 +909,10 @@
       </p:sp>
       <p:sp>
         <p:nvSpPr>
-          <p:cNvPr id="6" name="Slide Number Placeholder 5">
-            <a:extLst>
-              <a:ext uri="{FF2B5EF4-FFF2-40B4-BE49-F238E27FC236}">
-                <a16:creationId xmlns:a16="http://schemas.microsoft.com/office/drawing/2014/main" id="{39730369-B789-CEB0-B961-5B9399E70898}"/>
+          <p:cNvPr id="6" name="Marcador de número de diapositiva 5">
+            <a:extLst>
+              <a:ext uri="{FF2B5EF4-FFF2-40B4-BE49-F238E27FC236}">
+                <a16:creationId xmlns:a16="http://schemas.microsoft.com/office/drawing/2014/main" id="{8D381F16-815B-665B-B393-F927953C5D14}"/>
               </a:ext>
             </a:extLst>
           </p:cNvPr>
@@ -937,7 +930,7 @@
           <a:p>
             <a:fld id="{8493A7F7-0FDE-44E2-80F8-D84CC777D99B}" type="slidenum">
               <a:rPr lang="es-ES" smtClean="0"/>
-              <a:t>‹#›</a:t>
+              <a:t>‹Nº›</a:t>
             </a:fld>
             <a:endParaRPr lang="es-ES"/>
           </a:p>
@@ -946,7 +939,7 @@
     </p:spTree>
     <p:extLst>
       <p:ext uri="{BB962C8B-B14F-4D97-AF65-F5344CB8AC3E}">
-        <p14:creationId xmlns:p14="http://schemas.microsoft.com/office/powerpoint/2010/main" val="908902046"/>
+        <p14:creationId xmlns:p14="http://schemas.microsoft.com/office/powerpoint/2010/main" val="515222684"/>
       </p:ext>
     </p:extLst>
   </p:cSld>
@@ -958,7 +951,7 @@
 
 <file path=ppt/slideLayouts/slideLayout3.xml><?xml version="1.0" encoding="utf-8"?>
 <p:sldLayout xmlns:a="http://schemas.openxmlformats.org/drawingml/2006/main" xmlns:r="http://schemas.openxmlformats.org/officeDocument/2006/relationships" xmlns:p="http://schemas.openxmlformats.org/presentationml/2006/main" type="secHead" preserve="1">
-  <p:cSld name="Section Header">
+  <p:cSld name="Encabezado de sección">
     <p:spTree>
       <p:nvGrpSpPr>
         <p:cNvPr id="1" name=""/>
@@ -975,10 +968,10 @@
       </p:grpSpPr>
       <p:sp>
         <p:nvSpPr>
-          <p:cNvPr id="2" name="Title 1">
-            <a:extLst>
-              <a:ext uri="{FF2B5EF4-FFF2-40B4-BE49-F238E27FC236}">
-                <a16:creationId xmlns:a16="http://schemas.microsoft.com/office/drawing/2014/main" id="{316EC240-FF67-312E-4109-CD41F1DD650E}"/>
+          <p:cNvPr id="2" name="Título 1">
+            <a:extLst>
+              <a:ext uri="{FF2B5EF4-FFF2-40B4-BE49-F238E27FC236}">
+                <a16:creationId xmlns:a16="http://schemas.microsoft.com/office/drawing/2014/main" id="{81FBCEBB-7498-8356-B072-5994F0A1575D}"/>
               </a:ext>
             </a:extLst>
           </p:cNvPr>
@@ -1004,19 +997,18 @@
           </a:lstStyle>
           <a:p>
             <a:r>
-              <a:rPr lang="en-US"/>
-              <a:t>Click to edit Master title style</a:t>
-            </a:r>
-            <a:endParaRPr lang="es-ES"/>
+              <a:rPr lang="es-ES"/>
+              <a:t>Haga clic para modificar el estilo de título del patrón</a:t>
+            </a:r>
           </a:p>
         </p:txBody>
       </p:sp>
       <p:sp>
         <p:nvSpPr>
-          <p:cNvPr id="3" name="Text Placeholder 2">
-            <a:extLst>
-              <a:ext uri="{FF2B5EF4-FFF2-40B4-BE49-F238E27FC236}">
-                <a16:creationId xmlns:a16="http://schemas.microsoft.com/office/drawing/2014/main" id="{8CEB779F-3D3F-3422-F342-4C1538E13151}"/>
+          <p:cNvPr id="3" name="Marcador de texto 2">
+            <a:extLst>
+              <a:ext uri="{FF2B5EF4-FFF2-40B4-BE49-F238E27FC236}">
+                <a16:creationId xmlns:a16="http://schemas.microsoft.com/office/drawing/2014/main" id="{F17F8581-AC8E-9286-EAC9-148D2163841F}"/>
               </a:ext>
             </a:extLst>
           </p:cNvPr>
@@ -1130,18 +1122,18 @@
           <a:p>
             <a:pPr lvl="0"/>
             <a:r>
-              <a:rPr lang="en-US"/>
-              <a:t>Click to edit Master text styles</a:t>
+              <a:rPr lang="es-ES"/>
+              <a:t>Haga clic para modificar los estilos de texto del patrón</a:t>
             </a:r>
           </a:p>
         </p:txBody>
       </p:sp>
       <p:sp>
         <p:nvSpPr>
-          <p:cNvPr id="4" name="Date Placeholder 3">
-            <a:extLst>
-              <a:ext uri="{FF2B5EF4-FFF2-40B4-BE49-F238E27FC236}">
-                <a16:creationId xmlns:a16="http://schemas.microsoft.com/office/drawing/2014/main" id="{9D455BE0-6636-833B-6E7F-0DC540BE2F27}"/>
+          <p:cNvPr id="4" name="Marcador de fecha 3">
+            <a:extLst>
+              <a:ext uri="{FF2B5EF4-FFF2-40B4-BE49-F238E27FC236}">
+                <a16:creationId xmlns:a16="http://schemas.microsoft.com/office/drawing/2014/main" id="{CC7DD10C-FF64-B61F-59EB-119B19832E6A}"/>
               </a:ext>
             </a:extLst>
           </p:cNvPr>
@@ -1159,7 +1151,7 @@
           <a:p>
             <a:fld id="{960FEC7B-8241-48EA-A964-895F2288E349}" type="datetimeFigureOut">
               <a:rPr lang="es-ES" smtClean="0"/>
-              <a:t>29/05/2025</a:t>
+              <a:t>02/06/2025</a:t>
             </a:fld>
             <a:endParaRPr lang="es-ES"/>
           </a:p>
@@ -1167,10 +1159,10 @@
       </p:sp>
       <p:sp>
         <p:nvSpPr>
-          <p:cNvPr id="5" name="Footer Placeholder 4">
-            <a:extLst>
-              <a:ext uri="{FF2B5EF4-FFF2-40B4-BE49-F238E27FC236}">
-                <a16:creationId xmlns:a16="http://schemas.microsoft.com/office/drawing/2014/main" id="{DC4636B0-7C8A-A3B4-063B-C8573267378A}"/>
+          <p:cNvPr id="5" name="Marcador de pie de página 4">
+            <a:extLst>
+              <a:ext uri="{FF2B5EF4-FFF2-40B4-BE49-F238E27FC236}">
+                <a16:creationId xmlns:a16="http://schemas.microsoft.com/office/drawing/2014/main" id="{5C3478E5-7F00-521A-2596-73012F9706CB}"/>
               </a:ext>
             </a:extLst>
           </p:cNvPr>
@@ -1192,10 +1184,10 @@
       </p:sp>
       <p:sp>
         <p:nvSpPr>
-          <p:cNvPr id="6" name="Slide Number Placeholder 5">
-            <a:extLst>
-              <a:ext uri="{FF2B5EF4-FFF2-40B4-BE49-F238E27FC236}">
-                <a16:creationId xmlns:a16="http://schemas.microsoft.com/office/drawing/2014/main" id="{99AC38DF-B4C0-985F-DC80-B4BBFF7C808D}"/>
+          <p:cNvPr id="6" name="Marcador de número de diapositiva 5">
+            <a:extLst>
+              <a:ext uri="{FF2B5EF4-FFF2-40B4-BE49-F238E27FC236}">
+                <a16:creationId xmlns:a16="http://schemas.microsoft.com/office/drawing/2014/main" id="{BEE9BFB6-2606-8022-B487-AE3B237D230B}"/>
               </a:ext>
             </a:extLst>
           </p:cNvPr>
@@ -1213,7 +1205,7 @@
           <a:p>
             <a:fld id="{8493A7F7-0FDE-44E2-80F8-D84CC777D99B}" type="slidenum">
               <a:rPr lang="es-ES" smtClean="0"/>
-              <a:t>‹#›</a:t>
+              <a:t>‹Nº›</a:t>
             </a:fld>
             <a:endParaRPr lang="es-ES"/>
           </a:p>
@@ -1222,7 +1214,7 @@
     </p:spTree>
     <p:extLst>
       <p:ext uri="{BB962C8B-B14F-4D97-AF65-F5344CB8AC3E}">
-        <p14:creationId xmlns:p14="http://schemas.microsoft.com/office/powerpoint/2010/main" val="821220153"/>
+        <p14:creationId xmlns:p14="http://schemas.microsoft.com/office/powerpoint/2010/main" val="198387317"/>
       </p:ext>
     </p:extLst>
   </p:cSld>
@@ -1234,7 +1226,7 @@
 
 <file path=ppt/slideLayouts/slideLayout4.xml><?xml version="1.0" encoding="utf-8"?>
 <p:sldLayout xmlns:a="http://schemas.openxmlformats.org/drawingml/2006/main" xmlns:r="http://schemas.openxmlformats.org/officeDocument/2006/relationships" xmlns:p="http://schemas.openxmlformats.org/presentationml/2006/main" type="twoObj" preserve="1">
-  <p:cSld name="Two Content">
+  <p:cSld name="Dos objetos">
     <p:spTree>
       <p:nvGrpSpPr>
         <p:cNvPr id="1" name=""/>
@@ -1251,10 +1243,10 @@
       </p:grpSpPr>
       <p:sp>
         <p:nvSpPr>
-          <p:cNvPr id="2" name="Title 1">
-            <a:extLst>
-              <a:ext uri="{FF2B5EF4-FFF2-40B4-BE49-F238E27FC236}">
-                <a16:creationId xmlns:a16="http://schemas.microsoft.com/office/drawing/2014/main" id="{EA9D0C83-C030-7811-94CC-82DA27E15DE2}"/>
+          <p:cNvPr id="2" name="Título 1">
+            <a:extLst>
+              <a:ext uri="{FF2B5EF4-FFF2-40B4-BE49-F238E27FC236}">
+                <a16:creationId xmlns:a16="http://schemas.microsoft.com/office/drawing/2014/main" id="{06654DA4-2118-198F-CEC9-59BE7E4F13F2}"/>
               </a:ext>
             </a:extLst>
           </p:cNvPr>
@@ -1271,19 +1263,18 @@
           <a:lstStyle/>
           <a:p>
             <a:r>
-              <a:rPr lang="en-US"/>
-              <a:t>Click to edit Master title style</a:t>
-            </a:r>
-            <a:endParaRPr lang="es-ES"/>
+              <a:rPr lang="es-ES"/>
+              <a:t>Haga clic para modificar el estilo de título del patrón</a:t>
+            </a:r>
           </a:p>
         </p:txBody>
       </p:sp>
       <p:sp>
         <p:nvSpPr>
-          <p:cNvPr id="3" name="Content Placeholder 2">
-            <a:extLst>
-              <a:ext uri="{FF2B5EF4-FFF2-40B4-BE49-F238E27FC236}">
-                <a16:creationId xmlns:a16="http://schemas.microsoft.com/office/drawing/2014/main" id="{3472782D-5FE2-DBDB-622F-206B1045B6B4}"/>
+          <p:cNvPr id="3" name="Marcador de contenido 2">
+            <a:extLst>
+              <a:ext uri="{FF2B5EF4-FFF2-40B4-BE49-F238E27FC236}">
+                <a16:creationId xmlns:a16="http://schemas.microsoft.com/office/drawing/2014/main" id="{6ED35DFF-E155-1F7C-7657-459DF8840126}"/>
               </a:ext>
             </a:extLst>
           </p:cNvPr>
@@ -1306,47 +1297,46 @@
           <a:p>
             <a:pPr lvl="0"/>
             <a:r>
-              <a:rPr lang="en-US"/>
-              <a:t>Click to edit Master text styles</a:t>
+              <a:rPr lang="es-ES"/>
+              <a:t>Haga clic para modificar los estilos de texto del patrón</a:t>
             </a:r>
           </a:p>
           <a:p>
             <a:pPr lvl="1"/>
             <a:r>
-              <a:rPr lang="en-US"/>
-              <a:t>Second level</a:t>
+              <a:rPr lang="es-ES"/>
+              <a:t>Segundo nivel</a:t>
             </a:r>
           </a:p>
           <a:p>
             <a:pPr lvl="2"/>
             <a:r>
-              <a:rPr lang="en-US"/>
-              <a:t>Third level</a:t>
+              <a:rPr lang="es-ES"/>
+              <a:t>Tercer nivel</a:t>
             </a:r>
           </a:p>
           <a:p>
             <a:pPr lvl="3"/>
             <a:r>
-              <a:rPr lang="en-US"/>
-              <a:t>Fourth level</a:t>
+              <a:rPr lang="es-ES"/>
+              <a:t>Cuarto nivel</a:t>
             </a:r>
           </a:p>
           <a:p>
             <a:pPr lvl="4"/>
             <a:r>
-              <a:rPr lang="en-US"/>
-              <a:t>Fifth level</a:t>
-            </a:r>
-            <a:endParaRPr lang="es-ES"/>
+              <a:rPr lang="es-ES"/>
+              <a:t>Quinto nivel</a:t>
+            </a:r>
           </a:p>
         </p:txBody>
       </p:sp>
       <p:sp>
         <p:nvSpPr>
-          <p:cNvPr id="4" name="Content Placeholder 3">
-            <a:extLst>
-              <a:ext uri="{FF2B5EF4-FFF2-40B4-BE49-F238E27FC236}">
-                <a16:creationId xmlns:a16="http://schemas.microsoft.com/office/drawing/2014/main" id="{6B10EAD3-543F-71A0-34E0-04293B94AD29}"/>
+          <p:cNvPr id="4" name="Marcador de contenido 3">
+            <a:extLst>
+              <a:ext uri="{FF2B5EF4-FFF2-40B4-BE49-F238E27FC236}">
+                <a16:creationId xmlns:a16="http://schemas.microsoft.com/office/drawing/2014/main" id="{AC5701E2-FD2E-9952-63DE-C078B1638C84}"/>
               </a:ext>
             </a:extLst>
           </p:cNvPr>
@@ -1369,47 +1359,46 @@
           <a:p>
             <a:pPr lvl="0"/>
             <a:r>
-              <a:rPr lang="en-US"/>
-              <a:t>Click to edit Master text styles</a:t>
+              <a:rPr lang="es-ES"/>
+              <a:t>Haga clic para modificar los estilos de texto del patrón</a:t>
             </a:r>
           </a:p>
           <a:p>
             <a:pPr lvl="1"/>
             <a:r>
-              <a:rPr lang="en-US"/>
-              <a:t>Second level</a:t>
+              <a:rPr lang="es-ES"/>
+              <a:t>Segundo nivel</a:t>
             </a:r>
           </a:p>
           <a:p>
             <a:pPr lvl="2"/>
             <a:r>
-              <a:rPr lang="en-US"/>
-              <a:t>Third level</a:t>
+              <a:rPr lang="es-ES"/>
+              <a:t>Tercer nivel</a:t>
             </a:r>
           </a:p>
           <a:p>
             <a:pPr lvl="3"/>
             <a:r>
-              <a:rPr lang="en-US"/>
-              <a:t>Fourth level</a:t>
+              <a:rPr lang="es-ES"/>
+              <a:t>Cuarto nivel</a:t>
             </a:r>
           </a:p>
           <a:p>
             <a:pPr lvl="4"/>
             <a:r>
-              <a:rPr lang="en-US"/>
-              <a:t>Fifth level</a:t>
-            </a:r>
-            <a:endParaRPr lang="es-ES"/>
+              <a:rPr lang="es-ES"/>
+              <a:t>Quinto nivel</a:t>
+            </a:r>
           </a:p>
         </p:txBody>
       </p:sp>
       <p:sp>
         <p:nvSpPr>
-          <p:cNvPr id="5" name="Date Placeholder 4">
-            <a:extLst>
-              <a:ext uri="{FF2B5EF4-FFF2-40B4-BE49-F238E27FC236}">
-                <a16:creationId xmlns:a16="http://schemas.microsoft.com/office/drawing/2014/main" id="{F97C01F8-9EFE-5A7E-37DA-054DE3AFF220}"/>
+          <p:cNvPr id="5" name="Marcador de fecha 4">
+            <a:extLst>
+              <a:ext uri="{FF2B5EF4-FFF2-40B4-BE49-F238E27FC236}">
+                <a16:creationId xmlns:a16="http://schemas.microsoft.com/office/drawing/2014/main" id="{99F0F98D-DB40-CD31-84AD-40DEC07DBDAE}"/>
               </a:ext>
             </a:extLst>
           </p:cNvPr>
@@ -1427,7 +1416,7 @@
           <a:p>
             <a:fld id="{960FEC7B-8241-48EA-A964-895F2288E349}" type="datetimeFigureOut">
               <a:rPr lang="es-ES" smtClean="0"/>
-              <a:t>29/05/2025</a:t>
+              <a:t>02/06/2025</a:t>
             </a:fld>
             <a:endParaRPr lang="es-ES"/>
           </a:p>
@@ -1435,10 +1424,10 @@
       </p:sp>
       <p:sp>
         <p:nvSpPr>
-          <p:cNvPr id="6" name="Footer Placeholder 5">
-            <a:extLst>
-              <a:ext uri="{FF2B5EF4-FFF2-40B4-BE49-F238E27FC236}">
-                <a16:creationId xmlns:a16="http://schemas.microsoft.com/office/drawing/2014/main" id="{F468C528-F48C-3FCD-CB80-DF52C74CEA01}"/>
+          <p:cNvPr id="6" name="Marcador de pie de página 5">
+            <a:extLst>
+              <a:ext uri="{FF2B5EF4-FFF2-40B4-BE49-F238E27FC236}">
+                <a16:creationId xmlns:a16="http://schemas.microsoft.com/office/drawing/2014/main" id="{D889B152-8CFA-7082-EEAB-4276FBC24B39}"/>
               </a:ext>
             </a:extLst>
           </p:cNvPr>
@@ -1460,10 +1449,10 @@
       </p:sp>
       <p:sp>
         <p:nvSpPr>
-          <p:cNvPr id="7" name="Slide Number Placeholder 6">
-            <a:extLst>
-              <a:ext uri="{FF2B5EF4-FFF2-40B4-BE49-F238E27FC236}">
-                <a16:creationId xmlns:a16="http://schemas.microsoft.com/office/drawing/2014/main" id="{8CC07CFC-EF9F-71A5-36B2-8FC01339BE65}"/>
+          <p:cNvPr id="7" name="Marcador de número de diapositiva 6">
+            <a:extLst>
+              <a:ext uri="{FF2B5EF4-FFF2-40B4-BE49-F238E27FC236}">
+                <a16:creationId xmlns:a16="http://schemas.microsoft.com/office/drawing/2014/main" id="{C9520709-3148-4D1C-8420-1B8D28E536CE}"/>
               </a:ext>
             </a:extLst>
           </p:cNvPr>
@@ -1481,7 +1470,7 @@
           <a:p>
             <a:fld id="{8493A7F7-0FDE-44E2-80F8-D84CC777D99B}" type="slidenum">
               <a:rPr lang="es-ES" smtClean="0"/>
-              <a:t>‹#›</a:t>
+              <a:t>‹Nº›</a:t>
             </a:fld>
             <a:endParaRPr lang="es-ES"/>
           </a:p>
@@ -1490,7 +1479,7 @@
     </p:spTree>
     <p:extLst>
       <p:ext uri="{BB962C8B-B14F-4D97-AF65-F5344CB8AC3E}">
-        <p14:creationId xmlns:p14="http://schemas.microsoft.com/office/powerpoint/2010/main" val="3109201417"/>
+        <p14:creationId xmlns:p14="http://schemas.microsoft.com/office/powerpoint/2010/main" val="125987452"/>
       </p:ext>
     </p:extLst>
   </p:cSld>
@@ -1502,7 +1491,7 @@
 
 <file path=ppt/slideLayouts/slideLayout5.xml><?xml version="1.0" encoding="utf-8"?>
 <p:sldLayout xmlns:a="http://schemas.openxmlformats.org/drawingml/2006/main" xmlns:r="http://schemas.openxmlformats.org/officeDocument/2006/relationships" xmlns:p="http://schemas.openxmlformats.org/presentationml/2006/main" type="twoTxTwoObj" preserve="1">
-  <p:cSld name="Comparison">
+  <p:cSld name="Comparación">
     <p:spTree>
       <p:nvGrpSpPr>
         <p:cNvPr id="1" name=""/>
@@ -1519,10 +1508,10 @@
       </p:grpSpPr>
       <p:sp>
         <p:nvSpPr>
-          <p:cNvPr id="2" name="Title 1">
-            <a:extLst>
-              <a:ext uri="{FF2B5EF4-FFF2-40B4-BE49-F238E27FC236}">
-                <a16:creationId xmlns:a16="http://schemas.microsoft.com/office/drawing/2014/main" id="{F660C460-B693-75C8-81D1-73D15B25C733}"/>
+          <p:cNvPr id="2" name="Título 1">
+            <a:extLst>
+              <a:ext uri="{FF2B5EF4-FFF2-40B4-BE49-F238E27FC236}">
+                <a16:creationId xmlns:a16="http://schemas.microsoft.com/office/drawing/2014/main" id="{4B719A3F-AF8B-B421-4CA7-8083321F7588}"/>
               </a:ext>
             </a:extLst>
           </p:cNvPr>
@@ -1544,19 +1533,18 @@
           <a:lstStyle/>
           <a:p>
             <a:r>
-              <a:rPr lang="en-US"/>
-              <a:t>Click to edit Master title style</a:t>
-            </a:r>
-            <a:endParaRPr lang="es-ES"/>
+              <a:rPr lang="es-ES"/>
+              <a:t>Haga clic para modificar el estilo de título del patrón</a:t>
+            </a:r>
           </a:p>
         </p:txBody>
       </p:sp>
       <p:sp>
         <p:nvSpPr>
-          <p:cNvPr id="3" name="Text Placeholder 2">
-            <a:extLst>
-              <a:ext uri="{FF2B5EF4-FFF2-40B4-BE49-F238E27FC236}">
-                <a16:creationId xmlns:a16="http://schemas.microsoft.com/office/drawing/2014/main" id="{571C575A-CA10-089C-53D5-112AEA7F4EA6}"/>
+          <p:cNvPr id="3" name="Marcador de texto 2">
+            <a:extLst>
+              <a:ext uri="{FF2B5EF4-FFF2-40B4-BE49-F238E27FC236}">
+                <a16:creationId xmlns:a16="http://schemas.microsoft.com/office/drawing/2014/main" id="{5A0F7920-496C-E798-D1F3-EC14F173772E}"/>
               </a:ext>
             </a:extLst>
           </p:cNvPr>
@@ -1616,18 +1604,18 @@
           <a:p>
             <a:pPr lvl="0"/>
             <a:r>
-              <a:rPr lang="en-US"/>
-              <a:t>Click to edit Master text styles</a:t>
+              <a:rPr lang="es-ES"/>
+              <a:t>Haga clic para modificar los estilos de texto del patrón</a:t>
             </a:r>
           </a:p>
         </p:txBody>
       </p:sp>
       <p:sp>
         <p:nvSpPr>
-          <p:cNvPr id="4" name="Content Placeholder 3">
-            <a:extLst>
-              <a:ext uri="{FF2B5EF4-FFF2-40B4-BE49-F238E27FC236}">
-                <a16:creationId xmlns:a16="http://schemas.microsoft.com/office/drawing/2014/main" id="{807AF155-E04E-FBB3-1C33-DE252A3E20B3}"/>
+          <p:cNvPr id="4" name="Marcador de contenido 3">
+            <a:extLst>
+              <a:ext uri="{FF2B5EF4-FFF2-40B4-BE49-F238E27FC236}">
+                <a16:creationId xmlns:a16="http://schemas.microsoft.com/office/drawing/2014/main" id="{3AD61C77-D820-2026-6A9B-B6BDFCF4B4BE}"/>
               </a:ext>
             </a:extLst>
           </p:cNvPr>
@@ -1650,47 +1638,46 @@
           <a:p>
             <a:pPr lvl="0"/>
             <a:r>
-              <a:rPr lang="en-US"/>
-              <a:t>Click to edit Master text styles</a:t>
+              <a:rPr lang="es-ES"/>
+              <a:t>Haga clic para modificar los estilos de texto del patrón</a:t>
             </a:r>
           </a:p>
           <a:p>
             <a:pPr lvl="1"/>
             <a:r>
-              <a:rPr lang="en-US"/>
-              <a:t>Second level</a:t>
+              <a:rPr lang="es-ES"/>
+              <a:t>Segundo nivel</a:t>
             </a:r>
           </a:p>
           <a:p>
             <a:pPr lvl="2"/>
             <a:r>
-              <a:rPr lang="en-US"/>
-              <a:t>Third level</a:t>
+              <a:rPr lang="es-ES"/>
+              <a:t>Tercer nivel</a:t>
             </a:r>
           </a:p>
           <a:p>
             <a:pPr lvl="3"/>
             <a:r>
-              <a:rPr lang="en-US"/>
-              <a:t>Fourth level</a:t>
+              <a:rPr lang="es-ES"/>
+              <a:t>Cuarto nivel</a:t>
             </a:r>
           </a:p>
           <a:p>
             <a:pPr lvl="4"/>
             <a:r>
-              <a:rPr lang="en-US"/>
-              <a:t>Fifth level</a:t>
-            </a:r>
-            <a:endParaRPr lang="es-ES"/>
+              <a:rPr lang="es-ES"/>
+              <a:t>Quinto nivel</a:t>
+            </a:r>
           </a:p>
         </p:txBody>
       </p:sp>
       <p:sp>
         <p:nvSpPr>
-          <p:cNvPr id="5" name="Text Placeholder 4">
-            <a:extLst>
-              <a:ext uri="{FF2B5EF4-FFF2-40B4-BE49-F238E27FC236}">
-                <a16:creationId xmlns:a16="http://schemas.microsoft.com/office/drawing/2014/main" id="{3DED1B74-8AC3-8578-AD9D-8FAF4AC1119E}"/>
+          <p:cNvPr id="5" name="Marcador de texto 4">
+            <a:extLst>
+              <a:ext uri="{FF2B5EF4-FFF2-40B4-BE49-F238E27FC236}">
+                <a16:creationId xmlns:a16="http://schemas.microsoft.com/office/drawing/2014/main" id="{3EB77AF7-EC79-DDD3-20C7-B91CE1951B41}"/>
               </a:ext>
             </a:extLst>
           </p:cNvPr>
@@ -1750,18 +1737,18 @@
           <a:p>
             <a:pPr lvl="0"/>
             <a:r>
-              <a:rPr lang="en-US"/>
-              <a:t>Click to edit Master text styles</a:t>
+              <a:rPr lang="es-ES"/>
+              <a:t>Haga clic para modificar los estilos de texto del patrón</a:t>
             </a:r>
           </a:p>
         </p:txBody>
       </p:sp>
       <p:sp>
         <p:nvSpPr>
-          <p:cNvPr id="6" name="Content Placeholder 5">
-            <a:extLst>
-              <a:ext uri="{FF2B5EF4-FFF2-40B4-BE49-F238E27FC236}">
-                <a16:creationId xmlns:a16="http://schemas.microsoft.com/office/drawing/2014/main" id="{96D88C82-9803-F33A-2B5B-25EF3B4A6A14}"/>
+          <p:cNvPr id="6" name="Marcador de contenido 5">
+            <a:extLst>
+              <a:ext uri="{FF2B5EF4-FFF2-40B4-BE49-F238E27FC236}">
+                <a16:creationId xmlns:a16="http://schemas.microsoft.com/office/drawing/2014/main" id="{31FBD4E5-66CE-7975-DCAA-42E886434B1A}"/>
               </a:ext>
             </a:extLst>
           </p:cNvPr>
@@ -1784,47 +1771,46 @@
           <a:p>
             <a:pPr lvl="0"/>
             <a:r>
-              <a:rPr lang="en-US"/>
-              <a:t>Click to edit Master text styles</a:t>
+              <a:rPr lang="es-ES"/>
+              <a:t>Haga clic para modificar los estilos de texto del patrón</a:t>
             </a:r>
           </a:p>
           <a:p>
             <a:pPr lvl="1"/>
             <a:r>
-              <a:rPr lang="en-US"/>
-              <a:t>Second level</a:t>
+              <a:rPr lang="es-ES"/>
+              <a:t>Segundo nivel</a:t>
             </a:r>
           </a:p>
           <a:p>
             <a:pPr lvl="2"/>
             <a:r>
-              <a:rPr lang="en-US"/>
-              <a:t>Third level</a:t>
+              <a:rPr lang="es-ES"/>
+              <a:t>Tercer nivel</a:t>
             </a:r>
           </a:p>
           <a:p>
             <a:pPr lvl="3"/>
             <a:r>
-              <a:rPr lang="en-US"/>
-              <a:t>Fourth level</a:t>
+              <a:rPr lang="es-ES"/>
+              <a:t>Cuarto nivel</a:t>
             </a:r>
           </a:p>
           <a:p>
             <a:pPr lvl="4"/>
             <a:r>
-              <a:rPr lang="en-US"/>
-              <a:t>Fifth level</a:t>
-            </a:r>
-            <a:endParaRPr lang="es-ES"/>
+              <a:rPr lang="es-ES"/>
+              <a:t>Quinto nivel</a:t>
+            </a:r>
           </a:p>
         </p:txBody>
       </p:sp>
       <p:sp>
         <p:nvSpPr>
-          <p:cNvPr id="7" name="Date Placeholder 6">
-            <a:extLst>
-              <a:ext uri="{FF2B5EF4-FFF2-40B4-BE49-F238E27FC236}">
-                <a16:creationId xmlns:a16="http://schemas.microsoft.com/office/drawing/2014/main" id="{E5241F04-9E20-CB14-7C96-2A75547070B7}"/>
+          <p:cNvPr id="7" name="Marcador de fecha 6">
+            <a:extLst>
+              <a:ext uri="{FF2B5EF4-FFF2-40B4-BE49-F238E27FC236}">
+                <a16:creationId xmlns:a16="http://schemas.microsoft.com/office/drawing/2014/main" id="{77BCF261-E70A-EAA1-57AB-81295112EEF6}"/>
               </a:ext>
             </a:extLst>
           </p:cNvPr>
@@ -1842,7 +1828,7 @@
           <a:p>
             <a:fld id="{960FEC7B-8241-48EA-A964-895F2288E349}" type="datetimeFigureOut">
               <a:rPr lang="es-ES" smtClean="0"/>
-              <a:t>29/05/2025</a:t>
+              <a:t>02/06/2025</a:t>
             </a:fld>
             <a:endParaRPr lang="es-ES"/>
           </a:p>
@@ -1850,10 +1836,10 @@
       </p:sp>
       <p:sp>
         <p:nvSpPr>
-          <p:cNvPr id="8" name="Footer Placeholder 7">
-            <a:extLst>
-              <a:ext uri="{FF2B5EF4-FFF2-40B4-BE49-F238E27FC236}">
-                <a16:creationId xmlns:a16="http://schemas.microsoft.com/office/drawing/2014/main" id="{02739F0F-B085-0BDA-0840-D67155CE9E78}"/>
+          <p:cNvPr id="8" name="Marcador de pie de página 7">
+            <a:extLst>
+              <a:ext uri="{FF2B5EF4-FFF2-40B4-BE49-F238E27FC236}">
+                <a16:creationId xmlns:a16="http://schemas.microsoft.com/office/drawing/2014/main" id="{FA72CC4F-0699-42FC-00DC-6BB5E1768157}"/>
               </a:ext>
             </a:extLst>
           </p:cNvPr>
@@ -1875,10 +1861,10 @@
       </p:sp>
       <p:sp>
         <p:nvSpPr>
-          <p:cNvPr id="9" name="Slide Number Placeholder 8">
-            <a:extLst>
-              <a:ext uri="{FF2B5EF4-FFF2-40B4-BE49-F238E27FC236}">
-                <a16:creationId xmlns:a16="http://schemas.microsoft.com/office/drawing/2014/main" id="{F77B9033-F681-4C37-2180-509445BA052C}"/>
+          <p:cNvPr id="9" name="Marcador de número de diapositiva 8">
+            <a:extLst>
+              <a:ext uri="{FF2B5EF4-FFF2-40B4-BE49-F238E27FC236}">
+                <a16:creationId xmlns:a16="http://schemas.microsoft.com/office/drawing/2014/main" id="{1D186391-3E00-0C54-BB7A-8A58B3391501}"/>
               </a:ext>
             </a:extLst>
           </p:cNvPr>
@@ -1896,7 +1882,7 @@
           <a:p>
             <a:fld id="{8493A7F7-0FDE-44E2-80F8-D84CC777D99B}" type="slidenum">
               <a:rPr lang="es-ES" smtClean="0"/>
-              <a:t>‹#›</a:t>
+              <a:t>‹Nº›</a:t>
             </a:fld>
             <a:endParaRPr lang="es-ES"/>
           </a:p>
@@ -1905,7 +1891,7 @@
     </p:spTree>
     <p:extLst>
       <p:ext uri="{BB962C8B-B14F-4D97-AF65-F5344CB8AC3E}">
-        <p14:creationId xmlns:p14="http://schemas.microsoft.com/office/powerpoint/2010/main" val="4166558365"/>
+        <p14:creationId xmlns:p14="http://schemas.microsoft.com/office/powerpoint/2010/main" val="3786466524"/>
       </p:ext>
     </p:extLst>
   </p:cSld>
@@ -1917,7 +1903,7 @@
 
 <file path=ppt/slideLayouts/slideLayout6.xml><?xml version="1.0" encoding="utf-8"?>
 <p:sldLayout xmlns:a="http://schemas.openxmlformats.org/drawingml/2006/main" xmlns:r="http://schemas.openxmlformats.org/officeDocument/2006/relationships" xmlns:p="http://schemas.openxmlformats.org/presentationml/2006/main" type="titleOnly" preserve="1">
-  <p:cSld name="Title Only">
+  <p:cSld name="Solo el título">
     <p:spTree>
       <p:nvGrpSpPr>
         <p:cNvPr id="1" name=""/>
@@ -1934,10 +1920,10 @@
       </p:grpSpPr>
       <p:sp>
         <p:nvSpPr>
-          <p:cNvPr id="2" name="Title 1">
-            <a:extLst>
-              <a:ext uri="{FF2B5EF4-FFF2-40B4-BE49-F238E27FC236}">
-                <a16:creationId xmlns:a16="http://schemas.microsoft.com/office/drawing/2014/main" id="{914F1C9E-D32B-3D7F-F4D7-B256F1CD0F4C}"/>
+          <p:cNvPr id="2" name="Título 1">
+            <a:extLst>
+              <a:ext uri="{FF2B5EF4-FFF2-40B4-BE49-F238E27FC236}">
+                <a16:creationId xmlns:a16="http://schemas.microsoft.com/office/drawing/2014/main" id="{4594DF0F-B427-B432-A2E0-4149559C989A}"/>
               </a:ext>
             </a:extLst>
           </p:cNvPr>
@@ -1954,19 +1940,18 @@
           <a:lstStyle/>
           <a:p>
             <a:r>
-              <a:rPr lang="en-US"/>
-              <a:t>Click to edit Master title style</a:t>
-            </a:r>
-            <a:endParaRPr lang="es-ES"/>
+              <a:rPr lang="es-ES"/>
+              <a:t>Haga clic para modificar el estilo de título del patrón</a:t>
+            </a:r>
           </a:p>
         </p:txBody>
       </p:sp>
       <p:sp>
         <p:nvSpPr>
-          <p:cNvPr id="3" name="Date Placeholder 2">
-            <a:extLst>
-              <a:ext uri="{FF2B5EF4-FFF2-40B4-BE49-F238E27FC236}">
-                <a16:creationId xmlns:a16="http://schemas.microsoft.com/office/drawing/2014/main" id="{065A73B6-ED82-F29D-41DC-ABDDF57A4592}"/>
+          <p:cNvPr id="3" name="Marcador de fecha 2">
+            <a:extLst>
+              <a:ext uri="{FF2B5EF4-FFF2-40B4-BE49-F238E27FC236}">
+                <a16:creationId xmlns:a16="http://schemas.microsoft.com/office/drawing/2014/main" id="{4A2166F7-42DD-1996-F764-1B4ADD095D0A}"/>
               </a:ext>
             </a:extLst>
           </p:cNvPr>
@@ -1984,7 +1969,7 @@
           <a:p>
             <a:fld id="{960FEC7B-8241-48EA-A964-895F2288E349}" type="datetimeFigureOut">
               <a:rPr lang="es-ES" smtClean="0"/>
-              <a:t>29/05/2025</a:t>
+              <a:t>02/06/2025</a:t>
             </a:fld>
             <a:endParaRPr lang="es-ES"/>
           </a:p>
@@ -1992,10 +1977,10 @@
       </p:sp>
       <p:sp>
         <p:nvSpPr>
-          <p:cNvPr id="4" name="Footer Placeholder 3">
-            <a:extLst>
-              <a:ext uri="{FF2B5EF4-FFF2-40B4-BE49-F238E27FC236}">
-                <a16:creationId xmlns:a16="http://schemas.microsoft.com/office/drawing/2014/main" id="{6E314897-9866-3B05-5461-876823784614}"/>
+          <p:cNvPr id="4" name="Marcador de pie de página 3">
+            <a:extLst>
+              <a:ext uri="{FF2B5EF4-FFF2-40B4-BE49-F238E27FC236}">
+                <a16:creationId xmlns:a16="http://schemas.microsoft.com/office/drawing/2014/main" id="{F2F02B2C-6E9B-7A39-63F3-F5CD7EA748C3}"/>
               </a:ext>
             </a:extLst>
           </p:cNvPr>
@@ -2017,10 +2002,10 @@
       </p:sp>
       <p:sp>
         <p:nvSpPr>
-          <p:cNvPr id="5" name="Slide Number Placeholder 4">
-            <a:extLst>
-              <a:ext uri="{FF2B5EF4-FFF2-40B4-BE49-F238E27FC236}">
-                <a16:creationId xmlns:a16="http://schemas.microsoft.com/office/drawing/2014/main" id="{59F3A428-02DF-2C0B-EE1A-5E659F2C0CAE}"/>
+          <p:cNvPr id="5" name="Marcador de número de diapositiva 4">
+            <a:extLst>
+              <a:ext uri="{FF2B5EF4-FFF2-40B4-BE49-F238E27FC236}">
+                <a16:creationId xmlns:a16="http://schemas.microsoft.com/office/drawing/2014/main" id="{362B98EA-AAC1-7E5C-A2ED-331B3AA269C8}"/>
               </a:ext>
             </a:extLst>
           </p:cNvPr>
@@ -2038,7 +2023,7 @@
           <a:p>
             <a:fld id="{8493A7F7-0FDE-44E2-80F8-D84CC777D99B}" type="slidenum">
               <a:rPr lang="es-ES" smtClean="0"/>
-              <a:t>‹#›</a:t>
+              <a:t>‹Nº›</a:t>
             </a:fld>
             <a:endParaRPr lang="es-ES"/>
           </a:p>
@@ -2047,7 +2032,7 @@
     </p:spTree>
     <p:extLst>
       <p:ext uri="{BB962C8B-B14F-4D97-AF65-F5344CB8AC3E}">
-        <p14:creationId xmlns:p14="http://schemas.microsoft.com/office/powerpoint/2010/main" val="755069498"/>
+        <p14:creationId xmlns:p14="http://schemas.microsoft.com/office/powerpoint/2010/main" val="552159761"/>
       </p:ext>
     </p:extLst>
   </p:cSld>
@@ -2059,7 +2044,7 @@
 
 <file path=ppt/slideLayouts/slideLayout7.xml><?xml version="1.0" encoding="utf-8"?>
 <p:sldLayout xmlns:a="http://schemas.openxmlformats.org/drawingml/2006/main" xmlns:r="http://schemas.openxmlformats.org/officeDocument/2006/relationships" xmlns:p="http://schemas.openxmlformats.org/presentationml/2006/main" type="blank" preserve="1">
-  <p:cSld name="Blank">
+  <p:cSld name="En blanco">
     <p:spTree>
       <p:nvGrpSpPr>
         <p:cNvPr id="1" name=""/>
@@ -2076,10 +2061,10 @@
       </p:grpSpPr>
       <p:sp>
         <p:nvSpPr>
-          <p:cNvPr id="2" name="Date Placeholder 1">
-            <a:extLst>
-              <a:ext uri="{FF2B5EF4-FFF2-40B4-BE49-F238E27FC236}">
-                <a16:creationId xmlns:a16="http://schemas.microsoft.com/office/drawing/2014/main" id="{F0AF0088-624C-83FC-DB5B-2B00D59E70CC}"/>
+          <p:cNvPr id="2" name="Marcador de fecha 1">
+            <a:extLst>
+              <a:ext uri="{FF2B5EF4-FFF2-40B4-BE49-F238E27FC236}">
+                <a16:creationId xmlns:a16="http://schemas.microsoft.com/office/drawing/2014/main" id="{DD74159F-F237-A57B-C999-E3BA5FF0CB8F}"/>
               </a:ext>
             </a:extLst>
           </p:cNvPr>
@@ -2097,7 +2082,7 @@
           <a:p>
             <a:fld id="{960FEC7B-8241-48EA-A964-895F2288E349}" type="datetimeFigureOut">
               <a:rPr lang="es-ES" smtClean="0"/>
-              <a:t>29/05/2025</a:t>
+              <a:t>02/06/2025</a:t>
             </a:fld>
             <a:endParaRPr lang="es-ES"/>
           </a:p>
@@ -2105,10 +2090,10 @@
       </p:sp>
       <p:sp>
         <p:nvSpPr>
-          <p:cNvPr id="3" name="Footer Placeholder 2">
-            <a:extLst>
-              <a:ext uri="{FF2B5EF4-FFF2-40B4-BE49-F238E27FC236}">
-                <a16:creationId xmlns:a16="http://schemas.microsoft.com/office/drawing/2014/main" id="{6DF80CB0-E5E5-1706-9250-43F32AF14629}"/>
+          <p:cNvPr id="3" name="Marcador de pie de página 2">
+            <a:extLst>
+              <a:ext uri="{FF2B5EF4-FFF2-40B4-BE49-F238E27FC236}">
+                <a16:creationId xmlns:a16="http://schemas.microsoft.com/office/drawing/2014/main" id="{8C69FC40-9ACB-1018-A1DD-B91434A9ACBF}"/>
               </a:ext>
             </a:extLst>
           </p:cNvPr>
@@ -2130,10 +2115,10 @@
       </p:sp>
       <p:sp>
         <p:nvSpPr>
-          <p:cNvPr id="4" name="Slide Number Placeholder 3">
-            <a:extLst>
-              <a:ext uri="{FF2B5EF4-FFF2-40B4-BE49-F238E27FC236}">
-                <a16:creationId xmlns:a16="http://schemas.microsoft.com/office/drawing/2014/main" id="{3BE0D451-C69F-92E2-660A-87EE6E6EFD1C}"/>
+          <p:cNvPr id="4" name="Marcador de número de diapositiva 3">
+            <a:extLst>
+              <a:ext uri="{FF2B5EF4-FFF2-40B4-BE49-F238E27FC236}">
+                <a16:creationId xmlns:a16="http://schemas.microsoft.com/office/drawing/2014/main" id="{9D4CAE71-8CBE-C967-88F8-DDF5E098AE83}"/>
               </a:ext>
             </a:extLst>
           </p:cNvPr>
@@ -2151,7 +2136,7 @@
           <a:p>
             <a:fld id="{8493A7F7-0FDE-44E2-80F8-D84CC777D99B}" type="slidenum">
               <a:rPr lang="es-ES" smtClean="0"/>
-              <a:t>‹#›</a:t>
+              <a:t>‹Nº›</a:t>
             </a:fld>
             <a:endParaRPr lang="es-ES"/>
           </a:p>
@@ -2160,7 +2145,7 @@
     </p:spTree>
     <p:extLst>
       <p:ext uri="{BB962C8B-B14F-4D97-AF65-F5344CB8AC3E}">
-        <p14:creationId xmlns:p14="http://schemas.microsoft.com/office/powerpoint/2010/main" val="2844883774"/>
+        <p14:creationId xmlns:p14="http://schemas.microsoft.com/office/powerpoint/2010/main" val="612231078"/>
       </p:ext>
     </p:extLst>
   </p:cSld>
@@ -2172,7 +2157,7 @@
 
 <file path=ppt/slideLayouts/slideLayout8.xml><?xml version="1.0" encoding="utf-8"?>
 <p:sldLayout xmlns:a="http://schemas.openxmlformats.org/drawingml/2006/main" xmlns:r="http://schemas.openxmlformats.org/officeDocument/2006/relationships" xmlns:p="http://schemas.openxmlformats.org/presentationml/2006/main" type="objTx" preserve="1">
-  <p:cSld name="Content with Caption">
+  <p:cSld name="Contenido con título">
     <p:spTree>
       <p:nvGrpSpPr>
         <p:cNvPr id="1" name=""/>
@@ -2189,10 +2174,10 @@
       </p:grpSpPr>
       <p:sp>
         <p:nvSpPr>
-          <p:cNvPr id="2" name="Title 1">
-            <a:extLst>
-              <a:ext uri="{FF2B5EF4-FFF2-40B4-BE49-F238E27FC236}">
-                <a16:creationId xmlns:a16="http://schemas.microsoft.com/office/drawing/2014/main" id="{62019458-5FBC-E5DD-06FD-8E220CF599B6}"/>
+          <p:cNvPr id="2" name="Título 1">
+            <a:extLst>
+              <a:ext uri="{FF2B5EF4-FFF2-40B4-BE49-F238E27FC236}">
+                <a16:creationId xmlns:a16="http://schemas.microsoft.com/office/drawing/2014/main" id="{FF4EC223-DB68-A653-B2D6-9D84BBE4621F}"/>
               </a:ext>
             </a:extLst>
           </p:cNvPr>
@@ -2218,19 +2203,18 @@
           </a:lstStyle>
           <a:p>
             <a:r>
-              <a:rPr lang="en-US"/>
-              <a:t>Click to edit Master title style</a:t>
-            </a:r>
-            <a:endParaRPr lang="es-ES"/>
+              <a:rPr lang="es-ES"/>
+              <a:t>Haga clic para modificar el estilo de título del patrón</a:t>
+            </a:r>
           </a:p>
         </p:txBody>
       </p:sp>
       <p:sp>
         <p:nvSpPr>
-          <p:cNvPr id="3" name="Content Placeholder 2">
-            <a:extLst>
-              <a:ext uri="{FF2B5EF4-FFF2-40B4-BE49-F238E27FC236}">
-                <a16:creationId xmlns:a16="http://schemas.microsoft.com/office/drawing/2014/main" id="{8BD893BF-6079-EFF1-891A-8015662B9D1A}"/>
+          <p:cNvPr id="3" name="Marcador de contenido 2">
+            <a:extLst>
+              <a:ext uri="{FF2B5EF4-FFF2-40B4-BE49-F238E27FC236}">
+                <a16:creationId xmlns:a16="http://schemas.microsoft.com/office/drawing/2014/main" id="{8C82BE32-5B6F-2CF3-7491-2329EA7C3FB3}"/>
               </a:ext>
             </a:extLst>
           </p:cNvPr>
@@ -2281,47 +2265,46 @@
           <a:p>
             <a:pPr lvl="0"/>
             <a:r>
-              <a:rPr lang="en-US"/>
-              <a:t>Click to edit Master text styles</a:t>
+              <a:rPr lang="es-ES"/>
+              <a:t>Haga clic para modificar los estilos de texto del patrón</a:t>
             </a:r>
           </a:p>
           <a:p>
             <a:pPr lvl="1"/>
             <a:r>
-              <a:rPr lang="en-US"/>
-              <a:t>Second level</a:t>
+              <a:rPr lang="es-ES"/>
+              <a:t>Segundo nivel</a:t>
             </a:r>
           </a:p>
           <a:p>
             <a:pPr lvl="2"/>
             <a:r>
-              <a:rPr lang="en-US"/>
-              <a:t>Third level</a:t>
+              <a:rPr lang="es-ES"/>
+              <a:t>Tercer nivel</a:t>
             </a:r>
           </a:p>
           <a:p>
             <a:pPr lvl="3"/>
             <a:r>
-              <a:rPr lang="en-US"/>
-              <a:t>Fourth level</a:t>
+              <a:rPr lang="es-ES"/>
+              <a:t>Cuarto nivel</a:t>
             </a:r>
           </a:p>
           <a:p>
             <a:pPr lvl="4"/>
             <a:r>
-              <a:rPr lang="en-US"/>
-              <a:t>Fifth level</a:t>
-            </a:r>
-            <a:endParaRPr lang="es-ES"/>
+              <a:rPr lang="es-ES"/>
+              <a:t>Quinto nivel</a:t>
+            </a:r>
           </a:p>
         </p:txBody>
       </p:sp>
       <p:sp>
         <p:nvSpPr>
-          <p:cNvPr id="4" name="Text Placeholder 3">
-            <a:extLst>
-              <a:ext uri="{FF2B5EF4-FFF2-40B4-BE49-F238E27FC236}">
-                <a16:creationId xmlns:a16="http://schemas.microsoft.com/office/drawing/2014/main" id="{723CC0B3-736D-A0EB-D541-50FAE592208B}"/>
+          <p:cNvPr id="4" name="Marcador de texto 3">
+            <a:extLst>
+              <a:ext uri="{FF2B5EF4-FFF2-40B4-BE49-F238E27FC236}">
+                <a16:creationId xmlns:a16="http://schemas.microsoft.com/office/drawing/2014/main" id="{C64D088E-B818-FECF-06DE-5BBEDA0C4395}"/>
               </a:ext>
             </a:extLst>
           </p:cNvPr>
@@ -2381,18 +2364,18 @@
           <a:p>
             <a:pPr lvl="0"/>
             <a:r>
-              <a:rPr lang="en-US"/>
-              <a:t>Click to edit Master text styles</a:t>
+              <a:rPr lang="es-ES"/>
+              <a:t>Haga clic para modificar los estilos de texto del patrón</a:t>
             </a:r>
           </a:p>
         </p:txBody>
       </p:sp>
       <p:sp>
         <p:nvSpPr>
-          <p:cNvPr id="5" name="Date Placeholder 4">
-            <a:extLst>
-              <a:ext uri="{FF2B5EF4-FFF2-40B4-BE49-F238E27FC236}">
-                <a16:creationId xmlns:a16="http://schemas.microsoft.com/office/drawing/2014/main" id="{48CDC620-DA75-A2D2-F44C-694CE9EFE14A}"/>
+          <p:cNvPr id="5" name="Marcador de fecha 4">
+            <a:extLst>
+              <a:ext uri="{FF2B5EF4-FFF2-40B4-BE49-F238E27FC236}">
+                <a16:creationId xmlns:a16="http://schemas.microsoft.com/office/drawing/2014/main" id="{5DE38C28-C5DE-D1B3-6207-AA27A593CE35}"/>
               </a:ext>
             </a:extLst>
           </p:cNvPr>
@@ -2410,7 +2393,7 @@
           <a:p>
             <a:fld id="{960FEC7B-8241-48EA-A964-895F2288E349}" type="datetimeFigureOut">
               <a:rPr lang="es-ES" smtClean="0"/>
-              <a:t>29/05/2025</a:t>
+              <a:t>02/06/2025</a:t>
             </a:fld>
             <a:endParaRPr lang="es-ES"/>
           </a:p>
@@ -2418,10 +2401,10 @@
       </p:sp>
       <p:sp>
         <p:nvSpPr>
-          <p:cNvPr id="6" name="Footer Placeholder 5">
-            <a:extLst>
-              <a:ext uri="{FF2B5EF4-FFF2-40B4-BE49-F238E27FC236}">
-                <a16:creationId xmlns:a16="http://schemas.microsoft.com/office/drawing/2014/main" id="{B36AA7E3-524F-78AF-3DE3-0D7B6EED454F}"/>
+          <p:cNvPr id="6" name="Marcador de pie de página 5">
+            <a:extLst>
+              <a:ext uri="{FF2B5EF4-FFF2-40B4-BE49-F238E27FC236}">
+                <a16:creationId xmlns:a16="http://schemas.microsoft.com/office/drawing/2014/main" id="{490928AD-A668-F754-7A37-877818D03AD9}"/>
               </a:ext>
             </a:extLst>
           </p:cNvPr>
@@ -2443,10 +2426,10 @@
       </p:sp>
       <p:sp>
         <p:nvSpPr>
-          <p:cNvPr id="7" name="Slide Number Placeholder 6">
-            <a:extLst>
-              <a:ext uri="{FF2B5EF4-FFF2-40B4-BE49-F238E27FC236}">
-                <a16:creationId xmlns:a16="http://schemas.microsoft.com/office/drawing/2014/main" id="{0E53A13E-A201-AB62-6428-12505B401696}"/>
+          <p:cNvPr id="7" name="Marcador de número de diapositiva 6">
+            <a:extLst>
+              <a:ext uri="{FF2B5EF4-FFF2-40B4-BE49-F238E27FC236}">
+                <a16:creationId xmlns:a16="http://schemas.microsoft.com/office/drawing/2014/main" id="{2BE98FE4-230E-7F3B-CF1E-1B06B9CFDFE0}"/>
               </a:ext>
             </a:extLst>
           </p:cNvPr>
@@ -2464,7 +2447,7 @@
           <a:p>
             <a:fld id="{8493A7F7-0FDE-44E2-80F8-D84CC777D99B}" type="slidenum">
               <a:rPr lang="es-ES" smtClean="0"/>
-              <a:t>‹#›</a:t>
+              <a:t>‹Nº›</a:t>
             </a:fld>
             <a:endParaRPr lang="es-ES"/>
           </a:p>
@@ -2473,7 +2456,7 @@
     </p:spTree>
     <p:extLst>
       <p:ext uri="{BB962C8B-B14F-4D97-AF65-F5344CB8AC3E}">
-        <p14:creationId xmlns:p14="http://schemas.microsoft.com/office/powerpoint/2010/main" val="62149689"/>
+        <p14:creationId xmlns:p14="http://schemas.microsoft.com/office/powerpoint/2010/main" val="1796765889"/>
       </p:ext>
     </p:extLst>
   </p:cSld>
@@ -2485,7 +2468,7 @@
 
 <file path=ppt/slideLayouts/slideLayout9.xml><?xml version="1.0" encoding="utf-8"?>
 <p:sldLayout xmlns:a="http://schemas.openxmlformats.org/drawingml/2006/main" xmlns:r="http://schemas.openxmlformats.org/officeDocument/2006/relationships" xmlns:p="http://schemas.openxmlformats.org/presentationml/2006/main" type="picTx" preserve="1">
-  <p:cSld name="Picture with Caption">
+  <p:cSld name="Imagen con título">
     <p:spTree>
       <p:nvGrpSpPr>
         <p:cNvPr id="1" name=""/>
@@ -2502,10 +2485,10 @@
       </p:grpSpPr>
       <p:sp>
         <p:nvSpPr>
-          <p:cNvPr id="2" name="Title 1">
-            <a:extLst>
-              <a:ext uri="{FF2B5EF4-FFF2-40B4-BE49-F238E27FC236}">
-                <a16:creationId xmlns:a16="http://schemas.microsoft.com/office/drawing/2014/main" id="{DEF986CA-4F7F-F362-D4FE-E6770DCE1B4C}"/>
+          <p:cNvPr id="2" name="Título 1">
+            <a:extLst>
+              <a:ext uri="{FF2B5EF4-FFF2-40B4-BE49-F238E27FC236}">
+                <a16:creationId xmlns:a16="http://schemas.microsoft.com/office/drawing/2014/main" id="{539455CD-055E-9A85-86FF-19CC854D4DE7}"/>
               </a:ext>
             </a:extLst>
           </p:cNvPr>
@@ -2531,19 +2514,18 @@
           </a:lstStyle>
           <a:p>
             <a:r>
-              <a:rPr lang="en-US"/>
-              <a:t>Click to edit Master title style</a:t>
-            </a:r>
-            <a:endParaRPr lang="es-ES"/>
+              <a:rPr lang="es-ES"/>
+              <a:t>Haga clic para modificar el estilo de título del patrón</a:t>
+            </a:r>
           </a:p>
         </p:txBody>
       </p:sp>
       <p:sp>
         <p:nvSpPr>
-          <p:cNvPr id="3" name="Picture Placeholder 2">
-            <a:extLst>
-              <a:ext uri="{FF2B5EF4-FFF2-40B4-BE49-F238E27FC236}">
-                <a16:creationId xmlns:a16="http://schemas.microsoft.com/office/drawing/2014/main" id="{D47B031A-49BD-0FBA-DC0D-814178B42F9F}"/>
+          <p:cNvPr id="3" name="Marcador de posición de imagen 2">
+            <a:extLst>
+              <a:ext uri="{FF2B5EF4-FFF2-40B4-BE49-F238E27FC236}">
+                <a16:creationId xmlns:a16="http://schemas.microsoft.com/office/drawing/2014/main" id="{97106184-9027-45AF-2097-4E1810FEE024}"/>
               </a:ext>
             </a:extLst>
           </p:cNvPr>
@@ -2607,10 +2589,10 @@
       </p:sp>
       <p:sp>
         <p:nvSpPr>
-          <p:cNvPr id="4" name="Text Placeholder 3">
-            <a:extLst>
-              <a:ext uri="{FF2B5EF4-FFF2-40B4-BE49-F238E27FC236}">
-                <a16:creationId xmlns:a16="http://schemas.microsoft.com/office/drawing/2014/main" id="{98E93C06-E69F-95CF-557A-5573DF376DD4}"/>
+          <p:cNvPr id="4" name="Marcador de texto 3">
+            <a:extLst>
+              <a:ext uri="{FF2B5EF4-FFF2-40B4-BE49-F238E27FC236}">
+                <a16:creationId xmlns:a16="http://schemas.microsoft.com/office/drawing/2014/main" id="{856F6440-9272-6583-1401-4BE761F9F1F4}"/>
               </a:ext>
             </a:extLst>
           </p:cNvPr>
@@ -2670,18 +2652,18 @@
           <a:p>
             <a:pPr lvl="0"/>
             <a:r>
-              <a:rPr lang="en-US"/>
-              <a:t>Click to edit Master text styles</a:t>
+              <a:rPr lang="es-ES"/>
+              <a:t>Haga clic para modificar los estilos de texto del patrón</a:t>
             </a:r>
           </a:p>
         </p:txBody>
       </p:sp>
       <p:sp>
         <p:nvSpPr>
-          <p:cNvPr id="5" name="Date Placeholder 4">
-            <a:extLst>
-              <a:ext uri="{FF2B5EF4-FFF2-40B4-BE49-F238E27FC236}">
-                <a16:creationId xmlns:a16="http://schemas.microsoft.com/office/drawing/2014/main" id="{498D3A74-3D92-D80D-CE4D-7D5DF758AADA}"/>
+          <p:cNvPr id="5" name="Marcador de fecha 4">
+            <a:extLst>
+              <a:ext uri="{FF2B5EF4-FFF2-40B4-BE49-F238E27FC236}">
+                <a16:creationId xmlns:a16="http://schemas.microsoft.com/office/drawing/2014/main" id="{60CE92BF-DDBC-E84E-59E2-09FF60A452B7}"/>
               </a:ext>
             </a:extLst>
           </p:cNvPr>
@@ -2699,7 +2681,7 @@
           <a:p>
             <a:fld id="{960FEC7B-8241-48EA-A964-895F2288E349}" type="datetimeFigureOut">
               <a:rPr lang="es-ES" smtClean="0"/>
-              <a:t>29/05/2025</a:t>
+              <a:t>02/06/2025</a:t>
             </a:fld>
             <a:endParaRPr lang="es-ES"/>
           </a:p>
@@ -2707,10 +2689,10 @@
       </p:sp>
       <p:sp>
         <p:nvSpPr>
-          <p:cNvPr id="6" name="Footer Placeholder 5">
-            <a:extLst>
-              <a:ext uri="{FF2B5EF4-FFF2-40B4-BE49-F238E27FC236}">
-                <a16:creationId xmlns:a16="http://schemas.microsoft.com/office/drawing/2014/main" id="{7A6345A4-7FDC-E70C-BC3C-318A42BA805C}"/>
+          <p:cNvPr id="6" name="Marcador de pie de página 5">
+            <a:extLst>
+              <a:ext uri="{FF2B5EF4-FFF2-40B4-BE49-F238E27FC236}">
+                <a16:creationId xmlns:a16="http://schemas.microsoft.com/office/drawing/2014/main" id="{9CCC8E2E-E0A6-D730-491F-EC037EE43E39}"/>
               </a:ext>
             </a:extLst>
           </p:cNvPr>
@@ -2732,10 +2714,10 @@
       </p:sp>
       <p:sp>
         <p:nvSpPr>
-          <p:cNvPr id="7" name="Slide Number Placeholder 6">
-            <a:extLst>
-              <a:ext uri="{FF2B5EF4-FFF2-40B4-BE49-F238E27FC236}">
-                <a16:creationId xmlns:a16="http://schemas.microsoft.com/office/drawing/2014/main" id="{E142EFFB-D92E-A240-5B5D-A58A68654A47}"/>
+          <p:cNvPr id="7" name="Marcador de número de diapositiva 6">
+            <a:extLst>
+              <a:ext uri="{FF2B5EF4-FFF2-40B4-BE49-F238E27FC236}">
+                <a16:creationId xmlns:a16="http://schemas.microsoft.com/office/drawing/2014/main" id="{F22DE9AD-CBF0-62E1-3FCE-468EB7001E62}"/>
               </a:ext>
             </a:extLst>
           </p:cNvPr>
@@ -2753,7 +2735,7 @@
           <a:p>
             <a:fld id="{8493A7F7-0FDE-44E2-80F8-D84CC777D99B}" type="slidenum">
               <a:rPr lang="es-ES" smtClean="0"/>
-              <a:t>‹#›</a:t>
+              <a:t>‹Nº›</a:t>
             </a:fld>
             <a:endParaRPr lang="es-ES"/>
           </a:p>
@@ -2762,7 +2744,7 @@
     </p:spTree>
     <p:extLst>
       <p:ext uri="{BB962C8B-B14F-4D97-AF65-F5344CB8AC3E}">
-        <p14:creationId xmlns:p14="http://schemas.microsoft.com/office/powerpoint/2010/main" val="2679608344"/>
+        <p14:creationId xmlns:p14="http://schemas.microsoft.com/office/powerpoint/2010/main" val="3126885784"/>
       </p:ext>
     </p:extLst>
   </p:cSld>
@@ -2796,10 +2778,10 @@
       </p:grpSpPr>
       <p:sp>
         <p:nvSpPr>
-          <p:cNvPr id="2" name="Title Placeholder 1">
-            <a:extLst>
-              <a:ext uri="{FF2B5EF4-FFF2-40B4-BE49-F238E27FC236}">
-                <a16:creationId xmlns:a16="http://schemas.microsoft.com/office/drawing/2014/main" id="{CD81D11A-AFAA-EA18-6E90-650BCF6F0025}"/>
+          <p:cNvPr id="2" name="Marcador de título 1">
+            <a:extLst>
+              <a:ext uri="{FF2B5EF4-FFF2-40B4-BE49-F238E27FC236}">
+                <a16:creationId xmlns:a16="http://schemas.microsoft.com/office/drawing/2014/main" id="{532FBB6D-E4AD-06F5-6964-F3EC7FCFE78C}"/>
               </a:ext>
             </a:extLst>
           </p:cNvPr>
@@ -2826,19 +2808,18 @@
           <a:lstStyle/>
           <a:p>
             <a:r>
-              <a:rPr lang="en-US"/>
-              <a:t>Click to edit Master title style</a:t>
-            </a:r>
-            <a:endParaRPr lang="es-ES"/>
+              <a:rPr lang="es-ES"/>
+              <a:t>Haga clic para modificar el estilo de título del patrón</a:t>
+            </a:r>
           </a:p>
         </p:txBody>
       </p:sp>
       <p:sp>
         <p:nvSpPr>
-          <p:cNvPr id="3" name="Text Placeholder 2">
-            <a:extLst>
-              <a:ext uri="{FF2B5EF4-FFF2-40B4-BE49-F238E27FC236}">
-                <a16:creationId xmlns:a16="http://schemas.microsoft.com/office/drawing/2014/main" id="{4E570B77-9046-9C60-33FD-C485267EBA0E}"/>
+          <p:cNvPr id="3" name="Marcador de texto 2">
+            <a:extLst>
+              <a:ext uri="{FF2B5EF4-FFF2-40B4-BE49-F238E27FC236}">
+                <a16:creationId xmlns:a16="http://schemas.microsoft.com/office/drawing/2014/main" id="{0737DA5E-E52D-F622-9127-6522D99884CB}"/>
               </a:ext>
             </a:extLst>
           </p:cNvPr>
@@ -2866,47 +2847,46 @@
           <a:p>
             <a:pPr lvl="0"/>
             <a:r>
-              <a:rPr lang="en-US"/>
-              <a:t>Click to edit Master text styles</a:t>
+              <a:rPr lang="es-ES"/>
+              <a:t>Haga clic para modificar los estilos de texto del patrón</a:t>
             </a:r>
           </a:p>
           <a:p>
             <a:pPr lvl="1"/>
             <a:r>
-              <a:rPr lang="en-US"/>
-              <a:t>Second level</a:t>
+              <a:rPr lang="es-ES"/>
+              <a:t>Segundo nivel</a:t>
             </a:r>
           </a:p>
           <a:p>
             <a:pPr lvl="2"/>
             <a:r>
-              <a:rPr lang="en-US"/>
-              <a:t>Third level</a:t>
+              <a:rPr lang="es-ES"/>
+              <a:t>Tercer nivel</a:t>
             </a:r>
           </a:p>
           <a:p>
             <a:pPr lvl="3"/>
             <a:r>
-              <a:rPr lang="en-US"/>
-              <a:t>Fourth level</a:t>
+              <a:rPr lang="es-ES"/>
+              <a:t>Cuarto nivel</a:t>
             </a:r>
           </a:p>
           <a:p>
             <a:pPr lvl="4"/>
             <a:r>
-              <a:rPr lang="en-US"/>
-              <a:t>Fifth level</a:t>
-            </a:r>
-            <a:endParaRPr lang="es-ES"/>
+              <a:rPr lang="es-ES"/>
+              <a:t>Quinto nivel</a:t>
+            </a:r>
           </a:p>
         </p:txBody>
       </p:sp>
       <p:sp>
         <p:nvSpPr>
-          <p:cNvPr id="4" name="Date Placeholder 3">
-            <a:extLst>
-              <a:ext uri="{FF2B5EF4-FFF2-40B4-BE49-F238E27FC236}">
-                <a16:creationId xmlns:a16="http://schemas.microsoft.com/office/drawing/2014/main" id="{58C2C13D-6F32-6A28-F556-27D593ED3BD2}"/>
+          <p:cNvPr id="4" name="Marcador de fecha 3">
+            <a:extLst>
+              <a:ext uri="{FF2B5EF4-FFF2-40B4-BE49-F238E27FC236}">
+                <a16:creationId xmlns:a16="http://schemas.microsoft.com/office/drawing/2014/main" id="{21C4695F-7F0B-C726-3573-19E00624D93F}"/>
               </a:ext>
             </a:extLst>
           </p:cNvPr>
@@ -2942,7 +2922,7 @@
           <a:p>
             <a:fld id="{960FEC7B-8241-48EA-A964-895F2288E349}" type="datetimeFigureOut">
               <a:rPr lang="es-ES" smtClean="0"/>
-              <a:t>29/05/2025</a:t>
+              <a:t>02/06/2025</a:t>
             </a:fld>
             <a:endParaRPr lang="es-ES"/>
           </a:p>
@@ -2950,10 +2930,10 @@
       </p:sp>
       <p:sp>
         <p:nvSpPr>
-          <p:cNvPr id="5" name="Footer Placeholder 4">
-            <a:extLst>
-              <a:ext uri="{FF2B5EF4-FFF2-40B4-BE49-F238E27FC236}">
-                <a16:creationId xmlns:a16="http://schemas.microsoft.com/office/drawing/2014/main" id="{90FCC1FA-880D-D5BF-34F1-904C4340BCD4}"/>
+          <p:cNvPr id="5" name="Marcador de pie de página 4">
+            <a:extLst>
+              <a:ext uri="{FF2B5EF4-FFF2-40B4-BE49-F238E27FC236}">
+                <a16:creationId xmlns:a16="http://schemas.microsoft.com/office/drawing/2014/main" id="{3755A8D7-BA88-0F0E-A6AD-BEDE58F82036}"/>
               </a:ext>
             </a:extLst>
           </p:cNvPr>
@@ -2993,10 +2973,10 @@
       </p:sp>
       <p:sp>
         <p:nvSpPr>
-          <p:cNvPr id="6" name="Slide Number Placeholder 5">
-            <a:extLst>
-              <a:ext uri="{FF2B5EF4-FFF2-40B4-BE49-F238E27FC236}">
-                <a16:creationId xmlns:a16="http://schemas.microsoft.com/office/drawing/2014/main" id="{3C6F13DA-535E-913F-9564-5C6FED92D0F0}"/>
+          <p:cNvPr id="6" name="Marcador de número de diapositiva 5">
+            <a:extLst>
+              <a:ext uri="{FF2B5EF4-FFF2-40B4-BE49-F238E27FC236}">
+                <a16:creationId xmlns:a16="http://schemas.microsoft.com/office/drawing/2014/main" id="{20E81F0C-64A7-AECC-FEE1-A4D5EE065F11}"/>
               </a:ext>
             </a:extLst>
           </p:cNvPr>
@@ -3032,7 +3012,7 @@
           <a:p>
             <a:fld id="{8493A7F7-0FDE-44E2-80F8-D84CC777D99B}" type="slidenum">
               <a:rPr lang="es-ES" smtClean="0"/>
-              <a:t>‹#›</a:t>
+              <a:t>‹Nº›</a:t>
             </a:fld>
             <a:endParaRPr lang="es-ES"/>
           </a:p>
@@ -3041,23 +3021,23 @@
     </p:spTree>
     <p:extLst>
       <p:ext uri="{BB962C8B-B14F-4D97-AF65-F5344CB8AC3E}">
-        <p14:creationId xmlns:p14="http://schemas.microsoft.com/office/powerpoint/2010/main" val="3856492747"/>
+        <p14:creationId xmlns:p14="http://schemas.microsoft.com/office/powerpoint/2010/main" val="3370520931"/>
       </p:ext>
     </p:extLst>
   </p:cSld>
   <p:clrMap bg1="lt1" tx1="dk1" bg2="lt2" tx2="dk2" accent1="accent1" accent2="accent2" accent3="accent3" accent4="accent4" accent5="accent5" accent6="accent6" hlink="hlink" folHlink="folHlink"/>
   <p:sldLayoutIdLst>
-    <p:sldLayoutId id="2147483649" r:id="rId1"/>
-    <p:sldLayoutId id="2147483650" r:id="rId2"/>
-    <p:sldLayoutId id="2147483651" r:id="rId3"/>
-    <p:sldLayoutId id="2147483652" r:id="rId4"/>
-    <p:sldLayoutId id="2147483653" r:id="rId5"/>
-    <p:sldLayoutId id="2147483654" r:id="rId6"/>
-    <p:sldLayoutId id="2147483655" r:id="rId7"/>
-    <p:sldLayoutId id="2147483656" r:id="rId8"/>
-    <p:sldLayoutId id="2147483657" r:id="rId9"/>
-    <p:sldLayoutId id="2147483658" r:id="rId10"/>
-    <p:sldLayoutId id="2147483659" r:id="rId11"/>
+    <p:sldLayoutId id="2147483727" r:id="rId1"/>
+    <p:sldLayoutId id="2147483728" r:id="rId2"/>
+    <p:sldLayoutId id="2147483729" r:id="rId3"/>
+    <p:sldLayoutId id="2147483730" r:id="rId4"/>
+    <p:sldLayoutId id="2147483731" r:id="rId5"/>
+    <p:sldLayoutId id="2147483732" r:id="rId6"/>
+    <p:sldLayoutId id="2147483733" r:id="rId7"/>
+    <p:sldLayoutId id="2147483734" r:id="rId8"/>
+    <p:sldLayoutId id="2147483735" r:id="rId9"/>
+    <p:sldLayoutId id="2147483736" r:id="rId10"/>
+    <p:sldLayoutId id="2147483737" r:id="rId11"/>
   </p:sldLayoutIdLst>
   <p:txStyles>
     <p:titleStyle>
@@ -3381,7 +3361,7 @@
           <a:lstStyle/>
           <a:p>
             <a:r>
-              <a:rPr lang="ca-ES" noProof="0" dirty="0"/>
+              <a:rPr lang="ca-ES-valencia" noProof="0" dirty="0"/>
               <a:t>Gestió d’una falla</a:t>
             </a:r>
           </a:p>
@@ -3412,37 +3392,29 @@
           <a:p>
             <a:pPr algn="r"/>
             <a:r>
-              <a:rPr lang="ca-ES" noProof="0" dirty="0"/>
+              <a:rPr lang="ca-ES-valencia" noProof="0" dirty="0"/>
               <a:t>Nom: Joel Fuster Bosch</a:t>
             </a:r>
           </a:p>
           <a:p>
             <a:pPr algn="r"/>
             <a:r>
-              <a:rPr lang="ca-ES" noProof="0" dirty="0"/>
-              <a:t>Centre: IES Jaume II EL Just</a:t>
+              <a:rPr lang="ca-ES-valencia" noProof="0" dirty="0"/>
+              <a:t>Centre: IES Jaume II El Just</a:t>
             </a:r>
           </a:p>
           <a:p>
             <a:pPr algn="r"/>
             <a:r>
-              <a:rPr lang="ca-ES" noProof="0" dirty="0"/>
+              <a:rPr lang="ca-ES-valencia" noProof="0" dirty="0"/>
               <a:t>Cicle formatiu: DAM(Desenvolupament d’aplicacions multiplataforma)</a:t>
             </a:r>
           </a:p>
           <a:p>
             <a:pPr algn="r"/>
             <a:r>
-              <a:rPr lang="ca-ES" noProof="0" dirty="0"/>
-              <a:t>Data:</a:t>
-            </a:r>
-            <a:r>
-              <a:rPr lang="ca-ES" dirty="0"/>
-              <a:t>4</a:t>
-            </a:r>
-            <a:r>
-              <a:rPr lang="ca-ES" noProof="0" dirty="0"/>
-              <a:t>/6/2025</a:t>
+              <a:rPr lang="ca-ES-valencia" noProof="0" dirty="0"/>
+              <a:t>Data:4/6/2025</a:t>
             </a:r>
           </a:p>
         </p:txBody>
@@ -3495,11 +3467,13 @@
         </p:nvSpPr>
         <p:spPr/>
         <p:txBody>
-          <a:bodyPr/>
+          <a:bodyPr>
+            <a:normAutofit/>
+          </a:bodyPr>
           <a:lstStyle/>
           <a:p>
             <a:r>
-              <a:rPr lang="ca-ES" noProof="0" dirty="0"/>
+              <a:rPr lang="ca-ES-valencia" noProof="0" dirty="0"/>
               <a:t>Funcionalitat clau (NFC i QR Implementació)</a:t>
             </a:r>
           </a:p>
@@ -4029,10 +4003,10 @@
       </p:grpSpPr>
       <p:sp>
         <p:nvSpPr>
-          <p:cNvPr id="2" name="Title 1">
-            <a:extLst>
-              <a:ext uri="{FF2B5EF4-FFF2-40B4-BE49-F238E27FC236}">
-                <a16:creationId xmlns:a16="http://schemas.microsoft.com/office/drawing/2014/main" id="{794C09E2-7D69-52FB-0999-953955EC03E4}"/>
+          <p:cNvPr id="2" name="Título 1">
+            <a:extLst>
+              <a:ext uri="{FF2B5EF4-FFF2-40B4-BE49-F238E27FC236}">
+                <a16:creationId xmlns:a16="http://schemas.microsoft.com/office/drawing/2014/main" id="{4374ACDD-66CB-4E44-EA2A-296C04234314}"/>
               </a:ext>
             </a:extLst>
           </p:cNvPr>
@@ -4049,100 +4023,51 @@
           <a:lstStyle/>
           <a:p>
             <a:r>
-              <a:rPr lang="ca-ES" noProof="0" dirty="0"/>
-              <a:t>Dificultats i millores futures</a:t>
+              <a:rPr lang="ca-ES-valencia" noProof="0" dirty="0"/>
+              <a:t>Esquema E/R del projecte</a:t>
             </a:r>
           </a:p>
         </p:txBody>
       </p:sp>
-      <p:sp>
-        <p:nvSpPr>
-          <p:cNvPr id="3" name="Content Placeholder 2">
-            <a:extLst>
-              <a:ext uri="{FF2B5EF4-FFF2-40B4-BE49-F238E27FC236}">
-                <a16:creationId xmlns:a16="http://schemas.microsoft.com/office/drawing/2014/main" id="{B57C6B89-36FF-8378-B25D-BB9042B2DD5E}"/>
-              </a:ext>
-            </a:extLst>
-          </p:cNvPr>
-          <p:cNvSpPr>
-            <a:spLocks noGrp="1"/>
-          </p:cNvSpPr>
+      <p:pic>
+        <p:nvPicPr>
+          <p:cNvPr id="5" name="Marcador de contenido 4">
+            <a:extLst>
+              <a:ext uri="{FF2B5EF4-FFF2-40B4-BE49-F238E27FC236}">
+                <a16:creationId xmlns:a16="http://schemas.microsoft.com/office/drawing/2014/main" id="{34AC9429-56B7-0AD0-6D2D-137DEA79B5F6}"/>
+              </a:ext>
+            </a:extLst>
+          </p:cNvPr>
+          <p:cNvPicPr>
+            <a:picLocks noGrp="1" noChangeAspect="1"/>
+          </p:cNvPicPr>
           <p:nvPr>
             <p:ph idx="1"/>
           </p:nvPr>
-        </p:nvSpPr>
-        <p:spPr/>
-        <p:txBody>
-          <a:bodyPr/>
-          <a:lstStyle/>
-          <a:p>
-            <a:r>
-              <a:rPr lang="ca-ES" noProof="0" dirty="0"/>
-              <a:t>Dificultats:</a:t>
-            </a:r>
-          </a:p>
-          <a:p>
-            <a:pPr marL="0" indent="0">
-              <a:buNone/>
-            </a:pPr>
-            <a:r>
-              <a:rPr lang="ca-ES" noProof="0" dirty="0"/>
-              <a:t>-Adaptar la pantalla del mòbil per a que no es sobreisca </a:t>
-            </a:r>
-            <a:r>
-              <a:rPr lang="ca-ES" dirty="0"/>
-              <a:t>en</a:t>
-            </a:r>
-            <a:r>
-              <a:rPr lang="ca-ES" noProof="0" dirty="0"/>
-              <a:t> horizontal.</a:t>
-            </a:r>
-          </a:p>
-          <a:p>
-            <a:r>
-              <a:rPr lang="ca-ES" noProof="0" dirty="0"/>
-              <a:t>Que he aprés:</a:t>
-            </a:r>
-          </a:p>
-          <a:p>
-            <a:pPr marL="0" indent="0">
-              <a:buNone/>
-            </a:pPr>
-            <a:r>
-              <a:rPr lang="ca-ES" noProof="0" dirty="0"/>
-              <a:t>-Que és la tecnologia nfc i per a que serveix.</a:t>
-            </a:r>
-          </a:p>
-          <a:p>
-            <a:r>
-              <a:rPr lang="ca-ES" noProof="0" dirty="0"/>
-              <a:t>Millores futures:</a:t>
-            </a:r>
-          </a:p>
-          <a:p>
-            <a:pPr marL="0" indent="0">
-              <a:buNone/>
-            </a:pPr>
-            <a:r>
-              <a:rPr lang="ca-ES" noProof="0" dirty="0"/>
-              <a:t>-Passar del servidor de Node a Odoo mitjançant jsonrpc.</a:t>
-            </a:r>
-          </a:p>
-          <a:p>
-            <a:pPr marL="0" indent="0">
-              <a:buNone/>
-            </a:pPr>
-            <a:r>
-              <a:rPr lang="ca-ES" noProof="0" dirty="0"/>
-              <a:t>-Compatibilitat en iOS.</a:t>
-            </a:r>
-          </a:p>
-        </p:txBody>
-      </p:sp>
+        </p:nvPicPr>
+        <p:blipFill>
+          <a:blip r:embed="rId2">
+            <a:extLst>
+              <a:ext uri="{28A0092B-C50C-407E-A947-70E740481C1C}">
+                <a14:useLocalDpi xmlns:a14="http://schemas.microsoft.com/office/drawing/2010/main" val="0"/>
+              </a:ext>
+            </a:extLst>
+          </a:blip>
+          <a:stretch>
+            <a:fillRect/>
+          </a:stretch>
+        </p:blipFill>
+        <p:spPr>
+          <a:xfrm>
+            <a:off x="838200" y="1975851"/>
+            <a:ext cx="10515600" cy="4050886"/>
+          </a:xfrm>
+        </p:spPr>
+      </p:pic>
     </p:spTree>
     <p:extLst>
       <p:ext uri="{BB962C8B-B14F-4D97-AF65-F5344CB8AC3E}">
-        <p14:creationId xmlns:p14="http://schemas.microsoft.com/office/powerpoint/2010/main" val="1908790075"/>
+        <p14:creationId xmlns:p14="http://schemas.microsoft.com/office/powerpoint/2010/main" val="523091075"/>
       </p:ext>
     </p:extLst>
   </p:cSld>
@@ -4174,7 +4099,7 @@
           <p:cNvPr id="2" name="Title 1">
             <a:extLst>
               <a:ext uri="{FF2B5EF4-FFF2-40B4-BE49-F238E27FC236}">
-                <a16:creationId xmlns:a16="http://schemas.microsoft.com/office/drawing/2014/main" id="{EE19D80B-A0E0-0513-1959-208435FDE9F2}"/>
+                <a16:creationId xmlns:a16="http://schemas.microsoft.com/office/drawing/2014/main" id="{794C09E2-7D69-52FB-0999-953955EC03E4}"/>
               </a:ext>
             </a:extLst>
           </p:cNvPr>
@@ -4191,8 +4116,8 @@
           <a:lstStyle/>
           <a:p>
             <a:r>
-              <a:rPr lang="ca-ES" noProof="0" dirty="0"/>
-              <a:t>Annex</a:t>
+              <a:rPr lang="ca-ES-valencia" noProof="0" dirty="0"/>
+              <a:t>Dificultats i millores futures</a:t>
             </a:r>
           </a:p>
         </p:txBody>
@@ -4202,7 +4127,7 @@
           <p:cNvPr id="3" name="Content Placeholder 2">
             <a:extLst>
               <a:ext uri="{FF2B5EF4-FFF2-40B4-BE49-F238E27FC236}">
-                <a16:creationId xmlns:a16="http://schemas.microsoft.com/office/drawing/2014/main" id="{598E38F8-92F0-A36E-D62B-11729FA6363D}"/>
+                <a16:creationId xmlns:a16="http://schemas.microsoft.com/office/drawing/2014/main" id="{B57C6B89-36FF-8378-B25D-BB9042B2DD5E}"/>
               </a:ext>
             </a:extLst>
           </p:cNvPr>
@@ -4215,30 +4140,110 @@
         </p:nvSpPr>
         <p:spPr/>
         <p:txBody>
-          <a:bodyPr/>
+          <a:bodyPr>
+            <a:normAutofit/>
+          </a:bodyPr>
           <a:lstStyle/>
           <a:p>
             <a:r>
-              <a:rPr lang="ca-ES" noProof="0" dirty="0"/>
-              <a:t>El repositori del projecte en Github: </a:t>
-            </a:r>
-            <a:r>
-              <a:rPr lang="ca-ES" sz="2000" noProof="0" dirty="0">
-                <a:hlinkClick r:id="rId2"/>
-              </a:rPr>
-              <a:t>https://github.com/JoelFusterBosch/Projecte_Final_DAM_Gestio-_d_una_falla</a:t>
-            </a:r>
-            <a:endParaRPr lang="ca-ES" sz="2000" noProof="0" dirty="0"/>
-          </a:p>
-          <a:p>
-            <a:endParaRPr lang="ca-ES" noProof="0" dirty="0"/>
+              <a:rPr lang="ca-ES-valencia" noProof="0" dirty="0"/>
+              <a:t>Dificultats:</a:t>
+            </a:r>
+          </a:p>
+          <a:p>
+            <a:pPr marL="0" indent="0">
+              <a:buNone/>
+            </a:pPr>
+            <a:r>
+              <a:rPr lang="ca-ES-valencia" noProof="0" dirty="0"/>
+              <a:t>-Adaptar la pantalla del mòbil per a que no es </a:t>
+            </a:r>
+            <a:r>
+              <a:rPr lang="ca-ES-valencia" noProof="0" dirty="0" err="1"/>
+              <a:t>sobreisca</a:t>
+            </a:r>
+            <a:r>
+              <a:rPr lang="ca-ES-valencia" noProof="0" dirty="0"/>
+              <a:t> en </a:t>
+            </a:r>
+            <a:r>
+              <a:rPr lang="ca-ES-valencia" noProof="0" dirty="0" err="1"/>
+              <a:t>horizontal</a:t>
+            </a:r>
+            <a:r>
+              <a:rPr lang="ca-ES-valencia" noProof="0" dirty="0"/>
+              <a:t>.</a:t>
+            </a:r>
+          </a:p>
+          <a:p>
+            <a:r>
+              <a:rPr lang="ca-ES-valencia" noProof="0" dirty="0"/>
+              <a:t>Que he aprés:</a:t>
+            </a:r>
+          </a:p>
+          <a:p>
+            <a:pPr marL="0" indent="0">
+              <a:buNone/>
+            </a:pPr>
+            <a:r>
+              <a:rPr lang="ca-ES-valencia" noProof="0" dirty="0"/>
+              <a:t>-Que és la tecnologia </a:t>
+            </a:r>
+            <a:r>
+              <a:rPr lang="ca-ES-valencia" noProof="0" dirty="0" err="1"/>
+              <a:t>nfc</a:t>
+            </a:r>
+            <a:r>
+              <a:rPr lang="ca-ES-valencia" noProof="0" dirty="0"/>
+              <a:t> i per a que serveix.</a:t>
+            </a:r>
+          </a:p>
+          <a:p>
+            <a:r>
+              <a:rPr lang="ca-ES-valencia" noProof="0" dirty="0"/>
+              <a:t>Millores futures:</a:t>
+            </a:r>
+          </a:p>
+          <a:p>
+            <a:pPr marL="0" indent="0">
+              <a:buNone/>
+            </a:pPr>
+            <a:r>
+              <a:rPr lang="ca-ES-valencia" noProof="0" dirty="0"/>
+              <a:t>-Passar del servidor de Node a </a:t>
+            </a:r>
+            <a:r>
+              <a:rPr lang="ca-ES-valencia" noProof="0" dirty="0" err="1"/>
+              <a:t>Odoo</a:t>
+            </a:r>
+            <a:r>
+              <a:rPr lang="ca-ES-valencia" noProof="0" dirty="0"/>
+              <a:t> mitjançant </a:t>
+            </a:r>
+            <a:r>
+              <a:rPr lang="ca-ES-valencia" noProof="0" dirty="0" err="1"/>
+              <a:t>jsonrpc</a:t>
+            </a:r>
+            <a:r>
+              <a:rPr lang="ca-ES-valencia" noProof="0" dirty="0"/>
+              <a:t>.</a:t>
+            </a:r>
+          </a:p>
+          <a:p>
+            <a:pPr marL="0" indent="0">
+              <a:buNone/>
+            </a:pPr>
+            <a:r>
+              <a:rPr lang="ca-ES-valencia" noProof="0" dirty="0"/>
+              <a:t>-Compatibilitat en iOS.</a:t>
+            </a:r>
           </a:p>
         </p:txBody>
       </p:sp>
     </p:spTree>
     <p:extLst>
       <p:ext uri="{BB962C8B-B14F-4D97-AF65-F5344CB8AC3E}">
-        <p14:creationId xmlns:p14="http://schemas.microsoft.com/office/powerpoint/2010/main" val="1584943363"/>
+        <p14:creationId xmlns:p14="http://schemas.microsoft.com/office/powerpoint/2010/main" val="1908790075"/>
       </p:ext>
     </p:extLst>
   </p:cSld>
@@ -4270,7 +4275,7 @@
           <p:cNvPr id="2" name="Title 1">
             <a:extLst>
               <a:ext uri="{FF2B5EF4-FFF2-40B4-BE49-F238E27FC236}">
-                <a16:creationId xmlns:a16="http://schemas.microsoft.com/office/drawing/2014/main" id="{65CF10F9-5A3A-8BDD-0C8F-C53C3C7DFF1C}"/>
+                <a16:creationId xmlns:a16="http://schemas.microsoft.com/office/drawing/2014/main" id="{EE19D80B-A0E0-0513-1959-208435FDE9F2}"/>
               </a:ext>
             </a:extLst>
           </p:cNvPr>
@@ -4286,9 +4291,121 @@
           <a:bodyPr/>
           <a:lstStyle/>
           <a:p>
+            <a:r>
+              <a:rPr lang="ca-ES-valencia" noProof="0" dirty="0"/>
+              <a:t>Annex</a:t>
+            </a:r>
+          </a:p>
+        </p:txBody>
+      </p:sp>
+      <p:sp>
+        <p:nvSpPr>
+          <p:cNvPr id="3" name="Content Placeholder 2">
+            <a:extLst>
+              <a:ext uri="{FF2B5EF4-FFF2-40B4-BE49-F238E27FC236}">
+                <a16:creationId xmlns:a16="http://schemas.microsoft.com/office/drawing/2014/main" id="{598E38F8-92F0-A36E-D62B-11729FA6363D}"/>
+              </a:ext>
+            </a:extLst>
+          </p:cNvPr>
+          <p:cNvSpPr>
+            <a:spLocks noGrp="1"/>
+          </p:cNvSpPr>
+          <p:nvPr>
+            <p:ph idx="1"/>
+          </p:nvPr>
+        </p:nvSpPr>
+        <p:spPr/>
+        <p:txBody>
+          <a:bodyPr/>
+          <a:lstStyle/>
+          <a:p>
+            <a:r>
+              <a:rPr lang="ca-ES-valencia" noProof="0" dirty="0"/>
+              <a:t>El </a:t>
+            </a:r>
+            <a:r>
+              <a:rPr lang="ca-ES-valencia" noProof="0" dirty="0" err="1"/>
+              <a:t>repositori</a:t>
+            </a:r>
+            <a:r>
+              <a:rPr lang="ca-ES-valencia" noProof="0" dirty="0"/>
+              <a:t> del projecte en </a:t>
+            </a:r>
+            <a:r>
+              <a:rPr lang="ca-ES-valencia" noProof="0" dirty="0" err="1"/>
+              <a:t>Github</a:t>
+            </a:r>
+            <a:r>
+              <a:rPr lang="ca-ES-valencia" noProof="0" dirty="0"/>
+              <a:t>: </a:t>
+            </a:r>
+            <a:r>
+              <a:rPr lang="ca-ES-valencia" sz="2000" noProof="0" dirty="0">
+                <a:hlinkClick r:id="rId2"/>
+              </a:rPr>
+              <a:t>https://github.com/JoelFusterBosch/Projecte_Final_DAM_Gestio-_d_una_falla</a:t>
+            </a:r>
+            <a:endParaRPr lang="ca-ES-valencia" sz="2000" noProof="0" dirty="0"/>
+          </a:p>
+          <a:p>
+            <a:endParaRPr lang="ca-ES-valencia" noProof="0" dirty="0"/>
+          </a:p>
+        </p:txBody>
+      </p:sp>
+    </p:spTree>
+    <p:extLst>
+      <p:ext uri="{BB962C8B-B14F-4D97-AF65-F5344CB8AC3E}">
+        <p14:creationId xmlns:p14="http://schemas.microsoft.com/office/powerpoint/2010/main" val="1584943363"/>
+      </p:ext>
+    </p:extLst>
+  </p:cSld>
+  <p:clrMapOvr>
+    <a:masterClrMapping/>
+  </p:clrMapOvr>
+</p:sld>
+</file>
+
+<file path=ppt/slides/slide14.xml><?xml version="1.0" encoding="utf-8"?>
+<p:sld xmlns:a="http://schemas.openxmlformats.org/drawingml/2006/main" xmlns:r="http://schemas.openxmlformats.org/officeDocument/2006/relationships" xmlns:p="http://schemas.openxmlformats.org/presentationml/2006/main">
+  <p:cSld>
+    <p:spTree>
+      <p:nvGrpSpPr>
+        <p:cNvPr id="1" name=""/>
+        <p:cNvGrpSpPr/>
+        <p:nvPr/>
+      </p:nvGrpSpPr>
+      <p:grpSpPr>
+        <a:xfrm>
+          <a:off x="0" y="0"/>
+          <a:ext cx="0" cy="0"/>
+          <a:chOff x="0" y="0"/>
+          <a:chExt cx="0" cy="0"/>
+        </a:xfrm>
+      </p:grpSpPr>
+      <p:sp>
+        <p:nvSpPr>
+          <p:cNvPr id="2" name="Title 1">
+            <a:extLst>
+              <a:ext uri="{FF2B5EF4-FFF2-40B4-BE49-F238E27FC236}">
+                <a16:creationId xmlns:a16="http://schemas.microsoft.com/office/drawing/2014/main" id="{65CF10F9-5A3A-8BDD-0C8F-C53C3C7DFF1C}"/>
+              </a:ext>
+            </a:extLst>
+          </p:cNvPr>
+          <p:cNvSpPr>
+            <a:spLocks noGrp="1"/>
+          </p:cNvSpPr>
+          <p:nvPr>
+            <p:ph type="title"/>
+          </p:nvPr>
+        </p:nvSpPr>
+        <p:spPr/>
+        <p:txBody>
+          <a:bodyPr/>
+          <a:lstStyle/>
+          <a:p>
             <a:pPr algn="ctr"/>
             <a:r>
-              <a:rPr lang="ca-ES" noProof="0" dirty="0"/>
+              <a:rPr lang="ca-ES-valencia" noProof="0" dirty="0"/>
               <a:t>Preguntes?</a:t>
             </a:r>
           </a:p>
@@ -4381,7 +4498,7 @@
           <a:lstStyle/>
           <a:p>
             <a:r>
-              <a:rPr lang="ca-ES" noProof="0" dirty="0"/>
+              <a:rPr lang="ca-ES-valencia" noProof="0" dirty="0"/>
               <a:t>Tecnologies utilitzades</a:t>
             </a:r>
           </a:p>
@@ -4522,7 +4639,7 @@
         </p:blipFill>
         <p:spPr>
           <a:xfrm>
-            <a:off x="1829107" y="3932312"/>
+            <a:off x="842731" y="3932313"/>
             <a:ext cx="2143125" cy="2143125"/>
           </a:xfrm>
           <a:prstGeom prst="rect">
@@ -4558,7 +4675,7 @@
         </p:blipFill>
         <p:spPr>
           <a:xfrm>
-            <a:off x="7341931" y="3932313"/>
+            <a:off x="6207995" y="3932313"/>
             <a:ext cx="2143125" cy="2143125"/>
           </a:xfrm>
           <a:prstGeom prst="rect">
@@ -4594,8 +4711,44 @@
         </p:blipFill>
         <p:spPr>
           <a:xfrm>
-            <a:off x="4142606" y="4246636"/>
+            <a:off x="2900670" y="4246637"/>
             <a:ext cx="3028950" cy="1514475"/>
+          </a:xfrm>
+          <a:prstGeom prst="rect">
+            <a:avLst/>
+          </a:prstGeom>
+        </p:spPr>
+      </p:pic>
+      <p:pic>
+        <p:nvPicPr>
+          <p:cNvPr id="6" name="Imagen 5">
+            <a:extLst>
+              <a:ext uri="{FF2B5EF4-FFF2-40B4-BE49-F238E27FC236}">
+                <a16:creationId xmlns:a16="http://schemas.microsoft.com/office/drawing/2014/main" id="{5A2D59EF-F613-16DE-3DAE-2A18E55DAA31}"/>
+              </a:ext>
+            </a:extLst>
+          </p:cNvPr>
+          <p:cNvPicPr>
+            <a:picLocks noChangeAspect="1"/>
+          </p:cNvPicPr>
+          <p:nvPr/>
+        </p:nvPicPr>
+        <p:blipFill>
+          <a:blip r:embed="rId8">
+            <a:extLst>
+              <a:ext uri="{28A0092B-C50C-407E-A947-70E740481C1C}">
+                <a14:useLocalDpi xmlns:a14="http://schemas.microsoft.com/office/drawing/2010/main" val="0"/>
+              </a:ext>
+            </a:extLst>
+          </a:blip>
+          <a:stretch>
+            <a:fillRect/>
+          </a:stretch>
+        </p:blipFill>
+        <p:spPr>
+          <a:xfrm>
+            <a:off x="8629495" y="4411328"/>
+            <a:ext cx="3162300" cy="1447800"/>
           </a:xfrm>
           <a:prstGeom prst="rect">
             <a:avLst/>
@@ -5399,6 +5552,105 @@
                                         <p:cTn id="54" dur="500"/>
                                         <p:tgtEl>
                                           <p:spTgt spid="13"/>
+                                        </p:tgtEl>
+                                      </p:cBhvr>
+                                    </p:animEffect>
+                                  </p:childTnLst>
+                                </p:cTn>
+                              </p:par>
+                            </p:childTnLst>
+                          </p:cTn>
+                        </p:par>
+                      </p:childTnLst>
+                    </p:cTn>
+                  </p:par>
+                  <p:par>
+                    <p:cTn id="55" fill="hold">
+                      <p:stCondLst>
+                        <p:cond delay="indefinite"/>
+                      </p:stCondLst>
+                      <p:childTnLst>
+                        <p:par>
+                          <p:cTn id="56" fill="hold">
+                            <p:stCondLst>
+                              <p:cond delay="0"/>
+                            </p:stCondLst>
+                            <p:childTnLst>
+                              <p:par>
+                                <p:cTn id="57" presetID="53" presetClass="entr" presetSubtype="16" fill="hold" nodeType="clickEffect">
+                                  <p:stCondLst>
+                                    <p:cond delay="0"/>
+                                  </p:stCondLst>
+                                  <p:childTnLst>
+                                    <p:set>
+                                      <p:cBhvr>
+                                        <p:cTn id="58" dur="1" fill="hold">
+                                          <p:stCondLst>
+                                            <p:cond delay="0"/>
+                                          </p:stCondLst>
+                                        </p:cTn>
+                                        <p:tgtEl>
+                                          <p:spTgt spid="6"/>
+                                        </p:tgtEl>
+                                        <p:attrNameLst>
+                                          <p:attrName>style.visibility</p:attrName>
+                                        </p:attrNameLst>
+                                      </p:cBhvr>
+                                      <p:to>
+                                        <p:strVal val="visible"/>
+                                      </p:to>
+                                    </p:set>
+                                    <p:anim calcmode="lin" valueType="num">
+                                      <p:cBhvr>
+                                        <p:cTn id="59" dur="500" fill="hold"/>
+                                        <p:tgtEl>
+                                          <p:spTgt spid="6"/>
+                                        </p:tgtEl>
+                                        <p:attrNameLst>
+                                          <p:attrName>ppt_w</p:attrName>
+                                        </p:attrNameLst>
+                                      </p:cBhvr>
+                                      <p:tavLst>
+                                        <p:tav tm="0">
+                                          <p:val>
+                                            <p:fltVal val="0"/>
+                                          </p:val>
+                                        </p:tav>
+                                        <p:tav tm="100000">
+                                          <p:val>
+                                            <p:strVal val="#ppt_w"/>
+                                          </p:val>
+                                        </p:tav>
+                                      </p:tavLst>
+                                    </p:anim>
+                                    <p:anim calcmode="lin" valueType="num">
+                                      <p:cBhvr>
+                                        <p:cTn id="60" dur="500" fill="hold"/>
+                                        <p:tgtEl>
+                                          <p:spTgt spid="6"/>
+                                        </p:tgtEl>
+                                        <p:attrNameLst>
+                                          <p:attrName>ppt_h</p:attrName>
+                                        </p:attrNameLst>
+                                      </p:cBhvr>
+                                      <p:tavLst>
+                                        <p:tav tm="0">
+                                          <p:val>
+                                            <p:fltVal val="0"/>
+                                          </p:val>
+                                        </p:tav>
+                                        <p:tav tm="100000">
+                                          <p:val>
+                                            <p:strVal val="#ppt_h"/>
+                                          </p:val>
+                                        </p:tav>
+                                      </p:tavLst>
+                                    </p:anim>
+                                    <p:animEffect transition="in" filter="fade">
+                                      <p:cBhvr>
+                                        <p:cTn id="61" dur="500"/>
+                                        <p:tgtEl>
+                                          <p:spTgt spid="6"/>
                                         </p:tgtEl>
                                       </p:cBhvr>
                                     </p:animEffect>
@@ -5469,13 +5721,20 @@
             <p:ph type="title"/>
           </p:nvPr>
         </p:nvSpPr>
-        <p:spPr/>
+        <p:spPr>
+          <a:xfrm>
+            <a:off x="838199" y="148816"/>
+            <a:ext cx="10515600" cy="1325563"/>
+          </a:xfrm>
+        </p:spPr>
         <p:txBody>
-          <a:bodyPr/>
+          <a:bodyPr>
+            <a:normAutofit/>
+          </a:bodyPr>
           <a:lstStyle/>
           <a:p>
             <a:r>
-              <a:rPr lang="ca-ES" noProof="0" dirty="0"/>
+              <a:rPr lang="ca-ES-valencia" sz="3600" noProof="0" dirty="0"/>
               <a:t>Disseny de l’arquitectura (Prototip de baixa fidelitat)</a:t>
             </a:r>
           </a:p>
@@ -5511,8 +5770,8 @@
         </p:blipFill>
         <p:spPr>
           <a:xfrm>
-            <a:off x="3046344" y="1690688"/>
-            <a:ext cx="6099311" cy="4574483"/>
+            <a:off x="1662501" y="1138866"/>
+            <a:ext cx="8130428" cy="5570318"/>
           </a:xfrm>
         </p:spPr>
       </p:pic>
@@ -5562,13 +5821,20 @@
             <p:ph type="title"/>
           </p:nvPr>
         </p:nvSpPr>
-        <p:spPr/>
+        <p:spPr>
+          <a:xfrm>
+            <a:off x="1113503" y="99654"/>
+            <a:ext cx="10515600" cy="1325563"/>
+          </a:xfrm>
+        </p:spPr>
         <p:txBody>
-          <a:bodyPr/>
+          <a:bodyPr>
+            <a:normAutofit/>
+          </a:bodyPr>
           <a:lstStyle/>
           <a:p>
             <a:r>
-              <a:rPr lang="ca-ES" noProof="0" dirty="0"/>
+              <a:rPr lang="ca-ES-valencia" sz="4000" noProof="0" dirty="0"/>
               <a:t>Disseny de l’arquitectura (Prototip d’alta fidelitat)</a:t>
             </a:r>
           </a:p>
@@ -5604,8 +5870,8 @@
         </p:blipFill>
         <p:spPr>
           <a:xfrm>
-            <a:off x="3903406" y="1458385"/>
-            <a:ext cx="4385187" cy="5184434"/>
+            <a:off x="2540977" y="1125005"/>
+            <a:ext cx="6757881" cy="5753328"/>
           </a:xfrm>
         </p:spPr>
       </p:pic>
@@ -5661,7 +5927,7 @@
           <a:lstStyle/>
           <a:p>
             <a:r>
-              <a:rPr lang="ca-ES" noProof="0" dirty="0"/>
+              <a:rPr lang="ca-ES-valencia" noProof="0" dirty="0"/>
               <a:t>Arquitectura del projecte</a:t>
             </a:r>
           </a:p>
@@ -5688,7 +5954,7 @@
           <a:bodyPr/>
           <a:lstStyle/>
           <a:p>
-            <a:endParaRPr lang="ca-ES" noProof="0" dirty="0"/>
+            <a:endParaRPr lang="ca-ES-valencia" noProof="0" dirty="0"/>
           </a:p>
         </p:txBody>
       </p:sp>
@@ -5757,7 +6023,7 @@
           <a:lstStyle/>
           <a:p>
             <a:r>
-              <a:rPr lang="ca-ES" noProof="0" dirty="0"/>
+              <a:rPr lang="ca-ES-valencia" noProof="0" dirty="0"/>
               <a:t>Arquitectura CLEAN</a:t>
             </a:r>
           </a:p>
@@ -5815,7 +6081,7 @@
           <a:lstStyle/>
           <a:p>
             <a:r>
-              <a:rPr lang="ca-ES" noProof="0" dirty="0"/>
+              <a:rPr lang="ca-ES-valencia" noProof="0" dirty="0"/>
               <a:t>Funcionalitat clau (Pantalles segons el rol)</a:t>
             </a:r>
           </a:p>
@@ -5957,7 +6223,7 @@
           <a:lstStyle/>
           <a:p>
             <a:r>
-              <a:rPr lang="ca-ES" noProof="0" dirty="0"/>
+              <a:rPr lang="ca-ES-valencia" noProof="0" dirty="0"/>
               <a:t>Cobrador</a:t>
             </a:r>
           </a:p>
@@ -5992,7 +6258,7 @@
           <a:lstStyle/>
           <a:p>
             <a:r>
-              <a:rPr lang="ca-ES" noProof="0" dirty="0"/>
+              <a:rPr lang="ca-ES-valencia" noProof="0" dirty="0"/>
               <a:t>Faller</a:t>
             </a:r>
           </a:p>
@@ -6027,7 +6293,7 @@
           <a:lstStyle/>
           <a:p>
             <a:r>
-              <a:rPr lang="ca-ES" noProof="0" dirty="0"/>
+              <a:rPr lang="ca-ES-valencia" noProof="0" dirty="0"/>
               <a:t>Administrador</a:t>
             </a:r>
           </a:p>
@@ -6563,7 +6829,7 @@
           <a:lstStyle/>
           <a:p>
             <a:r>
-              <a:rPr lang="ca-ES" noProof="0" dirty="0"/>
+              <a:rPr lang="ca-ES-valencia" noProof="0" dirty="0"/>
               <a:t>Funcionalitat clau (Pantalles segons el rol)</a:t>
             </a:r>
           </a:p>
@@ -6650,7 +6916,7 @@
           <a:lstStyle/>
           <a:p>
             <a:r>
-              <a:rPr lang="ca-ES" noProof="0" dirty="0"/>
+              <a:rPr lang="ca-ES-valencia" noProof="0" dirty="0"/>
               <a:t>Funcionalitat clau (NFC Explicació)</a:t>
             </a:r>
           </a:p>
@@ -6720,8 +6986,16 @@
           <a:lstStyle/>
           <a:p>
             <a:r>
-              <a:rPr lang="ca-ES" noProof="0" dirty="0"/>
-              <a:t>NFC(Near-Field-Communication )</a:t>
+              <a:rPr lang="ca-ES-valencia" noProof="0" dirty="0"/>
+              <a:t>NFC(</a:t>
+            </a:r>
+            <a:r>
+              <a:rPr lang="ca-ES-valencia" noProof="0" dirty="0" err="1"/>
+              <a:t>Near-Field-Communication</a:t>
+            </a:r>
+            <a:r>
+              <a:rPr lang="ca-ES-valencia" noProof="0" dirty="0"/>
+              <a:t> )</a:t>
             </a:r>
           </a:p>
         </p:txBody>
@@ -7633,7 +7907,7 @@
           <a:lstStyle/>
           <a:p>
             <a:r>
-              <a:rPr lang="ca-ES" noProof="0" dirty="0"/>
+              <a:rPr lang="ca-ES-valencia" noProof="0" dirty="0"/>
               <a:t>Funcionalitat clau (QR Explicació)</a:t>
             </a:r>
           </a:p>
@@ -7707,12 +7981,20 @@
           <a:lstStyle/>
           <a:p>
             <a:r>
-              <a:rPr lang="ca-ES" noProof="0" dirty="0"/>
-              <a:t>QR(Quick-Response-Code)</a:t>
-            </a:r>
-          </a:p>
-          <a:p>
-            <a:endParaRPr lang="ca-ES" noProof="0" dirty="0"/>
+              <a:rPr lang="ca-ES-valencia" noProof="0" dirty="0"/>
+              <a:t>QR(</a:t>
+            </a:r>
+            <a:r>
+              <a:rPr lang="ca-ES-valencia" noProof="0" dirty="0" err="1"/>
+              <a:t>Quick-Response-Code</a:t>
+            </a:r>
+            <a:r>
+              <a:rPr lang="ca-ES-valencia" noProof="0" dirty="0"/>
+              <a:t>)</a:t>
+            </a:r>
+          </a:p>
+          <a:p>
+            <a:endParaRPr lang="ca-ES-valencia" noProof="0" dirty="0"/>
           </a:p>
         </p:txBody>
       </p:sp>
@@ -8296,7 +8578,7 @@
 </file>
 
 <file path=ppt/theme/theme1.xml><?xml version="1.0" encoding="utf-8"?>
-<a:theme xmlns:a="http://schemas.openxmlformats.org/drawingml/2006/main" name="Office Theme">
+<a:theme xmlns:a="http://schemas.openxmlformats.org/drawingml/2006/main" name="Tema de Office">
   <a:themeElements>
     <a:clrScheme name="Office">
       <a:dk1>

</xml_diff>

<commit_message>
Correció de errors en el frontend i backend i afegit contingut al README del projecte
</commit_message>
<xml_diff>
--- a/Presentació/Gestió d’una falla.pptx
+++ b/Presentació/Gestió d’una falla.pptx
@@ -7,18 +7,15 @@
   <p:sldIdLst>
     <p:sldId id="256" r:id="rId2"/>
     <p:sldId id="257" r:id="rId3"/>
-    <p:sldId id="263" r:id="rId4"/>
-    <p:sldId id="264" r:id="rId5"/>
-    <p:sldId id="260" r:id="rId6"/>
+    <p:sldId id="260" r:id="rId4"/>
+    <p:sldId id="271" r:id="rId5"/>
+    <p:sldId id="272" r:id="rId6"/>
     <p:sldId id="265" r:id="rId7"/>
     <p:sldId id="270" r:id="rId8"/>
-    <p:sldId id="266" r:id="rId9"/>
-    <p:sldId id="269" r:id="rId10"/>
-    <p:sldId id="268" r:id="rId11"/>
-    <p:sldId id="271" r:id="rId12"/>
-    <p:sldId id="262" r:id="rId13"/>
-    <p:sldId id="261" r:id="rId14"/>
-    <p:sldId id="267" r:id="rId15"/>
+    <p:sldId id="268" r:id="rId9"/>
+    <p:sldId id="262" r:id="rId10"/>
+    <p:sldId id="261" r:id="rId11"/>
+    <p:sldId id="267" r:id="rId12"/>
   </p:sldIdLst>
   <p:sldSz cx="12192000" cy="6858000"/>
   <p:notesSz cx="6858000" cy="9144000"/>
@@ -272,7 +269,7 @@
           <a:p>
             <a:fld id="{960FEC7B-8241-48EA-A964-895F2288E349}" type="datetimeFigureOut">
               <a:rPr lang="es-ES" smtClean="0"/>
-              <a:t>02/06/2025</a:t>
+              <a:t>03/06/2025</a:t>
             </a:fld>
             <a:endParaRPr lang="es-ES"/>
           </a:p>
@@ -470,7 +467,7 @@
           <a:p>
             <a:fld id="{960FEC7B-8241-48EA-A964-895F2288E349}" type="datetimeFigureOut">
               <a:rPr lang="es-ES" smtClean="0"/>
-              <a:t>02/06/2025</a:t>
+              <a:t>03/06/2025</a:t>
             </a:fld>
             <a:endParaRPr lang="es-ES"/>
           </a:p>
@@ -678,7 +675,7 @@
           <a:p>
             <a:fld id="{960FEC7B-8241-48EA-A964-895F2288E349}" type="datetimeFigureOut">
               <a:rPr lang="es-ES" smtClean="0"/>
-              <a:t>02/06/2025</a:t>
+              <a:t>03/06/2025</a:t>
             </a:fld>
             <a:endParaRPr lang="es-ES"/>
           </a:p>
@@ -876,7 +873,7 @@
           <a:p>
             <a:fld id="{960FEC7B-8241-48EA-A964-895F2288E349}" type="datetimeFigureOut">
               <a:rPr lang="es-ES" smtClean="0"/>
-              <a:t>02/06/2025</a:t>
+              <a:t>03/06/2025</a:t>
             </a:fld>
             <a:endParaRPr lang="es-ES"/>
           </a:p>
@@ -1151,7 +1148,7 @@
           <a:p>
             <a:fld id="{960FEC7B-8241-48EA-A964-895F2288E349}" type="datetimeFigureOut">
               <a:rPr lang="es-ES" smtClean="0"/>
-              <a:t>02/06/2025</a:t>
+              <a:t>03/06/2025</a:t>
             </a:fld>
             <a:endParaRPr lang="es-ES"/>
           </a:p>
@@ -1416,7 +1413,7 @@
           <a:p>
             <a:fld id="{960FEC7B-8241-48EA-A964-895F2288E349}" type="datetimeFigureOut">
               <a:rPr lang="es-ES" smtClean="0"/>
-              <a:t>02/06/2025</a:t>
+              <a:t>03/06/2025</a:t>
             </a:fld>
             <a:endParaRPr lang="es-ES"/>
           </a:p>
@@ -1828,7 +1825,7 @@
           <a:p>
             <a:fld id="{960FEC7B-8241-48EA-A964-895F2288E349}" type="datetimeFigureOut">
               <a:rPr lang="es-ES" smtClean="0"/>
-              <a:t>02/06/2025</a:t>
+              <a:t>03/06/2025</a:t>
             </a:fld>
             <a:endParaRPr lang="es-ES"/>
           </a:p>
@@ -1969,7 +1966,7 @@
           <a:p>
             <a:fld id="{960FEC7B-8241-48EA-A964-895F2288E349}" type="datetimeFigureOut">
               <a:rPr lang="es-ES" smtClean="0"/>
-              <a:t>02/06/2025</a:t>
+              <a:t>03/06/2025</a:t>
             </a:fld>
             <a:endParaRPr lang="es-ES"/>
           </a:p>
@@ -2082,7 +2079,7 @@
           <a:p>
             <a:fld id="{960FEC7B-8241-48EA-A964-895F2288E349}" type="datetimeFigureOut">
               <a:rPr lang="es-ES" smtClean="0"/>
-              <a:t>02/06/2025</a:t>
+              <a:t>03/06/2025</a:t>
             </a:fld>
             <a:endParaRPr lang="es-ES"/>
           </a:p>
@@ -2393,7 +2390,7 @@
           <a:p>
             <a:fld id="{960FEC7B-8241-48EA-A964-895F2288E349}" type="datetimeFigureOut">
               <a:rPr lang="es-ES" smtClean="0"/>
-              <a:t>02/06/2025</a:t>
+              <a:t>03/06/2025</a:t>
             </a:fld>
             <a:endParaRPr lang="es-ES"/>
           </a:p>
@@ -2681,7 +2678,7 @@
           <a:p>
             <a:fld id="{960FEC7B-8241-48EA-A964-895F2288E349}" type="datetimeFigureOut">
               <a:rPr lang="es-ES" smtClean="0"/>
-              <a:t>02/06/2025</a:t>
+              <a:t>03/06/2025</a:t>
             </a:fld>
             <a:endParaRPr lang="es-ES"/>
           </a:p>
@@ -2922,7 +2919,7 @@
           <a:p>
             <a:fld id="{960FEC7B-8241-48EA-A964-895F2288E349}" type="datetimeFigureOut">
               <a:rPr lang="es-ES" smtClean="0"/>
-              <a:t>02/06/2025</a:t>
+              <a:t>03/06/2025</a:t>
             </a:fld>
             <a:endParaRPr lang="es-ES"/>
           </a:p>
@@ -3454,827 +3451,6 @@
           <p:cNvPr id="2" name="Title 1">
             <a:extLst>
               <a:ext uri="{FF2B5EF4-FFF2-40B4-BE49-F238E27FC236}">
-                <a16:creationId xmlns:a16="http://schemas.microsoft.com/office/drawing/2014/main" id="{391D3189-996E-75E3-D560-865C85474494}"/>
-              </a:ext>
-            </a:extLst>
-          </p:cNvPr>
-          <p:cNvSpPr>
-            <a:spLocks noGrp="1"/>
-          </p:cNvSpPr>
-          <p:nvPr>
-            <p:ph type="title"/>
-          </p:nvPr>
-        </p:nvSpPr>
-        <p:spPr/>
-        <p:txBody>
-          <a:bodyPr>
-            <a:normAutofit/>
-          </a:bodyPr>
-          <a:lstStyle/>
-          <a:p>
-            <a:r>
-              <a:rPr lang="ca-ES-valencia" noProof="0" dirty="0"/>
-              <a:t>Funcionalitat clau (NFC i QR Implementació)</a:t>
-            </a:r>
-          </a:p>
-        </p:txBody>
-      </p:sp>
-      <p:pic>
-        <p:nvPicPr>
-          <p:cNvPr id="6" name="Content Placeholder 5">
-            <a:extLst>
-              <a:ext uri="{FF2B5EF4-FFF2-40B4-BE49-F238E27FC236}">
-                <a16:creationId xmlns:a16="http://schemas.microsoft.com/office/drawing/2014/main" id="{BA2C6015-3E18-D2CE-5B54-3A42A759459C}"/>
-              </a:ext>
-            </a:extLst>
-          </p:cNvPr>
-          <p:cNvPicPr>
-            <a:picLocks noGrp="1" noChangeAspect="1"/>
-          </p:cNvPicPr>
-          <p:nvPr>
-            <p:ph idx="1"/>
-          </p:nvPr>
-        </p:nvPicPr>
-        <p:blipFill>
-          <a:blip r:embed="rId2">
-            <a:extLst>
-              <a:ext uri="{28A0092B-C50C-407E-A947-70E740481C1C}">
-                <a14:useLocalDpi xmlns:a14="http://schemas.microsoft.com/office/drawing/2010/main" val="0"/>
-              </a:ext>
-            </a:extLst>
-          </a:blip>
-          <a:stretch>
-            <a:fillRect/>
-          </a:stretch>
-        </p:blipFill>
-        <p:spPr>
-          <a:xfrm>
-            <a:off x="3603173" y="1825625"/>
-            <a:ext cx="1949943" cy="4351338"/>
-          </a:xfrm>
-        </p:spPr>
-      </p:pic>
-      <p:pic>
-        <p:nvPicPr>
-          <p:cNvPr id="5" name="Content Placeholder 4">
-            <a:extLst>
-              <a:ext uri="{FF2B5EF4-FFF2-40B4-BE49-F238E27FC236}">
-                <a16:creationId xmlns:a16="http://schemas.microsoft.com/office/drawing/2014/main" id="{4D77545C-72F8-AD9D-3CB4-BA89405E48A7}"/>
-              </a:ext>
-            </a:extLst>
-          </p:cNvPr>
-          <p:cNvPicPr>
-            <a:picLocks noChangeAspect="1"/>
-          </p:cNvPicPr>
-          <p:nvPr/>
-        </p:nvPicPr>
-        <p:blipFill>
-          <a:blip r:embed="rId3">
-            <a:extLst>
-              <a:ext uri="{28A0092B-C50C-407E-A947-70E740481C1C}">
-                <a14:useLocalDpi xmlns:a14="http://schemas.microsoft.com/office/drawing/2010/main" val="0"/>
-              </a:ext>
-            </a:extLst>
-          </a:blip>
-          <a:stretch>
-            <a:fillRect/>
-          </a:stretch>
-        </p:blipFill>
-        <p:spPr>
-          <a:xfrm>
-            <a:off x="838200" y="1825625"/>
-            <a:ext cx="1949943" cy="4351338"/>
-          </a:xfrm>
-          <a:prstGeom prst="rect">
-            <a:avLst/>
-          </a:prstGeom>
-        </p:spPr>
-      </p:pic>
-      <p:pic>
-        <p:nvPicPr>
-          <p:cNvPr id="7" name="Picture 6">
-            <a:extLst>
-              <a:ext uri="{FF2B5EF4-FFF2-40B4-BE49-F238E27FC236}">
-                <a16:creationId xmlns:a16="http://schemas.microsoft.com/office/drawing/2014/main" id="{E7C3170E-76B2-5801-6172-22203A74D82E}"/>
-              </a:ext>
-            </a:extLst>
-          </p:cNvPr>
-          <p:cNvPicPr>
-            <a:picLocks noChangeAspect="1"/>
-          </p:cNvPicPr>
-          <p:nvPr/>
-        </p:nvPicPr>
-        <p:blipFill>
-          <a:blip r:embed="rId4">
-            <a:extLst>
-              <a:ext uri="{28A0092B-C50C-407E-A947-70E740481C1C}">
-                <a14:useLocalDpi xmlns:a14="http://schemas.microsoft.com/office/drawing/2010/main" val="0"/>
-              </a:ext>
-            </a:extLst>
-          </a:blip>
-          <a:stretch>
-            <a:fillRect/>
-          </a:stretch>
-        </p:blipFill>
-        <p:spPr>
-          <a:xfrm>
-            <a:off x="6638886" y="1825625"/>
-            <a:ext cx="1949944" cy="4351338"/>
-          </a:xfrm>
-          <a:prstGeom prst="rect">
-            <a:avLst/>
-          </a:prstGeom>
-        </p:spPr>
-      </p:pic>
-      <p:pic>
-        <p:nvPicPr>
-          <p:cNvPr id="9" name="Picture 8">
-            <a:extLst>
-              <a:ext uri="{FF2B5EF4-FFF2-40B4-BE49-F238E27FC236}">
-                <a16:creationId xmlns:a16="http://schemas.microsoft.com/office/drawing/2014/main" id="{5FE341B7-D230-42C6-C184-F6FE86AE9A3F}"/>
-              </a:ext>
-            </a:extLst>
-          </p:cNvPr>
-          <p:cNvPicPr>
-            <a:picLocks noChangeAspect="1"/>
-          </p:cNvPicPr>
-          <p:nvPr/>
-        </p:nvPicPr>
-        <p:blipFill>
-          <a:blip r:embed="rId5">
-            <a:extLst>
-              <a:ext uri="{28A0092B-C50C-407E-A947-70E740481C1C}">
-                <a14:useLocalDpi xmlns:a14="http://schemas.microsoft.com/office/drawing/2010/main" val="0"/>
-              </a:ext>
-            </a:extLst>
-          </a:blip>
-          <a:stretch>
-            <a:fillRect/>
-          </a:stretch>
-        </p:blipFill>
-        <p:spPr>
-          <a:xfrm>
-            <a:off x="9674600" y="1825625"/>
-            <a:ext cx="1949945" cy="4351343"/>
-          </a:xfrm>
-          <a:prstGeom prst="rect">
-            <a:avLst/>
-          </a:prstGeom>
-        </p:spPr>
-      </p:pic>
-    </p:spTree>
-    <p:extLst>
-      <p:ext uri="{BB962C8B-B14F-4D97-AF65-F5344CB8AC3E}">
-        <p14:creationId xmlns:p14="http://schemas.microsoft.com/office/powerpoint/2010/main" val="2115783585"/>
-      </p:ext>
-    </p:extLst>
-  </p:cSld>
-  <p:clrMapOvr>
-    <a:masterClrMapping/>
-  </p:clrMapOvr>
-  <p:timing>
-    <p:tnLst>
-      <p:par>
-        <p:cTn id="1" dur="indefinite" restart="never" nodeType="tmRoot">
-          <p:childTnLst>
-            <p:seq concurrent="1" nextAc="seek">
-              <p:cTn id="2" dur="indefinite" nodeType="mainSeq">
-                <p:childTnLst>
-                  <p:par>
-                    <p:cTn id="3" fill="hold">
-                      <p:stCondLst>
-                        <p:cond delay="indefinite"/>
-                      </p:stCondLst>
-                      <p:childTnLst>
-                        <p:par>
-                          <p:cTn id="4" fill="hold">
-                            <p:stCondLst>
-                              <p:cond delay="0"/>
-                            </p:stCondLst>
-                            <p:childTnLst>
-                              <p:par>
-                                <p:cTn id="5" presetID="31" presetClass="entr" presetSubtype="0" fill="hold" nodeType="clickEffect">
-                                  <p:stCondLst>
-                                    <p:cond delay="0"/>
-                                  </p:stCondLst>
-                                  <p:childTnLst>
-                                    <p:set>
-                                      <p:cBhvr>
-                                        <p:cTn id="6" dur="1" fill="hold">
-                                          <p:stCondLst>
-                                            <p:cond delay="0"/>
-                                          </p:stCondLst>
-                                        </p:cTn>
-                                        <p:tgtEl>
-                                          <p:spTgt spid="5"/>
-                                        </p:tgtEl>
-                                        <p:attrNameLst>
-                                          <p:attrName>style.visibility</p:attrName>
-                                        </p:attrNameLst>
-                                      </p:cBhvr>
-                                      <p:to>
-                                        <p:strVal val="visible"/>
-                                      </p:to>
-                                    </p:set>
-                                    <p:anim calcmode="lin" valueType="num">
-                                      <p:cBhvr>
-                                        <p:cTn id="7" dur="1000" fill="hold"/>
-                                        <p:tgtEl>
-                                          <p:spTgt spid="5"/>
-                                        </p:tgtEl>
-                                        <p:attrNameLst>
-                                          <p:attrName>ppt_w</p:attrName>
-                                        </p:attrNameLst>
-                                      </p:cBhvr>
-                                      <p:tavLst>
-                                        <p:tav tm="0">
-                                          <p:val>
-                                            <p:fltVal val="0"/>
-                                          </p:val>
-                                        </p:tav>
-                                        <p:tav tm="100000">
-                                          <p:val>
-                                            <p:strVal val="#ppt_w"/>
-                                          </p:val>
-                                        </p:tav>
-                                      </p:tavLst>
-                                    </p:anim>
-                                    <p:anim calcmode="lin" valueType="num">
-                                      <p:cBhvr>
-                                        <p:cTn id="8" dur="1000" fill="hold"/>
-                                        <p:tgtEl>
-                                          <p:spTgt spid="5"/>
-                                        </p:tgtEl>
-                                        <p:attrNameLst>
-                                          <p:attrName>ppt_h</p:attrName>
-                                        </p:attrNameLst>
-                                      </p:cBhvr>
-                                      <p:tavLst>
-                                        <p:tav tm="0">
-                                          <p:val>
-                                            <p:fltVal val="0"/>
-                                          </p:val>
-                                        </p:tav>
-                                        <p:tav tm="100000">
-                                          <p:val>
-                                            <p:strVal val="#ppt_h"/>
-                                          </p:val>
-                                        </p:tav>
-                                      </p:tavLst>
-                                    </p:anim>
-                                    <p:anim calcmode="lin" valueType="num">
-                                      <p:cBhvr>
-                                        <p:cTn id="9" dur="1000" fill="hold"/>
-                                        <p:tgtEl>
-                                          <p:spTgt spid="5"/>
-                                        </p:tgtEl>
-                                        <p:attrNameLst>
-                                          <p:attrName>style.rotation</p:attrName>
-                                        </p:attrNameLst>
-                                      </p:cBhvr>
-                                      <p:tavLst>
-                                        <p:tav tm="0">
-                                          <p:val>
-                                            <p:fltVal val="90"/>
-                                          </p:val>
-                                        </p:tav>
-                                        <p:tav tm="100000">
-                                          <p:val>
-                                            <p:fltVal val="0"/>
-                                          </p:val>
-                                        </p:tav>
-                                      </p:tavLst>
-                                    </p:anim>
-                                    <p:animEffect transition="in" filter="fade">
-                                      <p:cBhvr>
-                                        <p:cTn id="10" dur="1000"/>
-                                        <p:tgtEl>
-                                          <p:spTgt spid="5"/>
-                                        </p:tgtEl>
-                                      </p:cBhvr>
-                                    </p:animEffect>
-                                  </p:childTnLst>
-                                </p:cTn>
-                              </p:par>
-                            </p:childTnLst>
-                          </p:cTn>
-                        </p:par>
-                      </p:childTnLst>
-                    </p:cTn>
-                  </p:par>
-                  <p:par>
-                    <p:cTn id="11" fill="hold">
-                      <p:stCondLst>
-                        <p:cond delay="indefinite"/>
-                      </p:stCondLst>
-                      <p:childTnLst>
-                        <p:par>
-                          <p:cTn id="12" fill="hold">
-                            <p:stCondLst>
-                              <p:cond delay="0"/>
-                            </p:stCondLst>
-                            <p:childTnLst>
-                              <p:par>
-                                <p:cTn id="13" presetID="22" presetClass="entr" presetSubtype="4" fill="hold" nodeType="clickEffect">
-                                  <p:stCondLst>
-                                    <p:cond delay="0"/>
-                                  </p:stCondLst>
-                                  <p:childTnLst>
-                                    <p:set>
-                                      <p:cBhvr>
-                                        <p:cTn id="14" dur="1" fill="hold">
-                                          <p:stCondLst>
-                                            <p:cond delay="0"/>
-                                          </p:stCondLst>
-                                        </p:cTn>
-                                        <p:tgtEl>
-                                          <p:spTgt spid="6"/>
-                                        </p:tgtEl>
-                                        <p:attrNameLst>
-                                          <p:attrName>style.visibility</p:attrName>
-                                        </p:attrNameLst>
-                                      </p:cBhvr>
-                                      <p:to>
-                                        <p:strVal val="visible"/>
-                                      </p:to>
-                                    </p:set>
-                                    <p:animEffect transition="in" filter="wipe(down)">
-                                      <p:cBhvr>
-                                        <p:cTn id="15" dur="500"/>
-                                        <p:tgtEl>
-                                          <p:spTgt spid="6"/>
-                                        </p:tgtEl>
-                                      </p:cBhvr>
-                                    </p:animEffect>
-                                  </p:childTnLst>
-                                </p:cTn>
-                              </p:par>
-                            </p:childTnLst>
-                          </p:cTn>
-                        </p:par>
-                      </p:childTnLst>
-                    </p:cTn>
-                  </p:par>
-                  <p:par>
-                    <p:cTn id="16" fill="hold">
-                      <p:stCondLst>
-                        <p:cond delay="indefinite"/>
-                      </p:stCondLst>
-                      <p:childTnLst>
-                        <p:par>
-                          <p:cTn id="17" fill="hold">
-                            <p:stCondLst>
-                              <p:cond delay="0"/>
-                            </p:stCondLst>
-                            <p:childTnLst>
-                              <p:par>
-                                <p:cTn id="18" presetID="14" presetClass="entr" presetSubtype="10" fill="hold" nodeType="clickEffect">
-                                  <p:stCondLst>
-                                    <p:cond delay="0"/>
-                                  </p:stCondLst>
-                                  <p:childTnLst>
-                                    <p:set>
-                                      <p:cBhvr>
-                                        <p:cTn id="19" dur="1" fill="hold">
-                                          <p:stCondLst>
-                                            <p:cond delay="0"/>
-                                          </p:stCondLst>
-                                        </p:cTn>
-                                        <p:tgtEl>
-                                          <p:spTgt spid="7"/>
-                                        </p:tgtEl>
-                                        <p:attrNameLst>
-                                          <p:attrName>style.visibility</p:attrName>
-                                        </p:attrNameLst>
-                                      </p:cBhvr>
-                                      <p:to>
-                                        <p:strVal val="visible"/>
-                                      </p:to>
-                                    </p:set>
-                                    <p:animEffect transition="in" filter="randombar(horizontal)">
-                                      <p:cBhvr>
-                                        <p:cTn id="20" dur="500"/>
-                                        <p:tgtEl>
-                                          <p:spTgt spid="7"/>
-                                        </p:tgtEl>
-                                      </p:cBhvr>
-                                    </p:animEffect>
-                                  </p:childTnLst>
-                                </p:cTn>
-                              </p:par>
-                            </p:childTnLst>
-                          </p:cTn>
-                        </p:par>
-                      </p:childTnLst>
-                    </p:cTn>
-                  </p:par>
-                  <p:par>
-                    <p:cTn id="21" fill="hold">
-                      <p:stCondLst>
-                        <p:cond delay="indefinite"/>
-                      </p:stCondLst>
-                      <p:childTnLst>
-                        <p:par>
-                          <p:cTn id="22" fill="hold">
-                            <p:stCondLst>
-                              <p:cond delay="0"/>
-                            </p:stCondLst>
-                            <p:childTnLst>
-                              <p:par>
-                                <p:cTn id="23" presetID="2" presetClass="entr" presetSubtype="4" fill="hold" nodeType="clickEffect">
-                                  <p:stCondLst>
-                                    <p:cond delay="0"/>
-                                  </p:stCondLst>
-                                  <p:childTnLst>
-                                    <p:set>
-                                      <p:cBhvr>
-                                        <p:cTn id="24" dur="1" fill="hold">
-                                          <p:stCondLst>
-                                            <p:cond delay="0"/>
-                                          </p:stCondLst>
-                                        </p:cTn>
-                                        <p:tgtEl>
-                                          <p:spTgt spid="9"/>
-                                        </p:tgtEl>
-                                        <p:attrNameLst>
-                                          <p:attrName>style.visibility</p:attrName>
-                                        </p:attrNameLst>
-                                      </p:cBhvr>
-                                      <p:to>
-                                        <p:strVal val="visible"/>
-                                      </p:to>
-                                    </p:set>
-                                    <p:anim calcmode="lin" valueType="num">
-                                      <p:cBhvr additive="base">
-                                        <p:cTn id="25" dur="500" fill="hold"/>
-                                        <p:tgtEl>
-                                          <p:spTgt spid="9"/>
-                                        </p:tgtEl>
-                                        <p:attrNameLst>
-                                          <p:attrName>ppt_x</p:attrName>
-                                        </p:attrNameLst>
-                                      </p:cBhvr>
-                                      <p:tavLst>
-                                        <p:tav tm="0">
-                                          <p:val>
-                                            <p:strVal val="#ppt_x"/>
-                                          </p:val>
-                                        </p:tav>
-                                        <p:tav tm="100000">
-                                          <p:val>
-                                            <p:strVal val="#ppt_x"/>
-                                          </p:val>
-                                        </p:tav>
-                                      </p:tavLst>
-                                    </p:anim>
-                                    <p:anim calcmode="lin" valueType="num">
-                                      <p:cBhvr additive="base">
-                                        <p:cTn id="26" dur="500" fill="hold"/>
-                                        <p:tgtEl>
-                                          <p:spTgt spid="9"/>
-                                        </p:tgtEl>
-                                        <p:attrNameLst>
-                                          <p:attrName>ppt_y</p:attrName>
-                                        </p:attrNameLst>
-                                      </p:cBhvr>
-                                      <p:tavLst>
-                                        <p:tav tm="0">
-                                          <p:val>
-                                            <p:strVal val="1+#ppt_h/2"/>
-                                          </p:val>
-                                        </p:tav>
-                                        <p:tav tm="100000">
-                                          <p:val>
-                                            <p:strVal val="#ppt_y"/>
-                                          </p:val>
-                                        </p:tav>
-                                      </p:tavLst>
-                                    </p:anim>
-                                  </p:childTnLst>
-                                </p:cTn>
-                              </p:par>
-                            </p:childTnLst>
-                          </p:cTn>
-                        </p:par>
-                      </p:childTnLst>
-                    </p:cTn>
-                  </p:par>
-                </p:childTnLst>
-              </p:cTn>
-              <p:prevCondLst>
-                <p:cond evt="onPrev" delay="0">
-                  <p:tgtEl>
-                    <p:sldTgt/>
-                  </p:tgtEl>
-                </p:cond>
-              </p:prevCondLst>
-              <p:nextCondLst>
-                <p:cond evt="onNext" delay="0">
-                  <p:tgtEl>
-                    <p:sldTgt/>
-                  </p:tgtEl>
-                </p:cond>
-              </p:nextCondLst>
-            </p:seq>
-          </p:childTnLst>
-        </p:cTn>
-      </p:par>
-    </p:tnLst>
-  </p:timing>
-</p:sld>
-</file>
-
-<file path=ppt/slides/slide11.xml><?xml version="1.0" encoding="utf-8"?>
-<p:sld xmlns:a="http://schemas.openxmlformats.org/drawingml/2006/main" xmlns:r="http://schemas.openxmlformats.org/officeDocument/2006/relationships" xmlns:p="http://schemas.openxmlformats.org/presentationml/2006/main">
-  <p:cSld>
-    <p:spTree>
-      <p:nvGrpSpPr>
-        <p:cNvPr id="1" name=""/>
-        <p:cNvGrpSpPr/>
-        <p:nvPr/>
-      </p:nvGrpSpPr>
-      <p:grpSpPr>
-        <a:xfrm>
-          <a:off x="0" y="0"/>
-          <a:ext cx="0" cy="0"/>
-          <a:chOff x="0" y="0"/>
-          <a:chExt cx="0" cy="0"/>
-        </a:xfrm>
-      </p:grpSpPr>
-      <p:sp>
-        <p:nvSpPr>
-          <p:cNvPr id="2" name="Título 1">
-            <a:extLst>
-              <a:ext uri="{FF2B5EF4-FFF2-40B4-BE49-F238E27FC236}">
-                <a16:creationId xmlns:a16="http://schemas.microsoft.com/office/drawing/2014/main" id="{4374ACDD-66CB-4E44-EA2A-296C04234314}"/>
-              </a:ext>
-            </a:extLst>
-          </p:cNvPr>
-          <p:cNvSpPr>
-            <a:spLocks noGrp="1"/>
-          </p:cNvSpPr>
-          <p:nvPr>
-            <p:ph type="title"/>
-          </p:nvPr>
-        </p:nvSpPr>
-        <p:spPr/>
-        <p:txBody>
-          <a:bodyPr/>
-          <a:lstStyle/>
-          <a:p>
-            <a:r>
-              <a:rPr lang="ca-ES-valencia" noProof="0" dirty="0"/>
-              <a:t>Esquema E/R del projecte</a:t>
-            </a:r>
-          </a:p>
-        </p:txBody>
-      </p:sp>
-      <p:pic>
-        <p:nvPicPr>
-          <p:cNvPr id="5" name="Marcador de contenido 4">
-            <a:extLst>
-              <a:ext uri="{FF2B5EF4-FFF2-40B4-BE49-F238E27FC236}">
-                <a16:creationId xmlns:a16="http://schemas.microsoft.com/office/drawing/2014/main" id="{34AC9429-56B7-0AD0-6D2D-137DEA79B5F6}"/>
-              </a:ext>
-            </a:extLst>
-          </p:cNvPr>
-          <p:cNvPicPr>
-            <a:picLocks noGrp="1" noChangeAspect="1"/>
-          </p:cNvPicPr>
-          <p:nvPr>
-            <p:ph idx="1"/>
-          </p:nvPr>
-        </p:nvPicPr>
-        <p:blipFill>
-          <a:blip r:embed="rId2">
-            <a:extLst>
-              <a:ext uri="{28A0092B-C50C-407E-A947-70E740481C1C}">
-                <a14:useLocalDpi xmlns:a14="http://schemas.microsoft.com/office/drawing/2010/main" val="0"/>
-              </a:ext>
-            </a:extLst>
-          </a:blip>
-          <a:stretch>
-            <a:fillRect/>
-          </a:stretch>
-        </p:blipFill>
-        <p:spPr>
-          <a:xfrm>
-            <a:off x="838200" y="1975851"/>
-            <a:ext cx="10515600" cy="4050886"/>
-          </a:xfrm>
-        </p:spPr>
-      </p:pic>
-    </p:spTree>
-    <p:extLst>
-      <p:ext uri="{BB962C8B-B14F-4D97-AF65-F5344CB8AC3E}">
-        <p14:creationId xmlns:p14="http://schemas.microsoft.com/office/powerpoint/2010/main" val="523091075"/>
-      </p:ext>
-    </p:extLst>
-  </p:cSld>
-  <p:clrMapOvr>
-    <a:masterClrMapping/>
-  </p:clrMapOvr>
-</p:sld>
-</file>
-
-<file path=ppt/slides/slide12.xml><?xml version="1.0" encoding="utf-8"?>
-<p:sld xmlns:a="http://schemas.openxmlformats.org/drawingml/2006/main" xmlns:r="http://schemas.openxmlformats.org/officeDocument/2006/relationships" xmlns:p="http://schemas.openxmlformats.org/presentationml/2006/main">
-  <p:cSld>
-    <p:spTree>
-      <p:nvGrpSpPr>
-        <p:cNvPr id="1" name=""/>
-        <p:cNvGrpSpPr/>
-        <p:nvPr/>
-      </p:nvGrpSpPr>
-      <p:grpSpPr>
-        <a:xfrm>
-          <a:off x="0" y="0"/>
-          <a:ext cx="0" cy="0"/>
-          <a:chOff x="0" y="0"/>
-          <a:chExt cx="0" cy="0"/>
-        </a:xfrm>
-      </p:grpSpPr>
-      <p:sp>
-        <p:nvSpPr>
-          <p:cNvPr id="2" name="Title 1">
-            <a:extLst>
-              <a:ext uri="{FF2B5EF4-FFF2-40B4-BE49-F238E27FC236}">
-                <a16:creationId xmlns:a16="http://schemas.microsoft.com/office/drawing/2014/main" id="{794C09E2-7D69-52FB-0999-953955EC03E4}"/>
-              </a:ext>
-            </a:extLst>
-          </p:cNvPr>
-          <p:cNvSpPr>
-            <a:spLocks noGrp="1"/>
-          </p:cNvSpPr>
-          <p:nvPr>
-            <p:ph type="title"/>
-          </p:nvPr>
-        </p:nvSpPr>
-        <p:spPr/>
-        <p:txBody>
-          <a:bodyPr/>
-          <a:lstStyle/>
-          <a:p>
-            <a:r>
-              <a:rPr lang="ca-ES-valencia" noProof="0" dirty="0"/>
-              <a:t>Dificultats i millores futures</a:t>
-            </a:r>
-          </a:p>
-        </p:txBody>
-      </p:sp>
-      <p:sp>
-        <p:nvSpPr>
-          <p:cNvPr id="3" name="Content Placeholder 2">
-            <a:extLst>
-              <a:ext uri="{FF2B5EF4-FFF2-40B4-BE49-F238E27FC236}">
-                <a16:creationId xmlns:a16="http://schemas.microsoft.com/office/drawing/2014/main" id="{B57C6B89-36FF-8378-B25D-BB9042B2DD5E}"/>
-              </a:ext>
-            </a:extLst>
-          </p:cNvPr>
-          <p:cNvSpPr>
-            <a:spLocks noGrp="1"/>
-          </p:cNvSpPr>
-          <p:nvPr>
-            <p:ph idx="1"/>
-          </p:nvPr>
-        </p:nvSpPr>
-        <p:spPr/>
-        <p:txBody>
-          <a:bodyPr>
-            <a:normAutofit/>
-          </a:bodyPr>
-          <a:lstStyle/>
-          <a:p>
-            <a:r>
-              <a:rPr lang="ca-ES-valencia" noProof="0" dirty="0"/>
-              <a:t>Dificultats:</a:t>
-            </a:r>
-          </a:p>
-          <a:p>
-            <a:pPr marL="0" indent="0">
-              <a:buNone/>
-            </a:pPr>
-            <a:r>
-              <a:rPr lang="ca-ES-valencia" noProof="0" dirty="0"/>
-              <a:t>-Adaptar la pantalla del mòbil per a que no es </a:t>
-            </a:r>
-            <a:r>
-              <a:rPr lang="ca-ES-valencia" noProof="0" dirty="0" err="1"/>
-              <a:t>sobreisca</a:t>
-            </a:r>
-            <a:r>
-              <a:rPr lang="ca-ES-valencia" noProof="0" dirty="0"/>
-              <a:t> en </a:t>
-            </a:r>
-            <a:r>
-              <a:rPr lang="ca-ES-valencia" noProof="0" dirty="0" err="1"/>
-              <a:t>horizontal</a:t>
-            </a:r>
-            <a:r>
-              <a:rPr lang="ca-ES-valencia" noProof="0" dirty="0"/>
-              <a:t>.</a:t>
-            </a:r>
-          </a:p>
-          <a:p>
-            <a:r>
-              <a:rPr lang="ca-ES-valencia" noProof="0" dirty="0"/>
-              <a:t>Que he aprés:</a:t>
-            </a:r>
-          </a:p>
-          <a:p>
-            <a:pPr marL="0" indent="0">
-              <a:buNone/>
-            </a:pPr>
-            <a:r>
-              <a:rPr lang="ca-ES-valencia" noProof="0" dirty="0"/>
-              <a:t>-Que és la tecnologia </a:t>
-            </a:r>
-            <a:r>
-              <a:rPr lang="ca-ES-valencia" noProof="0" dirty="0" err="1"/>
-              <a:t>nfc</a:t>
-            </a:r>
-            <a:r>
-              <a:rPr lang="ca-ES-valencia" noProof="0" dirty="0"/>
-              <a:t> i per a que serveix.</a:t>
-            </a:r>
-          </a:p>
-          <a:p>
-            <a:r>
-              <a:rPr lang="ca-ES-valencia" noProof="0" dirty="0"/>
-              <a:t>Millores futures:</a:t>
-            </a:r>
-          </a:p>
-          <a:p>
-            <a:pPr marL="0" indent="0">
-              <a:buNone/>
-            </a:pPr>
-            <a:r>
-              <a:rPr lang="ca-ES-valencia" noProof="0" dirty="0"/>
-              <a:t>-Passar del servidor de Node a </a:t>
-            </a:r>
-            <a:r>
-              <a:rPr lang="ca-ES-valencia" noProof="0" dirty="0" err="1"/>
-              <a:t>Odoo</a:t>
-            </a:r>
-            <a:r>
-              <a:rPr lang="ca-ES-valencia" noProof="0" dirty="0"/>
-              <a:t> mitjançant </a:t>
-            </a:r>
-            <a:r>
-              <a:rPr lang="ca-ES-valencia" noProof="0" dirty="0" err="1"/>
-              <a:t>jsonrpc</a:t>
-            </a:r>
-            <a:r>
-              <a:rPr lang="ca-ES-valencia" noProof="0" dirty="0"/>
-              <a:t>.</a:t>
-            </a:r>
-          </a:p>
-          <a:p>
-            <a:pPr marL="0" indent="0">
-              <a:buNone/>
-            </a:pPr>
-            <a:r>
-              <a:rPr lang="ca-ES-valencia" noProof="0" dirty="0"/>
-              <a:t>-Compatibilitat en iOS.</a:t>
-            </a:r>
-          </a:p>
-        </p:txBody>
-      </p:sp>
-    </p:spTree>
-    <p:extLst>
-      <p:ext uri="{BB962C8B-B14F-4D97-AF65-F5344CB8AC3E}">
-        <p14:creationId xmlns:p14="http://schemas.microsoft.com/office/powerpoint/2010/main" val="1908790075"/>
-      </p:ext>
-    </p:extLst>
-  </p:cSld>
-  <p:clrMapOvr>
-    <a:masterClrMapping/>
-  </p:clrMapOvr>
-</p:sld>
-</file>
-
-<file path=ppt/slides/slide13.xml><?xml version="1.0" encoding="utf-8"?>
-<p:sld xmlns:a="http://schemas.openxmlformats.org/drawingml/2006/main" xmlns:r="http://schemas.openxmlformats.org/officeDocument/2006/relationships" xmlns:p="http://schemas.openxmlformats.org/presentationml/2006/main">
-  <p:cSld>
-    <p:spTree>
-      <p:nvGrpSpPr>
-        <p:cNvPr id="1" name=""/>
-        <p:cNvGrpSpPr/>
-        <p:nvPr/>
-      </p:nvGrpSpPr>
-      <p:grpSpPr>
-        <a:xfrm>
-          <a:off x="0" y="0"/>
-          <a:ext cx="0" cy="0"/>
-          <a:chOff x="0" y="0"/>
-          <a:chExt cx="0" cy="0"/>
-        </a:xfrm>
-      </p:grpSpPr>
-      <p:sp>
-        <p:nvSpPr>
-          <p:cNvPr id="2" name="Title 1">
-            <a:extLst>
-              <a:ext uri="{FF2B5EF4-FFF2-40B4-BE49-F238E27FC236}">
                 <a16:creationId xmlns:a16="http://schemas.microsoft.com/office/drawing/2014/main" id="{EE19D80B-A0E0-0513-1959-208435FDE9F2}"/>
               </a:ext>
             </a:extLst>
@@ -4365,7 +3541,7 @@
 </p:sld>
 </file>
 
-<file path=ppt/slides/slide14.xml><?xml version="1.0" encoding="utf-8"?>
+<file path=ppt/slides/slide11.xml><?xml version="1.0" encoding="utf-8"?>
 <p:sld xmlns:a="http://schemas.openxmlformats.org/drawingml/2006/main" xmlns:r="http://schemas.openxmlformats.org/officeDocument/2006/relationships" xmlns:p="http://schemas.openxmlformats.org/presentationml/2006/main">
   <p:cSld>
     <p:spTree>
@@ -5710,7 +4886,7 @@
           <p:cNvPr id="2" name="Title 1">
             <a:extLst>
               <a:ext uri="{FF2B5EF4-FFF2-40B4-BE49-F238E27FC236}">
-                <a16:creationId xmlns:a16="http://schemas.microsoft.com/office/drawing/2014/main" id="{D584A4B6-66D5-E108-D8BE-6FC3BC5B71B1}"/>
+                <a16:creationId xmlns:a16="http://schemas.microsoft.com/office/drawing/2014/main" id="{098EA478-23BC-E5C7-9E6F-96605C68594A}"/>
               </a:ext>
             </a:extLst>
           </p:cNvPr>
@@ -5721,40 +4897,56 @@
             <p:ph type="title"/>
           </p:nvPr>
         </p:nvSpPr>
-        <p:spPr>
-          <a:xfrm>
-            <a:off x="838199" y="148816"/>
-            <a:ext cx="10515600" cy="1325563"/>
-          </a:xfrm>
-        </p:spPr>
-        <p:txBody>
-          <a:bodyPr>
-            <a:normAutofit/>
-          </a:bodyPr>
+        <p:spPr/>
+        <p:txBody>
+          <a:bodyPr/>
           <a:lstStyle/>
           <a:p>
             <a:r>
-              <a:rPr lang="ca-ES-valencia" sz="3600" noProof="0" dirty="0"/>
-              <a:t>Disseny de l’arquitectura (Prototip de baixa fidelitat)</a:t>
-            </a:r>
+              <a:rPr lang="ca-ES-valencia" noProof="0" dirty="0"/>
+              <a:t>Arquitectura del projecte</a:t>
+            </a:r>
+          </a:p>
+        </p:txBody>
+      </p:sp>
+      <p:sp>
+        <p:nvSpPr>
+          <p:cNvPr id="3" name="Content Placeholder 2">
+            <a:extLst>
+              <a:ext uri="{FF2B5EF4-FFF2-40B4-BE49-F238E27FC236}">
+                <a16:creationId xmlns:a16="http://schemas.microsoft.com/office/drawing/2014/main" id="{89FA6E31-6926-0BC7-288D-A83F8EFFF7DE}"/>
+              </a:ext>
+            </a:extLst>
+          </p:cNvPr>
+          <p:cNvSpPr>
+            <a:spLocks noGrp="1"/>
+          </p:cNvSpPr>
+          <p:nvPr>
+            <p:ph idx="1"/>
+          </p:nvPr>
+        </p:nvSpPr>
+        <p:spPr/>
+        <p:txBody>
+          <a:bodyPr/>
+          <a:lstStyle/>
+          <a:p>
+            <a:endParaRPr lang="ca-ES-valencia" noProof="0" dirty="0"/>
           </a:p>
         </p:txBody>
       </p:sp>
       <p:pic>
         <p:nvPicPr>
-          <p:cNvPr id="5" name="Content Placeholder 4">
-            <a:extLst>
-              <a:ext uri="{FF2B5EF4-FFF2-40B4-BE49-F238E27FC236}">
-                <a16:creationId xmlns:a16="http://schemas.microsoft.com/office/drawing/2014/main" id="{D18EE0BF-CEAA-D8BA-BAEC-70E4C4C630AD}"/>
+          <p:cNvPr id="5" name="Picture 4">
+            <a:extLst>
+              <a:ext uri="{FF2B5EF4-FFF2-40B4-BE49-F238E27FC236}">
+                <a16:creationId xmlns:a16="http://schemas.microsoft.com/office/drawing/2014/main" id="{59BC1AC5-04F1-F9BF-584C-3488F2611556}"/>
               </a:ext>
             </a:extLst>
           </p:cNvPr>
           <p:cNvPicPr>
-            <a:picLocks noGrp="1" noChangeAspect="1"/>
+            <a:picLocks noChangeAspect="1"/>
           </p:cNvPicPr>
-          <p:nvPr>
-            <p:ph idx="1"/>
-          </p:nvPr>
+          <p:nvPr/>
         </p:nvPicPr>
         <p:blipFill>
           <a:blip r:embed="rId2">
@@ -5770,15 +4962,53 @@
         </p:blipFill>
         <p:spPr>
           <a:xfrm>
-            <a:off x="1662501" y="1138866"/>
-            <a:ext cx="8130428" cy="5570318"/>
+            <a:off x="4379982" y="2113935"/>
+            <a:ext cx="3432035" cy="4557252"/>
           </a:xfrm>
+          <a:prstGeom prst="rect">
+            <a:avLst/>
+          </a:prstGeom>
         </p:spPr>
       </p:pic>
+      <p:sp>
+        <p:nvSpPr>
+          <p:cNvPr id="6" name="TextBox 5">
+            <a:extLst>
+              <a:ext uri="{FF2B5EF4-FFF2-40B4-BE49-F238E27FC236}">
+                <a16:creationId xmlns:a16="http://schemas.microsoft.com/office/drawing/2014/main" id="{F4337AFE-BE79-AC66-62B0-60960D7708BD}"/>
+              </a:ext>
+            </a:extLst>
+          </p:cNvPr>
+          <p:cNvSpPr txBox="1"/>
+          <p:nvPr/>
+        </p:nvSpPr>
+        <p:spPr>
+          <a:xfrm>
+            <a:off x="5260258" y="1824443"/>
+            <a:ext cx="2029658" cy="369332"/>
+          </a:xfrm>
+          <a:prstGeom prst="rect">
+            <a:avLst/>
+          </a:prstGeom>
+          <a:noFill/>
+        </p:spPr>
+        <p:txBody>
+          <a:bodyPr wrap="none" rtlCol="0">
+            <a:spAutoFit/>
+          </a:bodyPr>
+          <a:lstStyle/>
+          <a:p>
+            <a:r>
+              <a:rPr lang="ca-ES-valencia" noProof="0" dirty="0"/>
+              <a:t>Arquitectura CLEAN</a:t>
+            </a:r>
+          </a:p>
+        </p:txBody>
+      </p:sp>
     </p:spTree>
     <p:extLst>
       <p:ext uri="{BB962C8B-B14F-4D97-AF65-F5344CB8AC3E}">
-        <p14:creationId xmlns:p14="http://schemas.microsoft.com/office/powerpoint/2010/main" val="1297286780"/>
+        <p14:creationId xmlns:p14="http://schemas.microsoft.com/office/powerpoint/2010/main" val="2540754341"/>
       </p:ext>
     </p:extLst>
   </p:cSld>
@@ -5807,10 +5037,10 @@
       </p:grpSpPr>
       <p:sp>
         <p:nvSpPr>
-          <p:cNvPr id="2" name="Title 1">
-            <a:extLst>
-              <a:ext uri="{FF2B5EF4-FFF2-40B4-BE49-F238E27FC236}">
-                <a16:creationId xmlns:a16="http://schemas.microsoft.com/office/drawing/2014/main" id="{03765848-F82E-077A-7239-8CC04E318427}"/>
+          <p:cNvPr id="2" name="Título 1">
+            <a:extLst>
+              <a:ext uri="{FF2B5EF4-FFF2-40B4-BE49-F238E27FC236}">
+                <a16:creationId xmlns:a16="http://schemas.microsoft.com/office/drawing/2014/main" id="{4374ACDD-66CB-4E44-EA2A-296C04234314}"/>
               </a:ext>
             </a:extLst>
           </p:cNvPr>
@@ -5821,31 +5051,24 @@
             <p:ph type="title"/>
           </p:nvPr>
         </p:nvSpPr>
-        <p:spPr>
-          <a:xfrm>
-            <a:off x="1113503" y="99654"/>
-            <a:ext cx="10515600" cy="1325563"/>
-          </a:xfrm>
-        </p:spPr>
-        <p:txBody>
-          <a:bodyPr>
-            <a:normAutofit/>
-          </a:bodyPr>
+        <p:spPr/>
+        <p:txBody>
+          <a:bodyPr/>
           <a:lstStyle/>
           <a:p>
             <a:r>
-              <a:rPr lang="ca-ES-valencia" sz="4000" noProof="0" dirty="0"/>
-              <a:t>Disseny de l’arquitectura (Prototip d’alta fidelitat)</a:t>
+              <a:rPr lang="ca-ES-valencia" noProof="0" dirty="0"/>
+              <a:t>Esquema E/R de la base de dades</a:t>
             </a:r>
           </a:p>
         </p:txBody>
       </p:sp>
       <p:pic>
         <p:nvPicPr>
-          <p:cNvPr id="7" name="Content Placeholder 6">
-            <a:extLst>
-              <a:ext uri="{FF2B5EF4-FFF2-40B4-BE49-F238E27FC236}">
-                <a16:creationId xmlns:a16="http://schemas.microsoft.com/office/drawing/2014/main" id="{019A6F2F-297A-4579-CAFA-F671A5B3AFBD}"/>
+          <p:cNvPr id="5" name="Marcador de contenido 4">
+            <a:extLst>
+              <a:ext uri="{FF2B5EF4-FFF2-40B4-BE49-F238E27FC236}">
+                <a16:creationId xmlns:a16="http://schemas.microsoft.com/office/drawing/2014/main" id="{34AC9429-56B7-0AD0-6D2D-137DEA79B5F6}"/>
               </a:ext>
             </a:extLst>
           </p:cNvPr>
@@ -5870,15 +5093,15 @@
         </p:blipFill>
         <p:spPr>
           <a:xfrm>
-            <a:off x="2540977" y="1125005"/>
-            <a:ext cx="6757881" cy="5753328"/>
+            <a:off x="838200" y="1975851"/>
+            <a:ext cx="10515600" cy="4050886"/>
           </a:xfrm>
         </p:spPr>
       </p:pic>
     </p:spTree>
     <p:extLst>
       <p:ext uri="{BB962C8B-B14F-4D97-AF65-F5344CB8AC3E}">
-        <p14:creationId xmlns:p14="http://schemas.microsoft.com/office/powerpoint/2010/main" val="898400918"/>
+        <p14:creationId xmlns:p14="http://schemas.microsoft.com/office/powerpoint/2010/main" val="523091075"/>
       </p:ext>
     </p:extLst>
   </p:cSld>
@@ -5907,10 +5130,10 @@
       </p:grpSpPr>
       <p:sp>
         <p:nvSpPr>
-          <p:cNvPr id="2" name="Title 1">
-            <a:extLst>
-              <a:ext uri="{FF2B5EF4-FFF2-40B4-BE49-F238E27FC236}">
-                <a16:creationId xmlns:a16="http://schemas.microsoft.com/office/drawing/2014/main" id="{098EA478-23BC-E5C7-9E6F-96605C68594A}"/>
+          <p:cNvPr id="2" name="Título 1">
+            <a:extLst>
+              <a:ext uri="{FF2B5EF4-FFF2-40B4-BE49-F238E27FC236}">
+                <a16:creationId xmlns:a16="http://schemas.microsoft.com/office/drawing/2014/main" id="{427CF53F-6FF9-2E12-75D2-9BF25390EF25}"/>
               </a:ext>
             </a:extLst>
           </p:cNvPr>
@@ -5928,49 +5151,26 @@
           <a:p>
             <a:r>
               <a:rPr lang="ca-ES-valencia" noProof="0" dirty="0"/>
-              <a:t>Arquitectura del projecte</a:t>
-            </a:r>
-          </a:p>
-        </p:txBody>
-      </p:sp>
-      <p:sp>
-        <p:nvSpPr>
-          <p:cNvPr id="3" name="Content Placeholder 2">
-            <a:extLst>
-              <a:ext uri="{FF2B5EF4-FFF2-40B4-BE49-F238E27FC236}">
-                <a16:creationId xmlns:a16="http://schemas.microsoft.com/office/drawing/2014/main" id="{89FA6E31-6926-0BC7-288D-A83F8EFFF7DE}"/>
-              </a:ext>
-            </a:extLst>
-          </p:cNvPr>
-          <p:cNvSpPr>
-            <a:spLocks noGrp="1"/>
-          </p:cNvSpPr>
-          <p:nvPr>
-            <p:ph idx="1"/>
-          </p:nvPr>
-        </p:nvSpPr>
-        <p:spPr/>
-        <p:txBody>
-          <a:bodyPr/>
-          <a:lstStyle/>
-          <a:p>
-            <a:endParaRPr lang="ca-ES-valencia" noProof="0" dirty="0"/>
+              <a:t>API REST (rutes, accés a dades)</a:t>
+            </a:r>
           </a:p>
         </p:txBody>
       </p:sp>
       <p:pic>
         <p:nvPicPr>
-          <p:cNvPr id="5" name="Picture 4">
-            <a:extLst>
-              <a:ext uri="{FF2B5EF4-FFF2-40B4-BE49-F238E27FC236}">
-                <a16:creationId xmlns:a16="http://schemas.microsoft.com/office/drawing/2014/main" id="{59BC1AC5-04F1-F9BF-584C-3488F2611556}"/>
+          <p:cNvPr id="5" name="Marcador de contenido 4">
+            <a:extLst>
+              <a:ext uri="{FF2B5EF4-FFF2-40B4-BE49-F238E27FC236}">
+                <a16:creationId xmlns:a16="http://schemas.microsoft.com/office/drawing/2014/main" id="{11AF953E-E679-2689-06E3-8F32E7A5B38F}"/>
               </a:ext>
             </a:extLst>
           </p:cNvPr>
           <p:cNvPicPr>
-            <a:picLocks noChangeAspect="1"/>
+            <a:picLocks noGrp="1" noChangeAspect="1"/>
           </p:cNvPicPr>
-          <p:nvPr/>
+          <p:nvPr>
+            <p:ph idx="1"/>
+          </p:nvPr>
         </p:nvPicPr>
         <p:blipFill>
           <a:blip r:embed="rId2">
@@ -5986,53 +5186,15 @@
         </p:blipFill>
         <p:spPr>
           <a:xfrm>
-            <a:off x="4379982" y="2113935"/>
-            <a:ext cx="3432035" cy="4557252"/>
+            <a:off x="2930013" y="1690688"/>
+            <a:ext cx="5751871" cy="4541050"/>
           </a:xfrm>
-          <a:prstGeom prst="rect">
-            <a:avLst/>
-          </a:prstGeom>
         </p:spPr>
       </p:pic>
-      <p:sp>
-        <p:nvSpPr>
-          <p:cNvPr id="6" name="TextBox 5">
-            <a:extLst>
-              <a:ext uri="{FF2B5EF4-FFF2-40B4-BE49-F238E27FC236}">
-                <a16:creationId xmlns:a16="http://schemas.microsoft.com/office/drawing/2014/main" id="{F4337AFE-BE79-AC66-62B0-60960D7708BD}"/>
-              </a:ext>
-            </a:extLst>
-          </p:cNvPr>
-          <p:cNvSpPr txBox="1"/>
-          <p:nvPr/>
-        </p:nvSpPr>
-        <p:spPr>
-          <a:xfrm>
-            <a:off x="5260258" y="1824443"/>
-            <a:ext cx="2029658" cy="369332"/>
-          </a:xfrm>
-          <a:prstGeom prst="rect">
-            <a:avLst/>
-          </a:prstGeom>
-          <a:noFill/>
-        </p:spPr>
-        <p:txBody>
-          <a:bodyPr wrap="none" rtlCol="0">
-            <a:spAutoFit/>
-          </a:bodyPr>
-          <a:lstStyle/>
-          <a:p>
-            <a:r>
-              <a:rPr lang="ca-ES-valencia" noProof="0" dirty="0"/>
-              <a:t>Arquitectura CLEAN</a:t>
-            </a:r>
-          </a:p>
-        </p:txBody>
-      </p:sp>
     </p:spTree>
     <p:extLst>
       <p:ext uri="{BB962C8B-B14F-4D97-AF65-F5344CB8AC3E}">
-        <p14:creationId xmlns:p14="http://schemas.microsoft.com/office/powerpoint/2010/main" val="2540754341"/>
+        <p14:creationId xmlns:p14="http://schemas.microsoft.com/office/powerpoint/2010/main" val="2547242232"/>
       </p:ext>
     </p:extLst>
   </p:cSld>
@@ -6899,7 +6061,7 @@
           <p:cNvPr id="2" name="Title 1">
             <a:extLst>
               <a:ext uri="{FF2B5EF4-FFF2-40B4-BE49-F238E27FC236}">
-                <a16:creationId xmlns:a16="http://schemas.microsoft.com/office/drawing/2014/main" id="{7B56765D-89A6-D68B-8CB4-6F9B92A13227}"/>
+                <a16:creationId xmlns:a16="http://schemas.microsoft.com/office/drawing/2014/main" id="{391D3189-996E-75E3-D560-865C85474494}"/>
               </a:ext>
             </a:extLst>
           </p:cNvPr>
@@ -6912,22 +6074,24 @@
         </p:nvSpPr>
         <p:spPr/>
         <p:txBody>
-          <a:bodyPr/>
+          <a:bodyPr>
+            <a:normAutofit/>
+          </a:bodyPr>
           <a:lstStyle/>
           <a:p>
             <a:r>
               <a:rPr lang="ca-ES-valencia" noProof="0" dirty="0"/>
-              <a:t>Funcionalitat clau (NFC Explicació)</a:t>
+              <a:t>Funcionalitat clau (NFC i QR Implementació)</a:t>
             </a:r>
           </a:p>
         </p:txBody>
       </p:sp>
       <p:pic>
         <p:nvPicPr>
-          <p:cNvPr id="13" name="Content Placeholder 12">
-            <a:extLst>
-              <a:ext uri="{FF2B5EF4-FFF2-40B4-BE49-F238E27FC236}">
-                <a16:creationId xmlns:a16="http://schemas.microsoft.com/office/drawing/2014/main" id="{1E5F29CE-A9A2-DBCA-0856-9E79E7262FFF}"/>
+          <p:cNvPr id="6" name="Content Placeholder 5">
+            <a:extLst>
+              <a:ext uri="{FF2B5EF4-FFF2-40B4-BE49-F238E27FC236}">
+                <a16:creationId xmlns:a16="http://schemas.microsoft.com/office/drawing/2014/main" id="{BA2C6015-3E18-D2CE-5B54-3A42A759459C}"/>
               </a:ext>
             </a:extLst>
           </p:cNvPr>
@@ -6952,60 +6116,17 @@
         </p:blipFill>
         <p:spPr>
           <a:xfrm>
-            <a:off x="838200" y="2493271"/>
-            <a:ext cx="2857500" cy="1600200"/>
+            <a:off x="3603173" y="1825625"/>
+            <a:ext cx="1949943" cy="4351338"/>
           </a:xfrm>
         </p:spPr>
       </p:pic>
-      <p:sp>
-        <p:nvSpPr>
-          <p:cNvPr id="10" name="TextBox 9">
-            <a:extLst>
-              <a:ext uri="{FF2B5EF4-FFF2-40B4-BE49-F238E27FC236}">
-                <a16:creationId xmlns:a16="http://schemas.microsoft.com/office/drawing/2014/main" id="{316A1084-F5D5-37D9-05EA-7BA1DC826FB0}"/>
-              </a:ext>
-            </a:extLst>
-          </p:cNvPr>
-          <p:cNvSpPr txBox="1"/>
-          <p:nvPr/>
-        </p:nvSpPr>
-        <p:spPr>
-          <a:xfrm>
-            <a:off x="4462213" y="1690688"/>
-            <a:ext cx="3267571" cy="369332"/>
-          </a:xfrm>
-          <a:prstGeom prst="rect">
-            <a:avLst/>
-          </a:prstGeom>
-          <a:noFill/>
-        </p:spPr>
-        <p:txBody>
-          <a:bodyPr wrap="square" rtlCol="0">
-            <a:spAutoFit/>
-          </a:bodyPr>
-          <a:lstStyle/>
-          <a:p>
-            <a:r>
-              <a:rPr lang="ca-ES-valencia" noProof="0" dirty="0"/>
-              <a:t>NFC(</a:t>
-            </a:r>
-            <a:r>
-              <a:rPr lang="ca-ES-valencia" noProof="0" dirty="0" err="1"/>
-              <a:t>Near-Field-Communication</a:t>
-            </a:r>
-            <a:r>
-              <a:rPr lang="ca-ES-valencia" noProof="0" dirty="0"/>
-              <a:t> )</a:t>
-            </a:r>
-          </a:p>
-        </p:txBody>
-      </p:sp>
       <p:pic>
         <p:nvPicPr>
-          <p:cNvPr id="15" name="Picture 14">
-            <a:extLst>
-              <a:ext uri="{FF2B5EF4-FFF2-40B4-BE49-F238E27FC236}">
-                <a16:creationId xmlns:a16="http://schemas.microsoft.com/office/drawing/2014/main" id="{19A4ED00-36EF-24F8-3B98-116D7544B6AA}"/>
+          <p:cNvPr id="5" name="Content Placeholder 4">
+            <a:extLst>
+              <a:ext uri="{FF2B5EF4-FFF2-40B4-BE49-F238E27FC236}">
+                <a16:creationId xmlns:a16="http://schemas.microsoft.com/office/drawing/2014/main" id="{4D77545C-72F8-AD9D-3CB4-BA89405E48A7}"/>
               </a:ext>
             </a:extLst>
           </p:cNvPr>
@@ -7028,8 +6149,8 @@
         </p:blipFill>
         <p:spPr>
           <a:xfrm>
-            <a:off x="4243385" y="2679008"/>
-            <a:ext cx="3705225" cy="1228725"/>
+            <a:off x="838200" y="1825625"/>
+            <a:ext cx="1949943" cy="4351338"/>
           </a:xfrm>
           <a:prstGeom prst="rect">
             <a:avLst/>
@@ -7038,10 +6159,10 @@
       </p:pic>
       <p:pic>
         <p:nvPicPr>
-          <p:cNvPr id="17" name="Picture 16">
-            <a:extLst>
-              <a:ext uri="{FF2B5EF4-FFF2-40B4-BE49-F238E27FC236}">
-                <a16:creationId xmlns:a16="http://schemas.microsoft.com/office/drawing/2014/main" id="{4EFA2493-4ED0-C73C-59B3-ABD6F14994F8}"/>
+          <p:cNvPr id="7" name="Picture 6">
+            <a:extLst>
+              <a:ext uri="{FF2B5EF4-FFF2-40B4-BE49-F238E27FC236}">
+                <a16:creationId xmlns:a16="http://schemas.microsoft.com/office/drawing/2014/main" id="{E7C3170E-76B2-5801-6172-22203A74D82E}"/>
               </a:ext>
             </a:extLst>
           </p:cNvPr>
@@ -7064,8 +6185,8 @@
         </p:blipFill>
         <p:spPr>
           <a:xfrm>
-            <a:off x="8520111" y="2643186"/>
-            <a:ext cx="2914650" cy="1571625"/>
+            <a:off x="6638886" y="1825625"/>
+            <a:ext cx="1949944" cy="4351338"/>
           </a:xfrm>
           <a:prstGeom prst="rect">
             <a:avLst/>
@@ -7074,10 +6195,10 @@
       </p:pic>
       <p:pic>
         <p:nvPicPr>
-          <p:cNvPr id="19" name="Picture 18">
-            <a:extLst>
-              <a:ext uri="{FF2B5EF4-FFF2-40B4-BE49-F238E27FC236}">
-                <a16:creationId xmlns:a16="http://schemas.microsoft.com/office/drawing/2014/main" id="{C18238EB-AA94-6689-AF7B-E3ECB93085BC}"/>
+          <p:cNvPr id="9" name="Picture 8">
+            <a:extLst>
+              <a:ext uri="{FF2B5EF4-FFF2-40B4-BE49-F238E27FC236}">
+                <a16:creationId xmlns:a16="http://schemas.microsoft.com/office/drawing/2014/main" id="{5FE341B7-D230-42C6-C184-F6FE86AE9A3F}"/>
               </a:ext>
             </a:extLst>
           </p:cNvPr>
@@ -7100,80 +6221,8 @@
         </p:blipFill>
         <p:spPr>
           <a:xfrm>
-            <a:off x="4914899" y="4229100"/>
-            <a:ext cx="2466975" cy="1847850"/>
-          </a:xfrm>
-          <a:prstGeom prst="rect">
-            <a:avLst/>
-          </a:prstGeom>
-        </p:spPr>
-      </p:pic>
-      <p:pic>
-        <p:nvPicPr>
-          <p:cNvPr id="21" name="Picture 20">
-            <a:extLst>
-              <a:ext uri="{FF2B5EF4-FFF2-40B4-BE49-F238E27FC236}">
-                <a16:creationId xmlns:a16="http://schemas.microsoft.com/office/drawing/2014/main" id="{4BA3AE8B-2815-5AA0-D58D-BFFB51AF7818}"/>
-              </a:ext>
-            </a:extLst>
-          </p:cNvPr>
-          <p:cNvPicPr>
-            <a:picLocks noChangeAspect="1"/>
-          </p:cNvPicPr>
-          <p:nvPr/>
-        </p:nvPicPr>
-        <p:blipFill>
-          <a:blip r:embed="rId6">
-            <a:extLst>
-              <a:ext uri="{28A0092B-C50C-407E-A947-70E740481C1C}">
-                <a14:useLocalDpi xmlns:a14="http://schemas.microsoft.com/office/drawing/2010/main" val="0"/>
-              </a:ext>
-            </a:extLst>
-          </a:blip>
-          <a:stretch>
-            <a:fillRect/>
-          </a:stretch>
-        </p:blipFill>
-        <p:spPr>
-          <a:xfrm>
-            <a:off x="838200" y="4352925"/>
-            <a:ext cx="2857500" cy="1600200"/>
-          </a:xfrm>
-          <a:prstGeom prst="rect">
-            <a:avLst/>
-          </a:prstGeom>
-        </p:spPr>
-      </p:pic>
-      <p:pic>
-        <p:nvPicPr>
-          <p:cNvPr id="23" name="Picture 22">
-            <a:extLst>
-              <a:ext uri="{FF2B5EF4-FFF2-40B4-BE49-F238E27FC236}">
-                <a16:creationId xmlns:a16="http://schemas.microsoft.com/office/drawing/2014/main" id="{565D7ACC-9F55-2DA4-6630-94F7068C2BAA}"/>
-              </a:ext>
-            </a:extLst>
-          </p:cNvPr>
-          <p:cNvPicPr>
-            <a:picLocks noChangeAspect="1"/>
-          </p:cNvPicPr>
-          <p:nvPr/>
-        </p:nvPicPr>
-        <p:blipFill>
-          <a:blip r:embed="rId7">
-            <a:extLst>
-              <a:ext uri="{28A0092B-C50C-407E-A947-70E740481C1C}">
-                <a14:useLocalDpi xmlns:a14="http://schemas.microsoft.com/office/drawing/2010/main" val="0"/>
-              </a:ext>
-            </a:extLst>
-          </a:blip>
-          <a:stretch>
-            <a:fillRect/>
-          </a:stretch>
-        </p:blipFill>
-        <p:spPr>
-          <a:xfrm>
-            <a:off x="8439149" y="4467225"/>
-            <a:ext cx="3076575" cy="1485900"/>
+            <a:off x="9674600" y="1825625"/>
+            <a:ext cx="1949945" cy="4351343"/>
           </a:xfrm>
           <a:prstGeom prst="rect">
             <a:avLst/>
@@ -7183,7 +6232,7 @@
     </p:spTree>
     <p:extLst>
       <p:ext uri="{BB962C8B-B14F-4D97-AF65-F5344CB8AC3E}">
-        <p14:creationId xmlns:p14="http://schemas.microsoft.com/office/powerpoint/2010/main" val="1571572084"/>
+        <p14:creationId xmlns:p14="http://schemas.microsoft.com/office/powerpoint/2010/main" val="2115783585"/>
       </p:ext>
     </p:extLst>
   </p:cSld>
@@ -7211,7 +6260,7 @@
                             </p:stCondLst>
                             <p:childTnLst>
                               <p:par>
-                                <p:cTn id="5" presetID="26" presetClass="entr" presetSubtype="0" fill="hold" nodeType="clickEffect">
+                                <p:cTn id="5" presetID="31" presetClass="entr" presetSubtype="0" fill="hold" nodeType="clickEffect">
                                   <p:stCondLst>
                                     <p:cond delay="0"/>
                                   </p:stCondLst>
@@ -7224,7 +6273,129 @@
                                           </p:stCondLst>
                                         </p:cTn>
                                         <p:tgtEl>
-                                          <p:spTgt spid="13"/>
+                                          <p:spTgt spid="5"/>
+                                        </p:tgtEl>
+                                        <p:attrNameLst>
+                                          <p:attrName>style.visibility</p:attrName>
+                                        </p:attrNameLst>
+                                      </p:cBhvr>
+                                      <p:to>
+                                        <p:strVal val="visible"/>
+                                      </p:to>
+                                    </p:set>
+                                    <p:anim calcmode="lin" valueType="num">
+                                      <p:cBhvr>
+                                        <p:cTn id="7" dur="1000" fill="hold"/>
+                                        <p:tgtEl>
+                                          <p:spTgt spid="5"/>
+                                        </p:tgtEl>
+                                        <p:attrNameLst>
+                                          <p:attrName>ppt_w</p:attrName>
+                                        </p:attrNameLst>
+                                      </p:cBhvr>
+                                      <p:tavLst>
+                                        <p:tav tm="0">
+                                          <p:val>
+                                            <p:fltVal val="0"/>
+                                          </p:val>
+                                        </p:tav>
+                                        <p:tav tm="100000">
+                                          <p:val>
+                                            <p:strVal val="#ppt_w"/>
+                                          </p:val>
+                                        </p:tav>
+                                      </p:tavLst>
+                                    </p:anim>
+                                    <p:anim calcmode="lin" valueType="num">
+                                      <p:cBhvr>
+                                        <p:cTn id="8" dur="1000" fill="hold"/>
+                                        <p:tgtEl>
+                                          <p:spTgt spid="5"/>
+                                        </p:tgtEl>
+                                        <p:attrNameLst>
+                                          <p:attrName>ppt_h</p:attrName>
+                                        </p:attrNameLst>
+                                      </p:cBhvr>
+                                      <p:tavLst>
+                                        <p:tav tm="0">
+                                          <p:val>
+                                            <p:fltVal val="0"/>
+                                          </p:val>
+                                        </p:tav>
+                                        <p:tav tm="100000">
+                                          <p:val>
+                                            <p:strVal val="#ppt_h"/>
+                                          </p:val>
+                                        </p:tav>
+                                      </p:tavLst>
+                                    </p:anim>
+                                    <p:anim calcmode="lin" valueType="num">
+                                      <p:cBhvr>
+                                        <p:cTn id="9" dur="1000" fill="hold"/>
+                                        <p:tgtEl>
+                                          <p:spTgt spid="5"/>
+                                        </p:tgtEl>
+                                        <p:attrNameLst>
+                                          <p:attrName>style.rotation</p:attrName>
+                                        </p:attrNameLst>
+                                      </p:cBhvr>
+                                      <p:tavLst>
+                                        <p:tav tm="0">
+                                          <p:val>
+                                            <p:fltVal val="90"/>
+                                          </p:val>
+                                        </p:tav>
+                                        <p:tav tm="100000">
+                                          <p:val>
+                                            <p:fltVal val="0"/>
+                                          </p:val>
+                                        </p:tav>
+                                      </p:tavLst>
+                                    </p:anim>
+                                    <p:animEffect transition="in" filter="fade">
+                                      <p:cBhvr>
+                                        <p:cTn id="10" dur="1000"/>
+                                        <p:tgtEl>
+                                          <p:spTgt spid="5"/>
+                                        </p:tgtEl>
+                                      </p:cBhvr>
+                                    </p:animEffect>
+                                  </p:childTnLst>
+                                </p:cTn>
+                              </p:par>
+                            </p:childTnLst>
+                          </p:cTn>
+                        </p:par>
+                      </p:childTnLst>
+                    </p:cTn>
+                  </p:par>
+                  <p:par>
+                    <p:cTn id="11" fill="hold">
+                      <p:stCondLst>
+                        <p:cond delay="indefinite"/>
+                      </p:stCondLst>
+                      <p:childTnLst>
+                        <p:par>
+                          <p:cTn id="12" fill="hold">
+                            <p:stCondLst>
+                              <p:cond delay="0"/>
+                            </p:stCondLst>
+                            <p:childTnLst>
+                              <p:par>
+                                <p:cTn id="13" presetID="22" presetClass="entr" presetSubtype="4" fill="hold" nodeType="clickEffect">
+                                  <p:stCondLst>
+                                    <p:cond delay="0"/>
+                                  </p:stCondLst>
+                                  <p:childTnLst>
+                                    <p:set>
+                                      <p:cBhvr>
+                                        <p:cTn id="14" dur="1" fill="hold">
+                                          <p:stCondLst>
+                                            <p:cond delay="0"/>
+                                          </p:stCondLst>
+                                        </p:cTn>
+                                        <p:tgtEl>
+                                          <p:spTgt spid="6"/>
                                         </p:tgtEl>
                                         <p:attrNameLst>
                                           <p:attrName>style.visibility</p:attrName>
@@ -7236,255 +6407,65 @@
                                     </p:set>
                                     <p:animEffect transition="in" filter="wipe(down)">
                                       <p:cBhvr>
-                                        <p:cTn id="7" dur="580">
+                                        <p:cTn id="15" dur="500"/>
+                                        <p:tgtEl>
+                                          <p:spTgt spid="6"/>
+                                        </p:tgtEl>
+                                      </p:cBhvr>
+                                    </p:animEffect>
+                                  </p:childTnLst>
+                                </p:cTn>
+                              </p:par>
+                            </p:childTnLst>
+                          </p:cTn>
+                        </p:par>
+                      </p:childTnLst>
+                    </p:cTn>
+                  </p:par>
+                  <p:par>
+                    <p:cTn id="16" fill="hold">
+                      <p:stCondLst>
+                        <p:cond delay="indefinite"/>
+                      </p:stCondLst>
+                      <p:childTnLst>
+                        <p:par>
+                          <p:cTn id="17" fill="hold">
+                            <p:stCondLst>
+                              <p:cond delay="0"/>
+                            </p:stCondLst>
+                            <p:childTnLst>
+                              <p:par>
+                                <p:cTn id="18" presetID="14" presetClass="entr" presetSubtype="10" fill="hold" nodeType="clickEffect">
+                                  <p:stCondLst>
+                                    <p:cond delay="0"/>
+                                  </p:stCondLst>
+                                  <p:childTnLst>
+                                    <p:set>
+                                      <p:cBhvr>
+                                        <p:cTn id="19" dur="1" fill="hold">
                                           <p:stCondLst>
                                             <p:cond delay="0"/>
                                           </p:stCondLst>
                                         </p:cTn>
                                         <p:tgtEl>
-                                          <p:spTgt spid="13"/>
+                                          <p:spTgt spid="7"/>
+                                        </p:tgtEl>
+                                        <p:attrNameLst>
+                                          <p:attrName>style.visibility</p:attrName>
+                                        </p:attrNameLst>
+                                      </p:cBhvr>
+                                      <p:to>
+                                        <p:strVal val="visible"/>
+                                      </p:to>
+                                    </p:set>
+                                    <p:animEffect transition="in" filter="randombar(horizontal)">
+                                      <p:cBhvr>
+                                        <p:cTn id="20" dur="500"/>
+                                        <p:tgtEl>
+                                          <p:spTgt spid="7"/>
                                         </p:tgtEl>
                                       </p:cBhvr>
                                     </p:animEffect>
-                                    <p:anim calcmode="lin" valueType="num">
-                                      <p:cBhvr>
-                                        <p:cTn id="8" dur="1822" tmFilter="0,0; 0.14,0.36; 0.43,0.73; 0.71,0.91; 1.0,1.0">
-                                          <p:stCondLst>
-                                            <p:cond delay="0"/>
-                                          </p:stCondLst>
-                                        </p:cTn>
-                                        <p:tgtEl>
-                                          <p:spTgt spid="13"/>
-                                        </p:tgtEl>
-                                        <p:attrNameLst>
-                                          <p:attrName>ppt_x</p:attrName>
-                                        </p:attrNameLst>
-                                      </p:cBhvr>
-                                      <p:tavLst>
-                                        <p:tav tm="0">
-                                          <p:val>
-                                            <p:strVal val="#ppt_x-0.25"/>
-                                          </p:val>
-                                        </p:tav>
-                                        <p:tav tm="100000">
-                                          <p:val>
-                                            <p:strVal val="#ppt_x"/>
-                                          </p:val>
-                                        </p:tav>
-                                      </p:tavLst>
-                                    </p:anim>
-                                    <p:anim calcmode="lin" valueType="num">
-                                      <p:cBhvr>
-                                        <p:cTn id="9" dur="664" tmFilter="0.0,0.0; 0.25,0.07; 0.50,0.2; 0.75,0.467; 1.0,1.0">
-                                          <p:stCondLst>
-                                            <p:cond delay="0"/>
-                                          </p:stCondLst>
-                                        </p:cTn>
-                                        <p:tgtEl>
-                                          <p:spTgt spid="13"/>
-                                        </p:tgtEl>
-                                        <p:attrNameLst>
-                                          <p:attrName>ppt_y</p:attrName>
-                                        </p:attrNameLst>
-                                      </p:cBhvr>
-                                      <p:tavLst>
-                                        <p:tav tm="0" fmla="#ppt_y-sin(pi*$)/3">
-                                          <p:val>
-                                            <p:fltVal val="0.5"/>
-                                          </p:val>
-                                        </p:tav>
-                                        <p:tav tm="100000">
-                                          <p:val>
-                                            <p:fltVal val="1"/>
-                                          </p:val>
-                                        </p:tav>
-                                      </p:tavLst>
-                                    </p:anim>
-                                    <p:anim calcmode="lin" valueType="num">
-                                      <p:cBhvr>
-                                        <p:cTn id="10" dur="664" tmFilter="0, 0; 0.125,0.2665; 0.25,0.4; 0.375,0.465; 0.5,0.5;  0.625,0.535; 0.75,0.6; 0.875,0.7335; 1,1">
-                                          <p:stCondLst>
-                                            <p:cond delay="664"/>
-                                          </p:stCondLst>
-                                        </p:cTn>
-                                        <p:tgtEl>
-                                          <p:spTgt spid="13"/>
-                                        </p:tgtEl>
-                                        <p:attrNameLst>
-                                          <p:attrName>ppt_y</p:attrName>
-                                        </p:attrNameLst>
-                                      </p:cBhvr>
-                                      <p:tavLst>
-                                        <p:tav tm="0" fmla="#ppt_y-sin(pi*$)/9">
-                                          <p:val>
-                                            <p:fltVal val="0"/>
-                                          </p:val>
-                                        </p:tav>
-                                        <p:tav tm="100000">
-                                          <p:val>
-                                            <p:fltVal val="1"/>
-                                          </p:val>
-                                        </p:tav>
-                                      </p:tavLst>
-                                    </p:anim>
-                                    <p:anim calcmode="lin" valueType="num">
-                                      <p:cBhvr>
-                                        <p:cTn id="11" dur="332" tmFilter="0, 0; 0.125,0.2665; 0.25,0.4; 0.375,0.465; 0.5,0.5;  0.625,0.535; 0.75,0.6; 0.875,0.7335; 1,1">
-                                          <p:stCondLst>
-                                            <p:cond delay="1324"/>
-                                          </p:stCondLst>
-                                        </p:cTn>
-                                        <p:tgtEl>
-                                          <p:spTgt spid="13"/>
-                                        </p:tgtEl>
-                                        <p:attrNameLst>
-                                          <p:attrName>ppt_y</p:attrName>
-                                        </p:attrNameLst>
-                                      </p:cBhvr>
-                                      <p:tavLst>
-                                        <p:tav tm="0" fmla="#ppt_y-sin(pi*$)/27">
-                                          <p:val>
-                                            <p:fltVal val="0"/>
-                                          </p:val>
-                                        </p:tav>
-                                        <p:tav tm="100000">
-                                          <p:val>
-                                            <p:fltVal val="1"/>
-                                          </p:val>
-                                        </p:tav>
-                                      </p:tavLst>
-                                    </p:anim>
-                                    <p:anim calcmode="lin" valueType="num">
-                                      <p:cBhvr>
-                                        <p:cTn id="12" dur="164" tmFilter="0, 0; 0.125,0.2665; 0.25,0.4; 0.375,0.465; 0.5,0.5;  0.625,0.535; 0.75,0.6; 0.875,0.7335; 1,1">
-                                          <p:stCondLst>
-                                            <p:cond delay="1656"/>
-                                          </p:stCondLst>
-                                        </p:cTn>
-                                        <p:tgtEl>
-                                          <p:spTgt spid="13"/>
-                                        </p:tgtEl>
-                                        <p:attrNameLst>
-                                          <p:attrName>ppt_y</p:attrName>
-                                        </p:attrNameLst>
-                                      </p:cBhvr>
-                                      <p:tavLst>
-                                        <p:tav tm="0" fmla="#ppt_y-sin(pi*$)/81">
-                                          <p:val>
-                                            <p:fltVal val="0"/>
-                                          </p:val>
-                                        </p:tav>
-                                        <p:tav tm="100000">
-                                          <p:val>
-                                            <p:fltVal val="1"/>
-                                          </p:val>
-                                        </p:tav>
-                                      </p:tavLst>
-                                    </p:anim>
-                                    <p:animScale>
-                                      <p:cBhvr>
-                                        <p:cTn id="13" dur="26">
-                                          <p:stCondLst>
-                                            <p:cond delay="650"/>
-                                          </p:stCondLst>
-                                        </p:cTn>
-                                        <p:tgtEl>
-                                          <p:spTgt spid="13"/>
-                                        </p:tgtEl>
-                                      </p:cBhvr>
-                                      <p:to x="100000" y="60000"/>
-                                    </p:animScale>
-                                    <p:animScale>
-                                      <p:cBhvr>
-                                        <p:cTn id="14" dur="166" decel="50000">
-                                          <p:stCondLst>
-                                            <p:cond delay="676"/>
-                                          </p:stCondLst>
-                                        </p:cTn>
-                                        <p:tgtEl>
-                                          <p:spTgt spid="13"/>
-                                        </p:tgtEl>
-                                      </p:cBhvr>
-                                      <p:to x="100000" y="100000"/>
-                                    </p:animScale>
-                                    <p:animScale>
-                                      <p:cBhvr>
-                                        <p:cTn id="15" dur="26">
-                                          <p:stCondLst>
-                                            <p:cond delay="1312"/>
-                                          </p:stCondLst>
-                                        </p:cTn>
-                                        <p:tgtEl>
-                                          <p:spTgt spid="13"/>
-                                        </p:tgtEl>
-                                      </p:cBhvr>
-                                      <p:to x="100000" y="80000"/>
-                                    </p:animScale>
-                                    <p:animScale>
-                                      <p:cBhvr>
-                                        <p:cTn id="16" dur="166" decel="50000">
-                                          <p:stCondLst>
-                                            <p:cond delay="1338"/>
-                                          </p:stCondLst>
-                                        </p:cTn>
-                                        <p:tgtEl>
-                                          <p:spTgt spid="13"/>
-                                        </p:tgtEl>
-                                      </p:cBhvr>
-                                      <p:to x="100000" y="100000"/>
-                                    </p:animScale>
-                                    <p:animScale>
-                                      <p:cBhvr>
-                                        <p:cTn id="17" dur="26">
-                                          <p:stCondLst>
-                                            <p:cond delay="1642"/>
-                                          </p:stCondLst>
-                                        </p:cTn>
-                                        <p:tgtEl>
-                                          <p:spTgt spid="13"/>
-                                        </p:tgtEl>
-                                      </p:cBhvr>
-                                      <p:to x="100000" y="90000"/>
-                                    </p:animScale>
-                                    <p:animScale>
-                                      <p:cBhvr>
-                                        <p:cTn id="18" dur="166" decel="50000">
-                                          <p:stCondLst>
-                                            <p:cond delay="1668"/>
-                                          </p:stCondLst>
-                                        </p:cTn>
-                                        <p:tgtEl>
-                                          <p:spTgt spid="13"/>
-                                        </p:tgtEl>
-                                      </p:cBhvr>
-                                      <p:to x="100000" y="100000"/>
-                                    </p:animScale>
-                                    <p:animScale>
-                                      <p:cBhvr>
-                                        <p:cTn id="19" dur="26">
-                                          <p:stCondLst>
-                                            <p:cond delay="1808"/>
-                                          </p:stCondLst>
-                                        </p:cTn>
-                                        <p:tgtEl>
-                                          <p:spTgt spid="13"/>
-                                        </p:tgtEl>
-                                      </p:cBhvr>
-                                      <p:to x="100000" y="95000"/>
-                                    </p:animScale>
-                                    <p:animScale>
-                                      <p:cBhvr>
-                                        <p:cTn id="20" dur="166" decel="50000">
-                                          <p:stCondLst>
-                                            <p:cond delay="1834"/>
-                                          </p:stCondLst>
-                                        </p:cTn>
-                                        <p:tgtEl>
-                                          <p:spTgt spid="13"/>
-                                        </p:tgtEl>
-                                      </p:cBhvr>
-                                      <p:to x="100000" y="100000"/>
-                                    </p:animScale>
                                   </p:childTnLst>
                                 </p:cTn>
                               </p:par>
@@ -7507,7 +6488,7 @@
                             </p:stCondLst>
                             <p:childTnLst>
                               <p:par>
-                                <p:cTn id="23" presetID="22" presetClass="entr" presetSubtype="4" fill="hold" nodeType="clickEffect">
+                                <p:cTn id="23" presetID="2" presetClass="entr" presetSubtype="4" fill="hold" nodeType="clickEffect">
                                   <p:stCondLst>
                                     <p:cond delay="0"/>
                                   </p:stCondLst>
@@ -7520,212 +6501,7 @@
                                           </p:stCondLst>
                                         </p:cTn>
                                         <p:tgtEl>
-                                          <p:spTgt spid="15"/>
-                                        </p:tgtEl>
-                                        <p:attrNameLst>
-                                          <p:attrName>style.visibility</p:attrName>
-                                        </p:attrNameLst>
-                                      </p:cBhvr>
-                                      <p:to>
-                                        <p:strVal val="visible"/>
-                                      </p:to>
-                                    </p:set>
-                                    <p:animEffect transition="in" filter="wipe(down)">
-                                      <p:cBhvr>
-                                        <p:cTn id="25" dur="500"/>
-                                        <p:tgtEl>
-                                          <p:spTgt spid="15"/>
-                                        </p:tgtEl>
-                                      </p:cBhvr>
-                                    </p:animEffect>
-                                  </p:childTnLst>
-                                </p:cTn>
-                              </p:par>
-                            </p:childTnLst>
-                          </p:cTn>
-                        </p:par>
-                      </p:childTnLst>
-                    </p:cTn>
-                  </p:par>
-                  <p:par>
-                    <p:cTn id="26" fill="hold">
-                      <p:stCondLst>
-                        <p:cond delay="indefinite"/>
-                      </p:stCondLst>
-                      <p:childTnLst>
-                        <p:par>
-                          <p:cTn id="27" fill="hold">
-                            <p:stCondLst>
-                              <p:cond delay="0"/>
-                            </p:stCondLst>
-                            <p:childTnLst>
-                              <p:par>
-                                <p:cTn id="28" presetID="6" presetClass="entr" presetSubtype="16" fill="hold" nodeType="clickEffect">
-                                  <p:stCondLst>
-                                    <p:cond delay="0"/>
-                                  </p:stCondLst>
-                                  <p:childTnLst>
-                                    <p:set>
-                                      <p:cBhvr>
-                                        <p:cTn id="29" dur="1" fill="hold">
-                                          <p:stCondLst>
-                                            <p:cond delay="0"/>
-                                          </p:stCondLst>
-                                        </p:cTn>
-                                        <p:tgtEl>
-                                          <p:spTgt spid="17"/>
-                                        </p:tgtEl>
-                                        <p:attrNameLst>
-                                          <p:attrName>style.visibility</p:attrName>
-                                        </p:attrNameLst>
-                                      </p:cBhvr>
-                                      <p:to>
-                                        <p:strVal val="visible"/>
-                                      </p:to>
-                                    </p:set>
-                                    <p:animEffect transition="in" filter="circle(in)">
-                                      <p:cBhvr>
-                                        <p:cTn id="30" dur="2000"/>
-                                        <p:tgtEl>
-                                          <p:spTgt spid="17"/>
-                                        </p:tgtEl>
-                                      </p:cBhvr>
-                                    </p:animEffect>
-                                  </p:childTnLst>
-                                </p:cTn>
-                              </p:par>
-                            </p:childTnLst>
-                          </p:cTn>
-                        </p:par>
-                      </p:childTnLst>
-                    </p:cTn>
-                  </p:par>
-                  <p:par>
-                    <p:cTn id="31" fill="hold">
-                      <p:stCondLst>
-                        <p:cond delay="indefinite"/>
-                      </p:stCondLst>
-                      <p:childTnLst>
-                        <p:par>
-                          <p:cTn id="32" fill="hold">
-                            <p:stCondLst>
-                              <p:cond delay="0"/>
-                            </p:stCondLst>
-                            <p:childTnLst>
-                              <p:par>
-                                <p:cTn id="33" presetID="45" presetClass="entr" presetSubtype="0" fill="hold" nodeType="clickEffect">
-                                  <p:stCondLst>
-                                    <p:cond delay="0"/>
-                                  </p:stCondLst>
-                                  <p:childTnLst>
-                                    <p:set>
-                                      <p:cBhvr>
-                                        <p:cTn id="34" dur="1" fill="hold">
-                                          <p:stCondLst>
-                                            <p:cond delay="0"/>
-                                          </p:stCondLst>
-                                        </p:cTn>
-                                        <p:tgtEl>
-                                          <p:spTgt spid="21"/>
-                                        </p:tgtEl>
-                                        <p:attrNameLst>
-                                          <p:attrName>style.visibility</p:attrName>
-                                        </p:attrNameLst>
-                                      </p:cBhvr>
-                                      <p:to>
-                                        <p:strVal val="visible"/>
-                                      </p:to>
-                                    </p:set>
-                                    <p:animEffect transition="in" filter="fade">
-                                      <p:cBhvr>
-                                        <p:cTn id="35" dur="2000"/>
-                                        <p:tgtEl>
-                                          <p:spTgt spid="21"/>
-                                        </p:tgtEl>
-                                      </p:cBhvr>
-                                    </p:animEffect>
-                                    <p:anim calcmode="lin" valueType="num">
-                                      <p:cBhvr>
-                                        <p:cTn id="36" dur="2000" fill="hold"/>
-                                        <p:tgtEl>
-                                          <p:spTgt spid="21"/>
-                                        </p:tgtEl>
-                                        <p:attrNameLst>
-                                          <p:attrName>ppt_w</p:attrName>
-                                        </p:attrNameLst>
-                                      </p:cBhvr>
-                                      <p:tavLst>
-                                        <p:tav tm="0" fmla="#ppt_w*sin(2.5*pi*$)">
-                                          <p:val>
-                                            <p:fltVal val="0"/>
-                                          </p:val>
-                                        </p:tav>
-                                        <p:tav tm="100000">
-                                          <p:val>
-                                            <p:fltVal val="1"/>
-                                          </p:val>
-                                        </p:tav>
-                                      </p:tavLst>
-                                    </p:anim>
-                                    <p:anim calcmode="lin" valueType="num">
-                                      <p:cBhvr>
-                                        <p:cTn id="37" dur="2000" fill="hold"/>
-                                        <p:tgtEl>
-                                          <p:spTgt spid="21"/>
-                                        </p:tgtEl>
-                                        <p:attrNameLst>
-                                          <p:attrName>ppt_h</p:attrName>
-                                        </p:attrNameLst>
-                                      </p:cBhvr>
-                                      <p:tavLst>
-                                        <p:tav tm="0">
-                                          <p:val>
-                                            <p:strVal val="#ppt_h"/>
-                                          </p:val>
-                                        </p:tav>
-                                        <p:tav tm="100000">
-                                          <p:val>
-                                            <p:strVal val="#ppt_h"/>
-                                          </p:val>
-                                        </p:tav>
-                                      </p:tavLst>
-                                    </p:anim>
-                                  </p:childTnLst>
-                                </p:cTn>
-                              </p:par>
-                            </p:childTnLst>
-                          </p:cTn>
-                        </p:par>
-                      </p:childTnLst>
-                    </p:cTn>
-                  </p:par>
-                  <p:par>
-                    <p:cTn id="38" fill="hold">
-                      <p:stCondLst>
-                        <p:cond delay="indefinite"/>
-                      </p:stCondLst>
-                      <p:childTnLst>
-                        <p:par>
-                          <p:cTn id="39" fill="hold">
-                            <p:stCondLst>
-                              <p:cond delay="0"/>
-                            </p:stCondLst>
-                            <p:childTnLst>
-                              <p:par>
-                                <p:cTn id="40" presetID="2" presetClass="entr" presetSubtype="4" fill="hold" nodeType="clickEffect">
-                                  <p:stCondLst>
-                                    <p:cond delay="0"/>
-                                  </p:stCondLst>
-                                  <p:childTnLst>
-                                    <p:set>
-                                      <p:cBhvr>
-                                        <p:cTn id="41" dur="1" fill="hold">
-                                          <p:stCondLst>
-                                            <p:cond delay="0"/>
-                                          </p:stCondLst>
-                                        </p:cTn>
-                                        <p:tgtEl>
-                                          <p:spTgt spid="19"/>
+                                          <p:spTgt spid="9"/>
                                         </p:tgtEl>
                                         <p:attrNameLst>
                                           <p:attrName>style.visibility</p:attrName>
@@ -7737,9 +6513,9 @@
                                     </p:set>
                                     <p:anim calcmode="lin" valueType="num">
                                       <p:cBhvr additive="base">
-                                        <p:cTn id="42" dur="500" fill="hold"/>
+                                        <p:cTn id="25" dur="500" fill="hold"/>
                                         <p:tgtEl>
-                                          <p:spTgt spid="19"/>
+                                          <p:spTgt spid="9"/>
                                         </p:tgtEl>
                                         <p:attrNameLst>
                                           <p:attrName>ppt_x</p:attrName>
@@ -7760,9 +6536,9 @@
                                     </p:anim>
                                     <p:anim calcmode="lin" valueType="num">
                                       <p:cBhvr additive="base">
-                                        <p:cTn id="43" dur="500" fill="hold"/>
+                                        <p:cTn id="26" dur="500" fill="hold"/>
                                         <p:tgtEl>
-                                          <p:spTgt spid="19"/>
+                                          <p:spTgt spid="9"/>
                                         </p:tgtEl>
                                         <p:attrNameLst>
                                           <p:attrName>ppt_y</p:attrName>
@@ -7781,59 +6557,6 @@
                                         </p:tav>
                                       </p:tavLst>
                                     </p:anim>
-                                  </p:childTnLst>
-                                </p:cTn>
-                              </p:par>
-                            </p:childTnLst>
-                          </p:cTn>
-                        </p:par>
-                      </p:childTnLst>
-                    </p:cTn>
-                  </p:par>
-                  <p:par>
-                    <p:cTn id="44" fill="hold">
-                      <p:stCondLst>
-                        <p:cond delay="indefinite"/>
-                      </p:stCondLst>
-                      <p:childTnLst>
-                        <p:par>
-                          <p:cTn id="45" fill="hold">
-                            <p:stCondLst>
-                              <p:cond delay="0"/>
-                            </p:stCondLst>
-                            <p:childTnLst>
-                              <p:par>
-                                <p:cTn id="46" presetID="10" presetClass="entr" presetSubtype="0" fill="hold" nodeType="clickEffect">
-                                  <p:stCondLst>
-                                    <p:cond delay="0"/>
-                                  </p:stCondLst>
-                                  <p:childTnLst>
-                                    <p:set>
-                                      <p:cBhvr>
-                                        <p:cTn id="47" dur="1" fill="hold">
-                                          <p:stCondLst>
-                                            <p:cond delay="0"/>
-                                          </p:stCondLst>
-                                        </p:cTn>
-                                        <p:tgtEl>
-                                          <p:spTgt spid="23"/>
-                                        </p:tgtEl>
-                                        <p:attrNameLst>
-                                          <p:attrName>style.visibility</p:attrName>
-                                        </p:attrNameLst>
-                                      </p:cBhvr>
-                                      <p:to>
-                                        <p:strVal val="visible"/>
-                                      </p:to>
-                                    </p:set>
-                                    <p:animEffect transition="in" filter="fade">
-                                      <p:cBhvr>
-                                        <p:cTn id="48" dur="500"/>
-                                        <p:tgtEl>
-                                          <p:spTgt spid="23"/>
-                                        </p:tgtEl>
-                                      </p:cBhvr>
-                                    </p:animEffect>
                                   </p:childTnLst>
                                 </p:cTn>
                               </p:par>
@@ -7890,7 +6613,7 @@
           <p:cNvPr id="2" name="Title 1">
             <a:extLst>
               <a:ext uri="{FF2B5EF4-FFF2-40B4-BE49-F238E27FC236}">
-                <a16:creationId xmlns:a16="http://schemas.microsoft.com/office/drawing/2014/main" id="{B5070D31-0985-553A-7720-10C8C7F361B2}"/>
+                <a16:creationId xmlns:a16="http://schemas.microsoft.com/office/drawing/2014/main" id="{794C09E2-7D69-52FB-0999-953955EC03E4}"/>
               </a:ext>
             </a:extLst>
           </p:cNvPr>
@@ -7908,672 +6631,123 @@
           <a:p>
             <a:r>
               <a:rPr lang="ca-ES-valencia" noProof="0" dirty="0"/>
-              <a:t>Funcionalitat clau (QR Explicació)</a:t>
-            </a:r>
-          </a:p>
-        </p:txBody>
-      </p:sp>
-      <p:pic>
-        <p:nvPicPr>
-          <p:cNvPr id="8" name="Content Placeholder 7">
-            <a:extLst>
-              <a:ext uri="{FF2B5EF4-FFF2-40B4-BE49-F238E27FC236}">
-                <a16:creationId xmlns:a16="http://schemas.microsoft.com/office/drawing/2014/main" id="{F4124545-1E05-1C1F-ABC9-F77044A77591}"/>
-              </a:ext>
-            </a:extLst>
-          </p:cNvPr>
-          <p:cNvPicPr>
-            <a:picLocks noGrp="1" noChangeAspect="1"/>
-          </p:cNvPicPr>
+              <a:t>Dificultats i millores futures</a:t>
+            </a:r>
+          </a:p>
+        </p:txBody>
+      </p:sp>
+      <p:sp>
+        <p:nvSpPr>
+          <p:cNvPr id="3" name="Content Placeholder 2">
+            <a:extLst>
+              <a:ext uri="{FF2B5EF4-FFF2-40B4-BE49-F238E27FC236}">
+                <a16:creationId xmlns:a16="http://schemas.microsoft.com/office/drawing/2014/main" id="{B57C6B89-36FF-8378-B25D-BB9042B2DD5E}"/>
+              </a:ext>
+            </a:extLst>
+          </p:cNvPr>
+          <p:cNvSpPr>
+            <a:spLocks noGrp="1"/>
+          </p:cNvSpPr>
           <p:nvPr>
             <p:ph idx="1"/>
           </p:nvPr>
-        </p:nvPicPr>
-        <p:blipFill>
-          <a:blip r:embed="rId2">
-            <a:extLst>
-              <a:ext uri="{28A0092B-C50C-407E-A947-70E740481C1C}">
-                <a14:useLocalDpi xmlns:a14="http://schemas.microsoft.com/office/drawing/2010/main" val="0"/>
-              </a:ext>
-            </a:extLst>
-          </a:blip>
-          <a:stretch>
-            <a:fillRect/>
-          </a:stretch>
-        </p:blipFill>
-        <p:spPr>
-          <a:xfrm>
-            <a:off x="985684" y="2576512"/>
-            <a:ext cx="2466975" cy="1847850"/>
-          </a:xfrm>
-          <a:prstGeom prst="rect">
-            <a:avLst/>
-          </a:prstGeom>
-          <a:noFill/>
-        </p:spPr>
-      </p:pic>
-      <p:sp>
-        <p:nvSpPr>
-          <p:cNvPr id="5" name="TextBox 4">
-            <a:extLst>
-              <a:ext uri="{FF2B5EF4-FFF2-40B4-BE49-F238E27FC236}">
-                <a16:creationId xmlns:a16="http://schemas.microsoft.com/office/drawing/2014/main" id="{833CE1DE-F7D3-6D9A-5456-E837BC855695}"/>
-              </a:ext>
-            </a:extLst>
-          </p:cNvPr>
-          <p:cNvSpPr txBox="1"/>
-          <p:nvPr/>
-        </p:nvSpPr>
-        <p:spPr>
-          <a:xfrm>
-            <a:off x="4771103" y="1825625"/>
-            <a:ext cx="2649794" cy="646331"/>
-          </a:xfrm>
-          <a:prstGeom prst="rect">
-            <a:avLst/>
-          </a:prstGeom>
-          <a:noFill/>
-        </p:spPr>
-        <p:txBody>
-          <a:bodyPr wrap="square" rtlCol="0">
-            <a:spAutoFit/>
+        </p:nvSpPr>
+        <p:spPr/>
+        <p:txBody>
+          <a:bodyPr>
+            <a:normAutofit/>
           </a:bodyPr>
           <a:lstStyle/>
           <a:p>
             <a:r>
               <a:rPr lang="ca-ES-valencia" noProof="0" dirty="0"/>
-              <a:t>QR(</a:t>
+              <a:t>Dificultats:</a:t>
+            </a:r>
+          </a:p>
+          <a:p>
+            <a:pPr marL="0" indent="0">
+              <a:buNone/>
+            </a:pPr>
+            <a:r>
+              <a:rPr lang="ca-ES-valencia" noProof="0" dirty="0"/>
+              <a:t>-Adaptar la pantalla del mòbil per a que no es sobreïsca en horitzontal.</a:t>
+            </a:r>
+          </a:p>
+          <a:p>
+            <a:r>
+              <a:rPr lang="ca-ES-valencia" noProof="0" dirty="0"/>
+              <a:t>Que he aprés:</a:t>
+            </a:r>
+          </a:p>
+          <a:p>
+            <a:pPr marL="0" indent="0">
+              <a:buNone/>
+            </a:pPr>
+            <a:r>
+              <a:rPr lang="ca-ES-valencia" noProof="0" dirty="0"/>
+              <a:t>-Que és la tecnologia </a:t>
             </a:r>
             <a:r>
               <a:rPr lang="ca-ES-valencia" noProof="0" dirty="0" err="1"/>
-              <a:t>Quick-Response-Code</a:t>
+              <a:t>nfc</a:t>
             </a:r>
             <a:r>
               <a:rPr lang="ca-ES-valencia" noProof="0" dirty="0"/>
-              <a:t>)</a:t>
-            </a:r>
-          </a:p>
-          <a:p>
-            <a:endParaRPr lang="ca-ES-valencia" noProof="0" dirty="0"/>
-          </a:p>
-        </p:txBody>
-      </p:sp>
-      <p:pic>
-        <p:nvPicPr>
-          <p:cNvPr id="10" name="Picture 9">
-            <a:extLst>
-              <a:ext uri="{FF2B5EF4-FFF2-40B4-BE49-F238E27FC236}">
-                <a16:creationId xmlns:a16="http://schemas.microsoft.com/office/drawing/2014/main" id="{36E688CA-25C9-834C-0922-F1F6A747720C}"/>
-              </a:ext>
-            </a:extLst>
-          </p:cNvPr>
-          <p:cNvPicPr>
-            <a:picLocks noChangeAspect="1"/>
-          </p:cNvPicPr>
-          <p:nvPr/>
-        </p:nvPicPr>
-        <p:blipFill>
-          <a:blip r:embed="rId3">
-            <a:extLst>
-              <a:ext uri="{28A0092B-C50C-407E-A947-70E740481C1C}">
-                <a14:useLocalDpi xmlns:a14="http://schemas.microsoft.com/office/drawing/2010/main" val="0"/>
-              </a:ext>
-            </a:extLst>
-          </a:blip>
-          <a:stretch>
-            <a:fillRect/>
-          </a:stretch>
-        </p:blipFill>
-        <p:spPr>
-          <a:xfrm>
-            <a:off x="4771103" y="2433637"/>
-            <a:ext cx="2305050" cy="1990725"/>
-          </a:xfrm>
-          <a:prstGeom prst="rect">
-            <a:avLst/>
-          </a:prstGeom>
-        </p:spPr>
-      </p:pic>
-      <p:pic>
-        <p:nvPicPr>
-          <p:cNvPr id="13" name="Picture 12">
-            <a:extLst>
-              <a:ext uri="{FF2B5EF4-FFF2-40B4-BE49-F238E27FC236}">
-                <a16:creationId xmlns:a16="http://schemas.microsoft.com/office/drawing/2014/main" id="{62F35F4F-3ECF-E7E4-9E10-2B8902239985}"/>
-              </a:ext>
-            </a:extLst>
-          </p:cNvPr>
-          <p:cNvPicPr>
-            <a:picLocks noChangeAspect="1"/>
-          </p:cNvPicPr>
-          <p:nvPr/>
-        </p:nvPicPr>
-        <p:blipFill>
-          <a:blip r:embed="rId4">
-            <a:extLst>
-              <a:ext uri="{28A0092B-C50C-407E-A947-70E740481C1C}">
-                <a14:useLocalDpi xmlns:a14="http://schemas.microsoft.com/office/drawing/2010/main" val="0"/>
-              </a:ext>
-            </a:extLst>
-          </a:blip>
-          <a:stretch>
-            <a:fillRect/>
-          </a:stretch>
-        </p:blipFill>
-        <p:spPr>
-          <a:xfrm>
-            <a:off x="838200" y="4810994"/>
-            <a:ext cx="3413680" cy="1952625"/>
-          </a:xfrm>
-          <a:prstGeom prst="rect">
-            <a:avLst/>
-          </a:prstGeom>
-        </p:spPr>
-      </p:pic>
-      <p:pic>
-        <p:nvPicPr>
-          <p:cNvPr id="15" name="Picture 14">
-            <a:extLst>
-              <a:ext uri="{FF2B5EF4-FFF2-40B4-BE49-F238E27FC236}">
-                <a16:creationId xmlns:a16="http://schemas.microsoft.com/office/drawing/2014/main" id="{60FAC8CB-6081-2E81-E5EF-1C753BE480EF}"/>
-              </a:ext>
-            </a:extLst>
-          </p:cNvPr>
-          <p:cNvPicPr>
-            <a:picLocks noChangeAspect="1"/>
-          </p:cNvPicPr>
-          <p:nvPr/>
-        </p:nvPicPr>
-        <p:blipFill>
-          <a:blip r:embed="rId5">
-            <a:extLst>
-              <a:ext uri="{28A0092B-C50C-407E-A947-70E740481C1C}">
-                <a14:useLocalDpi xmlns:a14="http://schemas.microsoft.com/office/drawing/2010/main" val="0"/>
-              </a:ext>
-            </a:extLst>
-          </a:blip>
-          <a:stretch>
-            <a:fillRect/>
-          </a:stretch>
-        </p:blipFill>
-        <p:spPr>
-          <a:xfrm>
-            <a:off x="8093442" y="2040654"/>
-            <a:ext cx="3441357" cy="3030689"/>
-          </a:xfrm>
-          <a:prstGeom prst="rect">
-            <a:avLst/>
-          </a:prstGeom>
-        </p:spPr>
-      </p:pic>
-      <p:pic>
-        <p:nvPicPr>
-          <p:cNvPr id="17" name="Picture 16">
-            <a:extLst>
-              <a:ext uri="{FF2B5EF4-FFF2-40B4-BE49-F238E27FC236}">
-                <a16:creationId xmlns:a16="http://schemas.microsoft.com/office/drawing/2014/main" id="{785C5DEE-87B6-ACC8-0940-957971C46126}"/>
-              </a:ext>
-            </a:extLst>
-          </p:cNvPr>
-          <p:cNvPicPr>
-            <a:picLocks noChangeAspect="1"/>
-          </p:cNvPicPr>
-          <p:nvPr/>
-        </p:nvPicPr>
-        <p:blipFill>
-          <a:blip r:embed="rId6">
-            <a:extLst>
-              <a:ext uri="{28A0092B-C50C-407E-A947-70E740481C1C}">
-                <a14:useLocalDpi xmlns:a14="http://schemas.microsoft.com/office/drawing/2010/main" val="0"/>
-              </a:ext>
-            </a:extLst>
-          </a:blip>
-          <a:stretch>
-            <a:fillRect/>
-          </a:stretch>
-        </p:blipFill>
-        <p:spPr>
-          <a:xfrm>
-            <a:off x="4924425" y="4810993"/>
-            <a:ext cx="2343150" cy="1952625"/>
-          </a:xfrm>
-          <a:prstGeom prst="rect">
-            <a:avLst/>
-          </a:prstGeom>
-        </p:spPr>
-      </p:pic>
-      <p:pic>
-        <p:nvPicPr>
-          <p:cNvPr id="19" name="Picture 18">
-            <a:extLst>
-              <a:ext uri="{FF2B5EF4-FFF2-40B4-BE49-F238E27FC236}">
-                <a16:creationId xmlns:a16="http://schemas.microsoft.com/office/drawing/2014/main" id="{8951A721-6C17-2556-C932-02D481332C09}"/>
-              </a:ext>
-            </a:extLst>
-          </p:cNvPr>
-          <p:cNvPicPr>
-            <a:picLocks noChangeAspect="1"/>
-          </p:cNvPicPr>
-          <p:nvPr/>
-        </p:nvPicPr>
-        <p:blipFill>
-          <a:blip r:embed="rId7">
-            <a:extLst>
-              <a:ext uri="{28A0092B-C50C-407E-A947-70E740481C1C}">
-                <a14:useLocalDpi xmlns:a14="http://schemas.microsoft.com/office/drawing/2010/main" val="0"/>
-              </a:ext>
-            </a:extLst>
-          </a:blip>
-          <a:stretch>
-            <a:fillRect/>
-          </a:stretch>
-        </p:blipFill>
-        <p:spPr>
-          <a:xfrm>
-            <a:off x="8539383" y="5242381"/>
-            <a:ext cx="2828925" cy="1609725"/>
-          </a:xfrm>
-          <a:prstGeom prst="rect">
-            <a:avLst/>
-          </a:prstGeom>
-        </p:spPr>
-      </p:pic>
+              <a:t> i per a que serveix.</a:t>
+            </a:r>
+          </a:p>
+          <a:p>
+            <a:r>
+              <a:rPr lang="ca-ES-valencia" noProof="0" dirty="0"/>
+              <a:t>Millores futures:</a:t>
+            </a:r>
+          </a:p>
+          <a:p>
+            <a:pPr marL="0" indent="0">
+              <a:buNone/>
+            </a:pPr>
+            <a:r>
+              <a:rPr lang="ca-ES-valencia" noProof="0" dirty="0"/>
+              <a:t>-Passar del servidor de Node a </a:t>
+            </a:r>
+            <a:r>
+              <a:rPr lang="ca-ES-valencia" noProof="0" dirty="0" err="1"/>
+              <a:t>Odoo</a:t>
+            </a:r>
+            <a:r>
+              <a:rPr lang="ca-ES-valencia" noProof="0" dirty="0"/>
+              <a:t> mitjançant </a:t>
+            </a:r>
+            <a:r>
+              <a:rPr lang="ca-ES-valencia" noProof="0" dirty="0" err="1"/>
+              <a:t>jsonrpc</a:t>
+            </a:r>
+            <a:r>
+              <a:rPr lang="ca-ES-valencia" noProof="0" dirty="0"/>
+              <a:t>.</a:t>
+            </a:r>
+          </a:p>
+          <a:p>
+            <a:pPr marL="0" indent="0">
+              <a:buNone/>
+            </a:pPr>
+            <a:r>
+              <a:rPr lang="ca-ES-valencia" noProof="0" dirty="0"/>
+              <a:t>-Compatibilitat en iOS.</a:t>
+            </a:r>
+          </a:p>
+        </p:txBody>
+      </p:sp>
     </p:spTree>
     <p:extLst>
       <p:ext uri="{BB962C8B-B14F-4D97-AF65-F5344CB8AC3E}">
-        <p14:creationId xmlns:p14="http://schemas.microsoft.com/office/powerpoint/2010/main" val="3712215406"/>
+        <p14:creationId xmlns:p14="http://schemas.microsoft.com/office/powerpoint/2010/main" val="1908790075"/>
       </p:ext>
     </p:extLst>
   </p:cSld>
   <p:clrMapOvr>
     <a:masterClrMapping/>
   </p:clrMapOvr>
-  <p:timing>
-    <p:tnLst>
-      <p:par>
-        <p:cTn id="1" dur="indefinite" restart="never" nodeType="tmRoot">
-          <p:childTnLst>
-            <p:seq concurrent="1" nextAc="seek">
-              <p:cTn id="2" dur="indefinite" nodeType="mainSeq">
-                <p:childTnLst>
-                  <p:par>
-                    <p:cTn id="3" fill="hold">
-                      <p:stCondLst>
-                        <p:cond delay="indefinite"/>
-                      </p:stCondLst>
-                      <p:childTnLst>
-                        <p:par>
-                          <p:cTn id="4" fill="hold">
-                            <p:stCondLst>
-                              <p:cond delay="0"/>
-                            </p:stCondLst>
-                            <p:childTnLst>
-                              <p:par>
-                                <p:cTn id="5" presetID="6" presetClass="entr" presetSubtype="16" fill="hold" nodeType="clickEffect">
-                                  <p:stCondLst>
-                                    <p:cond delay="0"/>
-                                  </p:stCondLst>
-                                  <p:childTnLst>
-                                    <p:set>
-                                      <p:cBhvr>
-                                        <p:cTn id="6" dur="1" fill="hold">
-                                          <p:stCondLst>
-                                            <p:cond delay="0"/>
-                                          </p:stCondLst>
-                                        </p:cTn>
-                                        <p:tgtEl>
-                                          <p:spTgt spid="8"/>
-                                        </p:tgtEl>
-                                        <p:attrNameLst>
-                                          <p:attrName>style.visibility</p:attrName>
-                                        </p:attrNameLst>
-                                      </p:cBhvr>
-                                      <p:to>
-                                        <p:strVal val="visible"/>
-                                      </p:to>
-                                    </p:set>
-                                    <p:animEffect transition="in" filter="circle(in)">
-                                      <p:cBhvr>
-                                        <p:cTn id="7" dur="2000"/>
-                                        <p:tgtEl>
-                                          <p:spTgt spid="8"/>
-                                        </p:tgtEl>
-                                      </p:cBhvr>
-                                    </p:animEffect>
-                                  </p:childTnLst>
-                                </p:cTn>
-                              </p:par>
-                            </p:childTnLst>
-                          </p:cTn>
-                        </p:par>
-                      </p:childTnLst>
-                    </p:cTn>
-                  </p:par>
-                  <p:par>
-                    <p:cTn id="8" fill="hold">
-                      <p:stCondLst>
-                        <p:cond delay="indefinite"/>
-                      </p:stCondLst>
-                      <p:childTnLst>
-                        <p:par>
-                          <p:cTn id="9" fill="hold">
-                            <p:stCondLst>
-                              <p:cond delay="0"/>
-                            </p:stCondLst>
-                            <p:childTnLst>
-                              <p:par>
-                                <p:cTn id="10" presetID="22" presetClass="entr" presetSubtype="4" fill="hold" nodeType="clickEffect">
-                                  <p:stCondLst>
-                                    <p:cond delay="0"/>
-                                  </p:stCondLst>
-                                  <p:childTnLst>
-                                    <p:set>
-                                      <p:cBhvr>
-                                        <p:cTn id="11" dur="1" fill="hold">
-                                          <p:stCondLst>
-                                            <p:cond delay="0"/>
-                                          </p:stCondLst>
-                                        </p:cTn>
-                                        <p:tgtEl>
-                                          <p:spTgt spid="10"/>
-                                        </p:tgtEl>
-                                        <p:attrNameLst>
-                                          <p:attrName>style.visibility</p:attrName>
-                                        </p:attrNameLst>
-                                      </p:cBhvr>
-                                      <p:to>
-                                        <p:strVal val="visible"/>
-                                      </p:to>
-                                    </p:set>
-                                    <p:animEffect transition="in" filter="wipe(down)">
-                                      <p:cBhvr>
-                                        <p:cTn id="12" dur="500"/>
-                                        <p:tgtEl>
-                                          <p:spTgt spid="10"/>
-                                        </p:tgtEl>
-                                      </p:cBhvr>
-                                    </p:animEffect>
-                                  </p:childTnLst>
-                                </p:cTn>
-                              </p:par>
-                            </p:childTnLst>
-                          </p:cTn>
-                        </p:par>
-                      </p:childTnLst>
-                    </p:cTn>
-                  </p:par>
-                  <p:par>
-                    <p:cTn id="13" fill="hold">
-                      <p:stCondLst>
-                        <p:cond delay="indefinite"/>
-                      </p:stCondLst>
-                      <p:childTnLst>
-                        <p:par>
-                          <p:cTn id="14" fill="hold">
-                            <p:stCondLst>
-                              <p:cond delay="0"/>
-                            </p:stCondLst>
-                            <p:childTnLst>
-                              <p:par>
-                                <p:cTn id="15" presetID="16" presetClass="entr" presetSubtype="21" fill="hold" nodeType="clickEffect">
-                                  <p:stCondLst>
-                                    <p:cond delay="0"/>
-                                  </p:stCondLst>
-                                  <p:childTnLst>
-                                    <p:set>
-                                      <p:cBhvr>
-                                        <p:cTn id="16" dur="1" fill="hold">
-                                          <p:stCondLst>
-                                            <p:cond delay="0"/>
-                                          </p:stCondLst>
-                                        </p:cTn>
-                                        <p:tgtEl>
-                                          <p:spTgt spid="15"/>
-                                        </p:tgtEl>
-                                        <p:attrNameLst>
-                                          <p:attrName>style.visibility</p:attrName>
-                                        </p:attrNameLst>
-                                      </p:cBhvr>
-                                      <p:to>
-                                        <p:strVal val="visible"/>
-                                      </p:to>
-                                    </p:set>
-                                    <p:animEffect transition="in" filter="barn(inVertical)">
-                                      <p:cBhvr>
-                                        <p:cTn id="17" dur="500"/>
-                                        <p:tgtEl>
-                                          <p:spTgt spid="15"/>
-                                        </p:tgtEl>
-                                      </p:cBhvr>
-                                    </p:animEffect>
-                                  </p:childTnLst>
-                                </p:cTn>
-                              </p:par>
-                            </p:childTnLst>
-                          </p:cTn>
-                        </p:par>
-                      </p:childTnLst>
-                    </p:cTn>
-                  </p:par>
-                  <p:par>
-                    <p:cTn id="18" fill="hold">
-                      <p:stCondLst>
-                        <p:cond delay="indefinite"/>
-                      </p:stCondLst>
-                      <p:childTnLst>
-                        <p:par>
-                          <p:cTn id="19" fill="hold">
-                            <p:stCondLst>
-                              <p:cond delay="0"/>
-                            </p:stCondLst>
-                            <p:childTnLst>
-                              <p:par>
-                                <p:cTn id="20" presetID="2" presetClass="entr" presetSubtype="4" fill="hold" nodeType="clickEffect">
-                                  <p:stCondLst>
-                                    <p:cond delay="0"/>
-                                  </p:stCondLst>
-                                  <p:childTnLst>
-                                    <p:set>
-                                      <p:cBhvr>
-                                        <p:cTn id="21" dur="1" fill="hold">
-                                          <p:stCondLst>
-                                            <p:cond delay="0"/>
-                                          </p:stCondLst>
-                                        </p:cTn>
-                                        <p:tgtEl>
-                                          <p:spTgt spid="13"/>
-                                        </p:tgtEl>
-                                        <p:attrNameLst>
-                                          <p:attrName>style.visibility</p:attrName>
-                                        </p:attrNameLst>
-                                      </p:cBhvr>
-                                      <p:to>
-                                        <p:strVal val="visible"/>
-                                      </p:to>
-                                    </p:set>
-                                    <p:anim calcmode="lin" valueType="num">
-                                      <p:cBhvr additive="base">
-                                        <p:cTn id="22" dur="500" fill="hold"/>
-                                        <p:tgtEl>
-                                          <p:spTgt spid="13"/>
-                                        </p:tgtEl>
-                                        <p:attrNameLst>
-                                          <p:attrName>ppt_x</p:attrName>
-                                        </p:attrNameLst>
-                                      </p:cBhvr>
-                                      <p:tavLst>
-                                        <p:tav tm="0">
-                                          <p:val>
-                                            <p:strVal val="#ppt_x"/>
-                                          </p:val>
-                                        </p:tav>
-                                        <p:tav tm="100000">
-                                          <p:val>
-                                            <p:strVal val="#ppt_x"/>
-                                          </p:val>
-                                        </p:tav>
-                                      </p:tavLst>
-                                    </p:anim>
-                                    <p:anim calcmode="lin" valueType="num">
-                                      <p:cBhvr additive="base">
-                                        <p:cTn id="23" dur="500" fill="hold"/>
-                                        <p:tgtEl>
-                                          <p:spTgt spid="13"/>
-                                        </p:tgtEl>
-                                        <p:attrNameLst>
-                                          <p:attrName>ppt_y</p:attrName>
-                                        </p:attrNameLst>
-                                      </p:cBhvr>
-                                      <p:tavLst>
-                                        <p:tav tm="0">
-                                          <p:val>
-                                            <p:strVal val="1+#ppt_h/2"/>
-                                          </p:val>
-                                        </p:tav>
-                                        <p:tav tm="100000">
-                                          <p:val>
-                                            <p:strVal val="#ppt_y"/>
-                                          </p:val>
-                                        </p:tav>
-                                      </p:tavLst>
-                                    </p:anim>
-                                  </p:childTnLst>
-                                </p:cTn>
-                              </p:par>
-                            </p:childTnLst>
-                          </p:cTn>
-                        </p:par>
-                      </p:childTnLst>
-                    </p:cTn>
-                  </p:par>
-                  <p:par>
-                    <p:cTn id="24" fill="hold">
-                      <p:stCondLst>
-                        <p:cond delay="indefinite"/>
-                      </p:stCondLst>
-                      <p:childTnLst>
-                        <p:par>
-                          <p:cTn id="25" fill="hold">
-                            <p:stCondLst>
-                              <p:cond delay="0"/>
-                            </p:stCondLst>
-                            <p:childTnLst>
-                              <p:par>
-                                <p:cTn id="26" presetID="21" presetClass="entr" presetSubtype="1" fill="hold" nodeType="clickEffect">
-                                  <p:stCondLst>
-                                    <p:cond delay="0"/>
-                                  </p:stCondLst>
-                                  <p:childTnLst>
-                                    <p:set>
-                                      <p:cBhvr>
-                                        <p:cTn id="27" dur="1" fill="hold">
-                                          <p:stCondLst>
-                                            <p:cond delay="0"/>
-                                          </p:stCondLst>
-                                        </p:cTn>
-                                        <p:tgtEl>
-                                          <p:spTgt spid="17"/>
-                                        </p:tgtEl>
-                                        <p:attrNameLst>
-                                          <p:attrName>style.visibility</p:attrName>
-                                        </p:attrNameLst>
-                                      </p:cBhvr>
-                                      <p:to>
-                                        <p:strVal val="visible"/>
-                                      </p:to>
-                                    </p:set>
-                                    <p:animEffect transition="in" filter="wheel(1)">
-                                      <p:cBhvr>
-                                        <p:cTn id="28" dur="2000"/>
-                                        <p:tgtEl>
-                                          <p:spTgt spid="17"/>
-                                        </p:tgtEl>
-                                      </p:cBhvr>
-                                    </p:animEffect>
-                                  </p:childTnLst>
-                                </p:cTn>
-                              </p:par>
-                            </p:childTnLst>
-                          </p:cTn>
-                        </p:par>
-                      </p:childTnLst>
-                    </p:cTn>
-                  </p:par>
-                  <p:par>
-                    <p:cTn id="29" fill="hold">
-                      <p:stCondLst>
-                        <p:cond delay="indefinite"/>
-                      </p:stCondLst>
-                      <p:childTnLst>
-                        <p:par>
-                          <p:cTn id="30" fill="hold">
-                            <p:stCondLst>
-                              <p:cond delay="0"/>
-                            </p:stCondLst>
-                            <p:childTnLst>
-                              <p:par>
-                                <p:cTn id="31" presetID="10" presetClass="entr" presetSubtype="0" fill="hold" nodeType="clickEffect">
-                                  <p:stCondLst>
-                                    <p:cond delay="0"/>
-                                  </p:stCondLst>
-                                  <p:childTnLst>
-                                    <p:set>
-                                      <p:cBhvr>
-                                        <p:cTn id="32" dur="1" fill="hold">
-                                          <p:stCondLst>
-                                            <p:cond delay="0"/>
-                                          </p:stCondLst>
-                                        </p:cTn>
-                                        <p:tgtEl>
-                                          <p:spTgt spid="19"/>
-                                        </p:tgtEl>
-                                        <p:attrNameLst>
-                                          <p:attrName>style.visibility</p:attrName>
-                                        </p:attrNameLst>
-                                      </p:cBhvr>
-                                      <p:to>
-                                        <p:strVal val="visible"/>
-                                      </p:to>
-                                    </p:set>
-                                    <p:animEffect transition="in" filter="fade">
-                                      <p:cBhvr>
-                                        <p:cTn id="33" dur="500"/>
-                                        <p:tgtEl>
-                                          <p:spTgt spid="19"/>
-                                        </p:tgtEl>
-                                      </p:cBhvr>
-                                    </p:animEffect>
-                                  </p:childTnLst>
-                                </p:cTn>
-                              </p:par>
-                            </p:childTnLst>
-                          </p:cTn>
-                        </p:par>
-                      </p:childTnLst>
-                    </p:cTn>
-                  </p:par>
-                </p:childTnLst>
-              </p:cTn>
-              <p:prevCondLst>
-                <p:cond evt="onPrev" delay="0">
-                  <p:tgtEl>
-                    <p:sldTgt/>
-                  </p:tgtEl>
-                </p:cond>
-              </p:prevCondLst>
-              <p:nextCondLst>
-                <p:cond evt="onNext" delay="0">
-                  <p:tgtEl>
-                    <p:sldTgt/>
-                  </p:tgtEl>
-                </p:cond>
-              </p:nextCondLst>
-            </p:seq>
-          </p:childTnLst>
-        </p:cTn>
-      </p:par>
-    </p:tnLst>
-  </p:timing>
 </p:sld>
 </file>
 

</xml_diff>